<commit_message>
lab and slides updates
</commit_message>
<xml_diff>
--- a/labs/Laying-Out-The-Board/Laying-Out-The-Board.pptx
+++ b/labs/Laying-Out-The-Board/Laying-Out-The-Board.pptx
@@ -4,9 +4,6 @@
   <p:sldMasterIdLst>
     <p:sldMasterId id="2147483648" r:id="rId1"/>
   </p:sldMasterIdLst>
-  <p:notesMasterIdLst>
-    <p:notesMasterId r:id="rId24"/>
-  </p:notesMasterIdLst>
   <p:sldIdLst>
     <p:sldId id="292" r:id="rId2"/>
     <p:sldId id="270" r:id="rId3"/>
@@ -30,14 +27,17 @@
     <p:sldId id="264" r:id="rId21"/>
     <p:sldId id="265" r:id="rId22"/>
     <p:sldId id="319" r:id="rId23"/>
+    <p:sldId id="320" r:id="rId24"/>
+    <p:sldId id="321" r:id="rId25"/>
+    <p:sldId id="322" r:id="rId26"/>
   </p:sldIdLst>
-  <p:sldSz cx="9144000" cy="6858000" type="screen4x3"/>
+  <p:sldSz cx="12192000" cy="6858000"/>
   <p:notesSz cx="6858000" cy="9144000"/>
   <p:defaultTextStyle>
     <a:defPPr>
       <a:defRPr lang="en-US"/>
     </a:defPPr>
-    <a:lvl1pPr marL="0" algn="l" defTabSz="457200" rtl="0" eaLnBrk="1" latinLnBrk="0" hangingPunct="1">
+    <a:lvl1pPr marL="0" algn="l" defTabSz="914400" rtl="0" eaLnBrk="1" latinLnBrk="0" hangingPunct="1">
       <a:defRPr sz="1800" kern="1200">
         <a:solidFill>
           <a:schemeClr val="tx1"/>
@@ -47,7 +47,7 @@
         <a:cs typeface="+mn-cs"/>
       </a:defRPr>
     </a:lvl1pPr>
-    <a:lvl2pPr marL="457200" algn="l" defTabSz="457200" rtl="0" eaLnBrk="1" latinLnBrk="0" hangingPunct="1">
+    <a:lvl2pPr marL="457200" algn="l" defTabSz="914400" rtl="0" eaLnBrk="1" latinLnBrk="0" hangingPunct="1">
       <a:defRPr sz="1800" kern="1200">
         <a:solidFill>
           <a:schemeClr val="tx1"/>
@@ -57,7 +57,7 @@
         <a:cs typeface="+mn-cs"/>
       </a:defRPr>
     </a:lvl2pPr>
-    <a:lvl3pPr marL="914400" algn="l" defTabSz="457200" rtl="0" eaLnBrk="1" latinLnBrk="0" hangingPunct="1">
+    <a:lvl3pPr marL="914400" algn="l" defTabSz="914400" rtl="0" eaLnBrk="1" latinLnBrk="0" hangingPunct="1">
       <a:defRPr sz="1800" kern="1200">
         <a:solidFill>
           <a:schemeClr val="tx1"/>
@@ -67,7 +67,7 @@
         <a:cs typeface="+mn-cs"/>
       </a:defRPr>
     </a:lvl3pPr>
-    <a:lvl4pPr marL="1371600" algn="l" defTabSz="457200" rtl="0" eaLnBrk="1" latinLnBrk="0" hangingPunct="1">
+    <a:lvl4pPr marL="1371600" algn="l" defTabSz="914400" rtl="0" eaLnBrk="1" latinLnBrk="0" hangingPunct="1">
       <a:defRPr sz="1800" kern="1200">
         <a:solidFill>
           <a:schemeClr val="tx1"/>
@@ -77,7 +77,7 @@
         <a:cs typeface="+mn-cs"/>
       </a:defRPr>
     </a:lvl4pPr>
-    <a:lvl5pPr marL="1828800" algn="l" defTabSz="457200" rtl="0" eaLnBrk="1" latinLnBrk="0" hangingPunct="1">
+    <a:lvl5pPr marL="1828800" algn="l" defTabSz="914400" rtl="0" eaLnBrk="1" latinLnBrk="0" hangingPunct="1">
       <a:defRPr sz="1800" kern="1200">
         <a:solidFill>
           <a:schemeClr val="tx1"/>
@@ -87,7 +87,7 @@
         <a:cs typeface="+mn-cs"/>
       </a:defRPr>
     </a:lvl5pPr>
-    <a:lvl6pPr marL="2286000" algn="l" defTabSz="457200" rtl="0" eaLnBrk="1" latinLnBrk="0" hangingPunct="1">
+    <a:lvl6pPr marL="2286000" algn="l" defTabSz="914400" rtl="0" eaLnBrk="1" latinLnBrk="0" hangingPunct="1">
       <a:defRPr sz="1800" kern="1200">
         <a:solidFill>
           <a:schemeClr val="tx1"/>
@@ -97,7 +97,7 @@
         <a:cs typeface="+mn-cs"/>
       </a:defRPr>
     </a:lvl6pPr>
-    <a:lvl7pPr marL="2743200" algn="l" defTabSz="457200" rtl="0" eaLnBrk="1" latinLnBrk="0" hangingPunct="1">
+    <a:lvl7pPr marL="2743200" algn="l" defTabSz="914400" rtl="0" eaLnBrk="1" latinLnBrk="0" hangingPunct="1">
       <a:defRPr sz="1800" kern="1200">
         <a:solidFill>
           <a:schemeClr val="tx1"/>
@@ -107,7 +107,7 @@
         <a:cs typeface="+mn-cs"/>
       </a:defRPr>
     </a:lvl7pPr>
-    <a:lvl8pPr marL="3200400" algn="l" defTabSz="457200" rtl="0" eaLnBrk="1" latinLnBrk="0" hangingPunct="1">
+    <a:lvl8pPr marL="3200400" algn="l" defTabSz="914400" rtl="0" eaLnBrk="1" latinLnBrk="0" hangingPunct="1">
       <a:defRPr sz="1800" kern="1200">
         <a:solidFill>
           <a:schemeClr val="tx1"/>
@@ -117,7 +117,7 @@
         <a:cs typeface="+mn-cs"/>
       </a:defRPr>
     </a:lvl8pPr>
-    <a:lvl9pPr marL="3657600" algn="l" defTabSz="457200" rtl="0" eaLnBrk="1" latinLnBrk="0" hangingPunct="1">
+    <a:lvl9pPr marL="3657600" algn="l" defTabSz="914400" rtl="0" eaLnBrk="1" latinLnBrk="0" hangingPunct="1">
       <a:defRPr sz="1800" kern="1200">
         <a:solidFill>
           <a:schemeClr val="tx1"/>
@@ -128,373 +128,7 @@
       </a:defRPr>
     </a:lvl9pPr>
   </p:defaultTextStyle>
-  <p:extLst>
-    <p:ext uri="{EFAFB233-063F-42B5-8137-9DF3F51BA10A}">
-      <p15:sldGuideLst xmlns:p15="http://schemas.microsoft.com/office/powerpoint/2012/main">
-        <p15:guide id="1" orient="horz" pos="2160">
-          <p15:clr>
-            <a:srgbClr val="A4A3A4"/>
-          </p15:clr>
-        </p15:guide>
-        <p15:guide id="2" pos="2880">
-          <p15:clr>
-            <a:srgbClr val="A4A3A4"/>
-          </p15:clr>
-        </p15:guide>
-      </p15:sldGuideLst>
-    </p:ext>
-  </p:extLst>
 </p:presentation>
-</file>
-
-<file path=ppt/notesMasters/notesMaster1.xml><?xml version="1.0" encoding="utf-8"?>
-<p:notesMaster xmlns:a="http://schemas.openxmlformats.org/drawingml/2006/main" xmlns:r="http://schemas.openxmlformats.org/officeDocument/2006/relationships" xmlns:p="http://schemas.openxmlformats.org/presentationml/2006/main">
-  <p:cSld>
-    <p:bg>
-      <p:bgRef idx="1001">
-        <a:schemeClr val="bg1"/>
-      </p:bgRef>
-    </p:bg>
-    <p:spTree>
-      <p:nvGrpSpPr>
-        <p:cNvPr id="1" name=""/>
-        <p:cNvGrpSpPr/>
-        <p:nvPr/>
-      </p:nvGrpSpPr>
-      <p:grpSpPr>
-        <a:xfrm>
-          <a:off x="0" y="0"/>
-          <a:ext cx="0" cy="0"/>
-          <a:chOff x="0" y="0"/>
-          <a:chExt cx="0" cy="0"/>
-        </a:xfrm>
-      </p:grpSpPr>
-      <p:sp>
-        <p:nvSpPr>
-          <p:cNvPr id="2" name="Header Placeholder 1"/>
-          <p:cNvSpPr>
-            <a:spLocks noGrp="1"/>
-          </p:cNvSpPr>
-          <p:nvPr>
-            <p:ph type="hdr" sz="quarter"/>
-          </p:nvPr>
-        </p:nvSpPr>
-        <p:spPr>
-          <a:xfrm>
-            <a:off x="0" y="0"/>
-            <a:ext cx="2971800" cy="457200"/>
-          </a:xfrm>
-          <a:prstGeom prst="rect">
-            <a:avLst/>
-          </a:prstGeom>
-        </p:spPr>
-        <p:txBody>
-          <a:bodyPr vert="horz" lIns="91440" tIns="45720" rIns="91440" bIns="45720" rtlCol="0"/>
-          <a:lstStyle>
-            <a:lvl1pPr algn="l">
-              <a:defRPr sz="1200"/>
-            </a:lvl1pPr>
-          </a:lstStyle>
-          <a:p>
-            <a:endParaRPr lang="en-US"/>
-          </a:p>
-        </p:txBody>
-      </p:sp>
-      <p:sp>
-        <p:nvSpPr>
-          <p:cNvPr id="3" name="Date Placeholder 2"/>
-          <p:cNvSpPr>
-            <a:spLocks noGrp="1"/>
-          </p:cNvSpPr>
-          <p:nvPr>
-            <p:ph type="dt" idx="1"/>
-          </p:nvPr>
-        </p:nvSpPr>
-        <p:spPr>
-          <a:xfrm>
-            <a:off x="3884613" y="0"/>
-            <a:ext cx="2971800" cy="457200"/>
-          </a:xfrm>
-          <a:prstGeom prst="rect">
-            <a:avLst/>
-          </a:prstGeom>
-        </p:spPr>
-        <p:txBody>
-          <a:bodyPr vert="horz" lIns="91440" tIns="45720" rIns="91440" bIns="45720" rtlCol="0"/>
-          <a:lstStyle>
-            <a:lvl1pPr algn="r">
-              <a:defRPr sz="1200"/>
-            </a:lvl1pPr>
-          </a:lstStyle>
-          <a:p>
-            <a:fld id="{BC745CAF-6697-EB43-8D33-148B2A11868D}" type="datetimeFigureOut">
-              <a:rPr lang="en-US" smtClean="0"/>
-              <a:t>1/22/19</a:t>
-            </a:fld>
-            <a:endParaRPr lang="en-US"/>
-          </a:p>
-        </p:txBody>
-      </p:sp>
-      <p:sp>
-        <p:nvSpPr>
-          <p:cNvPr id="4" name="Slide Image Placeholder 3"/>
-          <p:cNvSpPr>
-            <a:spLocks noGrp="1" noRot="1" noChangeAspect="1"/>
-          </p:cNvSpPr>
-          <p:nvPr>
-            <p:ph type="sldImg" idx="2"/>
-          </p:nvPr>
-        </p:nvSpPr>
-        <p:spPr>
-          <a:xfrm>
-            <a:off x="1143000" y="685800"/>
-            <a:ext cx="4572000" cy="3429000"/>
-          </a:xfrm>
-          <a:prstGeom prst="rect">
-            <a:avLst/>
-          </a:prstGeom>
-          <a:noFill/>
-          <a:ln w="12700">
-            <a:solidFill>
-              <a:prstClr val="black"/>
-            </a:solidFill>
-          </a:ln>
-        </p:spPr>
-        <p:txBody>
-          <a:bodyPr vert="horz" lIns="91440" tIns="45720" rIns="91440" bIns="45720" rtlCol="0" anchor="ctr"/>
-          <a:lstStyle/>
-          <a:p>
-            <a:endParaRPr lang="en-US"/>
-          </a:p>
-        </p:txBody>
-      </p:sp>
-      <p:sp>
-        <p:nvSpPr>
-          <p:cNvPr id="5" name="Notes Placeholder 4"/>
-          <p:cNvSpPr>
-            <a:spLocks noGrp="1"/>
-          </p:cNvSpPr>
-          <p:nvPr>
-            <p:ph type="body" sz="quarter" idx="3"/>
-          </p:nvPr>
-        </p:nvSpPr>
-        <p:spPr>
-          <a:xfrm>
-            <a:off x="685800" y="4343400"/>
-            <a:ext cx="5486400" cy="4114800"/>
-          </a:xfrm>
-          <a:prstGeom prst="rect">
-            <a:avLst/>
-          </a:prstGeom>
-        </p:spPr>
-        <p:txBody>
-          <a:bodyPr vert="horz" lIns="91440" tIns="45720" rIns="91440" bIns="45720" rtlCol="0"/>
-          <a:lstStyle/>
-          <a:p>
-            <a:pPr lvl="0"/>
-            <a:r>
-              <a:rPr lang="x-none"/>
-              <a:t>Click to edit Master text styles</a:t>
-            </a:r>
-          </a:p>
-          <a:p>
-            <a:pPr lvl="1"/>
-            <a:r>
-              <a:rPr lang="x-none"/>
-              <a:t>Second level</a:t>
-            </a:r>
-          </a:p>
-          <a:p>
-            <a:pPr lvl="2"/>
-            <a:r>
-              <a:rPr lang="x-none"/>
-              <a:t>Third level</a:t>
-            </a:r>
-          </a:p>
-          <a:p>
-            <a:pPr lvl="3"/>
-            <a:r>
-              <a:rPr lang="x-none"/>
-              <a:t>Fourth level</a:t>
-            </a:r>
-          </a:p>
-          <a:p>
-            <a:pPr lvl="4"/>
-            <a:r>
-              <a:rPr lang="x-none"/>
-              <a:t>Fifth level</a:t>
-            </a:r>
-            <a:endParaRPr lang="en-US"/>
-          </a:p>
-        </p:txBody>
-      </p:sp>
-      <p:sp>
-        <p:nvSpPr>
-          <p:cNvPr id="6" name="Footer Placeholder 5"/>
-          <p:cNvSpPr>
-            <a:spLocks noGrp="1"/>
-          </p:cNvSpPr>
-          <p:nvPr>
-            <p:ph type="ftr" sz="quarter" idx="4"/>
-          </p:nvPr>
-        </p:nvSpPr>
-        <p:spPr>
-          <a:xfrm>
-            <a:off x="0" y="8685213"/>
-            <a:ext cx="2971800" cy="457200"/>
-          </a:xfrm>
-          <a:prstGeom prst="rect">
-            <a:avLst/>
-          </a:prstGeom>
-        </p:spPr>
-        <p:txBody>
-          <a:bodyPr vert="horz" lIns="91440" tIns="45720" rIns="91440" bIns="45720" rtlCol="0" anchor="b"/>
-          <a:lstStyle>
-            <a:lvl1pPr algn="l">
-              <a:defRPr sz="1200"/>
-            </a:lvl1pPr>
-          </a:lstStyle>
-          <a:p>
-            <a:endParaRPr lang="en-US"/>
-          </a:p>
-        </p:txBody>
-      </p:sp>
-      <p:sp>
-        <p:nvSpPr>
-          <p:cNvPr id="7" name="Slide Number Placeholder 6"/>
-          <p:cNvSpPr>
-            <a:spLocks noGrp="1"/>
-          </p:cNvSpPr>
-          <p:nvPr>
-            <p:ph type="sldNum" sz="quarter" idx="5"/>
-          </p:nvPr>
-        </p:nvSpPr>
-        <p:spPr>
-          <a:xfrm>
-            <a:off x="3884613" y="8685213"/>
-            <a:ext cx="2971800" cy="457200"/>
-          </a:xfrm>
-          <a:prstGeom prst="rect">
-            <a:avLst/>
-          </a:prstGeom>
-        </p:spPr>
-        <p:txBody>
-          <a:bodyPr vert="horz" lIns="91440" tIns="45720" rIns="91440" bIns="45720" rtlCol="0" anchor="b"/>
-          <a:lstStyle>
-            <a:lvl1pPr algn="r">
-              <a:defRPr sz="1200"/>
-            </a:lvl1pPr>
-          </a:lstStyle>
-          <a:p>
-            <a:fld id="{17FB92C8-A053-EC41-B67A-5C3D8E202184}" type="slidenum">
-              <a:rPr lang="en-US" smtClean="0"/>
-              <a:t>‹#›</a:t>
-            </a:fld>
-            <a:endParaRPr lang="en-US"/>
-          </a:p>
-        </p:txBody>
-      </p:sp>
-    </p:spTree>
-    <p:extLst>
-      <p:ext uri="{BB962C8B-B14F-4D97-AF65-F5344CB8AC3E}">
-        <p14:creationId xmlns:p14="http://schemas.microsoft.com/office/powerpoint/2010/main" val="188507188"/>
-      </p:ext>
-    </p:extLst>
-  </p:cSld>
-  <p:clrMap bg1="lt1" tx1="dk1" bg2="lt2" tx2="dk2" accent1="accent1" accent2="accent2" accent3="accent3" accent4="accent4" accent5="accent5" accent6="accent6" hlink="hlink" folHlink="folHlink"/>
-  <p:notesStyle>
-    <a:lvl1pPr marL="0" algn="l" defTabSz="457200" rtl="0" eaLnBrk="1" latinLnBrk="0" hangingPunct="1">
-      <a:defRPr sz="1200" kern="1200">
-        <a:solidFill>
-          <a:schemeClr val="tx1"/>
-        </a:solidFill>
-        <a:latin typeface="+mn-lt"/>
-        <a:ea typeface="+mn-ea"/>
-        <a:cs typeface="+mn-cs"/>
-      </a:defRPr>
-    </a:lvl1pPr>
-    <a:lvl2pPr marL="457200" algn="l" defTabSz="457200" rtl="0" eaLnBrk="1" latinLnBrk="0" hangingPunct="1">
-      <a:defRPr sz="1200" kern="1200">
-        <a:solidFill>
-          <a:schemeClr val="tx1"/>
-        </a:solidFill>
-        <a:latin typeface="+mn-lt"/>
-        <a:ea typeface="+mn-ea"/>
-        <a:cs typeface="+mn-cs"/>
-      </a:defRPr>
-    </a:lvl2pPr>
-    <a:lvl3pPr marL="914400" algn="l" defTabSz="457200" rtl="0" eaLnBrk="1" latinLnBrk="0" hangingPunct="1">
-      <a:defRPr sz="1200" kern="1200">
-        <a:solidFill>
-          <a:schemeClr val="tx1"/>
-        </a:solidFill>
-        <a:latin typeface="+mn-lt"/>
-        <a:ea typeface="+mn-ea"/>
-        <a:cs typeface="+mn-cs"/>
-      </a:defRPr>
-    </a:lvl3pPr>
-    <a:lvl4pPr marL="1371600" algn="l" defTabSz="457200" rtl="0" eaLnBrk="1" latinLnBrk="0" hangingPunct="1">
-      <a:defRPr sz="1200" kern="1200">
-        <a:solidFill>
-          <a:schemeClr val="tx1"/>
-        </a:solidFill>
-        <a:latin typeface="+mn-lt"/>
-        <a:ea typeface="+mn-ea"/>
-        <a:cs typeface="+mn-cs"/>
-      </a:defRPr>
-    </a:lvl4pPr>
-    <a:lvl5pPr marL="1828800" algn="l" defTabSz="457200" rtl="0" eaLnBrk="1" latinLnBrk="0" hangingPunct="1">
-      <a:defRPr sz="1200" kern="1200">
-        <a:solidFill>
-          <a:schemeClr val="tx1"/>
-        </a:solidFill>
-        <a:latin typeface="+mn-lt"/>
-        <a:ea typeface="+mn-ea"/>
-        <a:cs typeface="+mn-cs"/>
-      </a:defRPr>
-    </a:lvl5pPr>
-    <a:lvl6pPr marL="2286000" algn="l" defTabSz="457200" rtl="0" eaLnBrk="1" latinLnBrk="0" hangingPunct="1">
-      <a:defRPr sz="1200" kern="1200">
-        <a:solidFill>
-          <a:schemeClr val="tx1"/>
-        </a:solidFill>
-        <a:latin typeface="+mn-lt"/>
-        <a:ea typeface="+mn-ea"/>
-        <a:cs typeface="+mn-cs"/>
-      </a:defRPr>
-    </a:lvl6pPr>
-    <a:lvl7pPr marL="2743200" algn="l" defTabSz="457200" rtl="0" eaLnBrk="1" latinLnBrk="0" hangingPunct="1">
-      <a:defRPr sz="1200" kern="1200">
-        <a:solidFill>
-          <a:schemeClr val="tx1"/>
-        </a:solidFill>
-        <a:latin typeface="+mn-lt"/>
-        <a:ea typeface="+mn-ea"/>
-        <a:cs typeface="+mn-cs"/>
-      </a:defRPr>
-    </a:lvl7pPr>
-    <a:lvl8pPr marL="3200400" algn="l" defTabSz="457200" rtl="0" eaLnBrk="1" latinLnBrk="0" hangingPunct="1">
-      <a:defRPr sz="1200" kern="1200">
-        <a:solidFill>
-          <a:schemeClr val="tx1"/>
-        </a:solidFill>
-        <a:latin typeface="+mn-lt"/>
-        <a:ea typeface="+mn-ea"/>
-        <a:cs typeface="+mn-cs"/>
-      </a:defRPr>
-    </a:lvl8pPr>
-    <a:lvl9pPr marL="3657600" algn="l" defTabSz="457200" rtl="0" eaLnBrk="1" latinLnBrk="0" hangingPunct="1">
-      <a:defRPr sz="1200" kern="1200">
-        <a:solidFill>
-          <a:schemeClr val="tx1"/>
-        </a:solidFill>
-        <a:latin typeface="+mn-lt"/>
-        <a:ea typeface="+mn-ea"/>
-        <a:cs typeface="+mn-cs"/>
-      </a:defRPr>
-    </a:lvl9pPr>
-  </p:notesStyle>
-</p:notesMaster>
 </file>
 
 <file path=ppt/slideLayouts/slideLayout1.xml><?xml version="1.0" encoding="utf-8"?>
@@ -516,7 +150,13 @@
       </p:grpSpPr>
       <p:sp>
         <p:nvSpPr>
-          <p:cNvPr id="2" name="Title 1"/>
+          <p:cNvPr id="2" name="Title 1">
+            <a:extLst>
+              <a:ext uri="{FF2B5EF4-FFF2-40B4-BE49-F238E27FC236}">
+                <a16:creationId xmlns:a16="http://schemas.microsoft.com/office/drawing/2014/main" id="{E073DD3B-4082-1B42-B143-D42EC70EEBD8}"/>
+              </a:ext>
+            </a:extLst>
+          </p:cNvPr>
           <p:cNvSpPr>
             <a:spLocks noGrp="1"/>
           </p:cNvSpPr>
@@ -526,25 +166,34 @@
         </p:nvSpPr>
         <p:spPr>
           <a:xfrm>
-            <a:off x="685800" y="2130425"/>
-            <a:ext cx="7772400" cy="1470025"/>
+            <a:off x="1524000" y="1122363"/>
+            <a:ext cx="9144000" cy="2387600"/>
           </a:xfrm>
         </p:spPr>
         <p:txBody>
-          <a:bodyPr/>
-          <a:lstStyle/>
-          <a:p>
-            <a:r>
-              <a:rPr lang="x-none"/>
+          <a:bodyPr anchor="b"/>
+          <a:lstStyle>
+            <a:lvl1pPr algn="ctr">
+              <a:defRPr sz="6000"/>
+            </a:lvl1pPr>
+          </a:lstStyle>
+          <a:p>
+            <a:r>
+              <a:rPr lang="en-US"/>
               <a:t>Click to edit Master title style</a:t>
             </a:r>
-            <a:endParaRPr lang="en-US"/>
-          </a:p>
-        </p:txBody>
-      </p:sp>
-      <p:sp>
-        <p:nvSpPr>
-          <p:cNvPr id="3" name="Subtitle 2"/>
+          </a:p>
+        </p:txBody>
+      </p:sp>
+      <p:sp>
+        <p:nvSpPr>
+          <p:cNvPr id="3" name="Subtitle 2">
+            <a:extLst>
+              <a:ext uri="{FF2B5EF4-FFF2-40B4-BE49-F238E27FC236}">
+                <a16:creationId xmlns:a16="http://schemas.microsoft.com/office/drawing/2014/main" id="{3B5B1ADA-FD44-7948-8E23-BADA1768C944}"/>
+              </a:ext>
+            </a:extLst>
+          </p:cNvPr>
           <p:cNvSpPr>
             <a:spLocks noGrp="1"/>
           </p:cNvSpPr>
@@ -554,8 +203,8 @@
         </p:nvSpPr>
         <p:spPr>
           <a:xfrm>
-            <a:off x="1371600" y="3886200"/>
-            <a:ext cx="6400800" cy="1752600"/>
+            <a:off x="1524000" y="3602038"/>
+            <a:ext cx="9144000" cy="1655762"/>
           </a:xfrm>
         </p:spPr>
         <p:txBody>
@@ -563,107 +212,58 @@
           <a:lstStyle>
             <a:lvl1pPr marL="0" indent="0" algn="ctr">
               <a:buNone/>
-              <a:defRPr>
-                <a:solidFill>
-                  <a:schemeClr val="tx1">
-                    <a:tint val="75000"/>
-                  </a:schemeClr>
-                </a:solidFill>
-              </a:defRPr>
+              <a:defRPr sz="2400"/>
             </a:lvl1pPr>
             <a:lvl2pPr marL="457200" indent="0" algn="ctr">
               <a:buNone/>
-              <a:defRPr>
-                <a:solidFill>
-                  <a:schemeClr val="tx1">
-                    <a:tint val="75000"/>
-                  </a:schemeClr>
-                </a:solidFill>
-              </a:defRPr>
+              <a:defRPr sz="2000"/>
             </a:lvl2pPr>
             <a:lvl3pPr marL="914400" indent="0" algn="ctr">
               <a:buNone/>
-              <a:defRPr>
-                <a:solidFill>
-                  <a:schemeClr val="tx1">
-                    <a:tint val="75000"/>
-                  </a:schemeClr>
-                </a:solidFill>
-              </a:defRPr>
+              <a:defRPr sz="1800"/>
             </a:lvl3pPr>
             <a:lvl4pPr marL="1371600" indent="0" algn="ctr">
               <a:buNone/>
-              <a:defRPr>
-                <a:solidFill>
-                  <a:schemeClr val="tx1">
-                    <a:tint val="75000"/>
-                  </a:schemeClr>
-                </a:solidFill>
-              </a:defRPr>
+              <a:defRPr sz="1600"/>
             </a:lvl4pPr>
             <a:lvl5pPr marL="1828800" indent="0" algn="ctr">
               <a:buNone/>
-              <a:defRPr>
-                <a:solidFill>
-                  <a:schemeClr val="tx1">
-                    <a:tint val="75000"/>
-                  </a:schemeClr>
-                </a:solidFill>
-              </a:defRPr>
+              <a:defRPr sz="1600"/>
             </a:lvl5pPr>
             <a:lvl6pPr marL="2286000" indent="0" algn="ctr">
               <a:buNone/>
-              <a:defRPr>
-                <a:solidFill>
-                  <a:schemeClr val="tx1">
-                    <a:tint val="75000"/>
-                  </a:schemeClr>
-                </a:solidFill>
-              </a:defRPr>
+              <a:defRPr sz="1600"/>
             </a:lvl6pPr>
             <a:lvl7pPr marL="2743200" indent="0" algn="ctr">
               <a:buNone/>
-              <a:defRPr>
-                <a:solidFill>
-                  <a:schemeClr val="tx1">
-                    <a:tint val="75000"/>
-                  </a:schemeClr>
-                </a:solidFill>
-              </a:defRPr>
+              <a:defRPr sz="1600"/>
             </a:lvl7pPr>
             <a:lvl8pPr marL="3200400" indent="0" algn="ctr">
               <a:buNone/>
-              <a:defRPr>
-                <a:solidFill>
-                  <a:schemeClr val="tx1">
-                    <a:tint val="75000"/>
-                  </a:schemeClr>
-                </a:solidFill>
-              </a:defRPr>
+              <a:defRPr sz="1600"/>
             </a:lvl8pPr>
             <a:lvl9pPr marL="3657600" indent="0" algn="ctr">
               <a:buNone/>
-              <a:defRPr>
-                <a:solidFill>
-                  <a:schemeClr val="tx1">
-                    <a:tint val="75000"/>
-                  </a:schemeClr>
-                </a:solidFill>
-              </a:defRPr>
+              <a:defRPr sz="1600"/>
             </a:lvl9pPr>
           </a:lstStyle>
           <a:p>
             <a:r>
-              <a:rPr lang="x-none"/>
+              <a:rPr lang="en-US"/>
               <a:t>Click to edit Master subtitle style</a:t>
             </a:r>
-            <a:endParaRPr lang="en-US"/>
-          </a:p>
-        </p:txBody>
-      </p:sp>
-      <p:sp>
-        <p:nvSpPr>
-          <p:cNvPr id="4" name="Date Placeholder 3"/>
+          </a:p>
+        </p:txBody>
+      </p:sp>
+      <p:sp>
+        <p:nvSpPr>
+          <p:cNvPr id="4" name="Date Placeholder 3">
+            <a:extLst>
+              <a:ext uri="{FF2B5EF4-FFF2-40B4-BE49-F238E27FC236}">
+                <a16:creationId xmlns:a16="http://schemas.microsoft.com/office/drawing/2014/main" id="{B7348AA1-9F8C-8843-96E2-15E0CB440D03}"/>
+              </a:ext>
+            </a:extLst>
+          </p:cNvPr>
           <p:cNvSpPr>
             <a:spLocks noGrp="1"/>
           </p:cNvSpPr>
@@ -676,9 +276,9 @@
           <a:bodyPr/>
           <a:lstStyle/>
           <a:p>
-            <a:fld id="{0675A308-8787-9B42-956E-CA40C2F0F6AE}" type="datetimeFigureOut">
+            <a:fld id="{543EA0BC-44CB-0248-A89B-C226E29B5A5F}" type="datetimeFigureOut">
               <a:rPr lang="en-US" smtClean="0"/>
-              <a:t>1/22/19</a:t>
+              <a:t>3/11/19</a:t>
             </a:fld>
             <a:endParaRPr lang="en-US"/>
           </a:p>
@@ -686,7 +286,13 @@
       </p:sp>
       <p:sp>
         <p:nvSpPr>
-          <p:cNvPr id="5" name="Footer Placeholder 4"/>
+          <p:cNvPr id="5" name="Footer Placeholder 4">
+            <a:extLst>
+              <a:ext uri="{FF2B5EF4-FFF2-40B4-BE49-F238E27FC236}">
+                <a16:creationId xmlns:a16="http://schemas.microsoft.com/office/drawing/2014/main" id="{86055337-F1E7-7646-A864-7D9BD4F3D163}"/>
+              </a:ext>
+            </a:extLst>
+          </p:cNvPr>
           <p:cNvSpPr>
             <a:spLocks noGrp="1"/>
           </p:cNvSpPr>
@@ -705,7 +311,13 @@
       </p:sp>
       <p:sp>
         <p:nvSpPr>
-          <p:cNvPr id="6" name="Slide Number Placeholder 5"/>
+          <p:cNvPr id="6" name="Slide Number Placeholder 5">
+            <a:extLst>
+              <a:ext uri="{FF2B5EF4-FFF2-40B4-BE49-F238E27FC236}">
+                <a16:creationId xmlns:a16="http://schemas.microsoft.com/office/drawing/2014/main" id="{3832D93D-C073-404E-B503-8037A3938005}"/>
+              </a:ext>
+            </a:extLst>
+          </p:cNvPr>
           <p:cNvSpPr>
             <a:spLocks noGrp="1"/>
           </p:cNvSpPr>
@@ -718,7 +330,7 @@
           <a:bodyPr/>
           <a:lstStyle/>
           <a:p>
-            <a:fld id="{667349A5-3503-0648-883D-952D6AF504E3}" type="slidenum">
+            <a:fld id="{C919BC13-7D77-144A-8A42-8BE965DE52FB}" type="slidenum">
               <a:rPr lang="en-US" smtClean="0"/>
               <a:t>‹#›</a:t>
             </a:fld>
@@ -729,7 +341,7 @@
     </p:spTree>
     <p:extLst>
       <p:ext uri="{BB962C8B-B14F-4D97-AF65-F5344CB8AC3E}">
-        <p14:creationId xmlns:p14="http://schemas.microsoft.com/office/powerpoint/2010/main" val="612032234"/>
+        <p14:creationId xmlns:p14="http://schemas.microsoft.com/office/powerpoint/2010/main" val="3323119475"/>
       </p:ext>
     </p:extLst>
   </p:cSld>
@@ -758,7 +370,13 @@
       </p:grpSpPr>
       <p:sp>
         <p:nvSpPr>
-          <p:cNvPr id="2" name="Title 1"/>
+          <p:cNvPr id="2" name="Title 1">
+            <a:extLst>
+              <a:ext uri="{FF2B5EF4-FFF2-40B4-BE49-F238E27FC236}">
+                <a16:creationId xmlns:a16="http://schemas.microsoft.com/office/drawing/2014/main" id="{BDFC0F03-68ED-734C-AC3C-93EC13588464}"/>
+              </a:ext>
+            </a:extLst>
+          </p:cNvPr>
           <p:cNvSpPr>
             <a:spLocks noGrp="1"/>
           </p:cNvSpPr>
@@ -772,16 +390,21 @@
           <a:lstStyle/>
           <a:p>
             <a:r>
-              <a:rPr lang="x-none"/>
+              <a:rPr lang="en-US"/>
               <a:t>Click to edit Master title style</a:t>
             </a:r>
-            <a:endParaRPr lang="en-US"/>
-          </a:p>
-        </p:txBody>
-      </p:sp>
-      <p:sp>
-        <p:nvSpPr>
-          <p:cNvPr id="3" name="Vertical Text Placeholder 2"/>
+          </a:p>
+        </p:txBody>
+      </p:sp>
+      <p:sp>
+        <p:nvSpPr>
+          <p:cNvPr id="3" name="Vertical Text Placeholder 2">
+            <a:extLst>
+              <a:ext uri="{FF2B5EF4-FFF2-40B4-BE49-F238E27FC236}">
+                <a16:creationId xmlns:a16="http://schemas.microsoft.com/office/drawing/2014/main" id="{D8292497-30EE-DA47-88D8-9E0C9197F04D}"/>
+              </a:ext>
+            </a:extLst>
+          </p:cNvPr>
           <p:cNvSpPr>
             <a:spLocks noGrp="1"/>
           </p:cNvSpPr>
@@ -796,44 +419,49 @@
           <a:p>
             <a:pPr lvl="0"/>
             <a:r>
-              <a:rPr lang="x-none"/>
+              <a:rPr lang="en-US"/>
               <a:t>Click to edit Master text styles</a:t>
             </a:r>
           </a:p>
           <a:p>
             <a:pPr lvl="1"/>
             <a:r>
-              <a:rPr lang="x-none"/>
+              <a:rPr lang="en-US"/>
               <a:t>Second level</a:t>
             </a:r>
           </a:p>
           <a:p>
             <a:pPr lvl="2"/>
             <a:r>
-              <a:rPr lang="x-none"/>
+              <a:rPr lang="en-US"/>
               <a:t>Third level</a:t>
             </a:r>
           </a:p>
           <a:p>
             <a:pPr lvl="3"/>
             <a:r>
-              <a:rPr lang="x-none"/>
+              <a:rPr lang="en-US"/>
               <a:t>Fourth level</a:t>
             </a:r>
           </a:p>
           <a:p>
             <a:pPr lvl="4"/>
             <a:r>
-              <a:rPr lang="x-none"/>
+              <a:rPr lang="en-US"/>
               <a:t>Fifth level</a:t>
             </a:r>
-            <a:endParaRPr lang="en-US"/>
-          </a:p>
-        </p:txBody>
-      </p:sp>
-      <p:sp>
-        <p:nvSpPr>
-          <p:cNvPr id="4" name="Date Placeholder 3"/>
+          </a:p>
+        </p:txBody>
+      </p:sp>
+      <p:sp>
+        <p:nvSpPr>
+          <p:cNvPr id="4" name="Date Placeholder 3">
+            <a:extLst>
+              <a:ext uri="{FF2B5EF4-FFF2-40B4-BE49-F238E27FC236}">
+                <a16:creationId xmlns:a16="http://schemas.microsoft.com/office/drawing/2014/main" id="{435D24C7-4C1C-3043-8EC9-50839E70D0D6}"/>
+              </a:ext>
+            </a:extLst>
+          </p:cNvPr>
           <p:cNvSpPr>
             <a:spLocks noGrp="1"/>
           </p:cNvSpPr>
@@ -846,9 +474,9 @@
           <a:bodyPr/>
           <a:lstStyle/>
           <a:p>
-            <a:fld id="{0675A308-8787-9B42-956E-CA40C2F0F6AE}" type="datetimeFigureOut">
+            <a:fld id="{543EA0BC-44CB-0248-A89B-C226E29B5A5F}" type="datetimeFigureOut">
               <a:rPr lang="en-US" smtClean="0"/>
-              <a:t>1/22/19</a:t>
+              <a:t>3/11/19</a:t>
             </a:fld>
             <a:endParaRPr lang="en-US"/>
           </a:p>
@@ -856,7 +484,13 @@
       </p:sp>
       <p:sp>
         <p:nvSpPr>
-          <p:cNvPr id="5" name="Footer Placeholder 4"/>
+          <p:cNvPr id="5" name="Footer Placeholder 4">
+            <a:extLst>
+              <a:ext uri="{FF2B5EF4-FFF2-40B4-BE49-F238E27FC236}">
+                <a16:creationId xmlns:a16="http://schemas.microsoft.com/office/drawing/2014/main" id="{D9B4BDBF-8CF1-604F-850F-49152FF860A5}"/>
+              </a:ext>
+            </a:extLst>
+          </p:cNvPr>
           <p:cNvSpPr>
             <a:spLocks noGrp="1"/>
           </p:cNvSpPr>
@@ -875,7 +509,13 @@
       </p:sp>
       <p:sp>
         <p:nvSpPr>
-          <p:cNvPr id="6" name="Slide Number Placeholder 5"/>
+          <p:cNvPr id="6" name="Slide Number Placeholder 5">
+            <a:extLst>
+              <a:ext uri="{FF2B5EF4-FFF2-40B4-BE49-F238E27FC236}">
+                <a16:creationId xmlns:a16="http://schemas.microsoft.com/office/drawing/2014/main" id="{2996D2C3-B781-2346-A1CD-7F71D770A5DA}"/>
+              </a:ext>
+            </a:extLst>
+          </p:cNvPr>
           <p:cNvSpPr>
             <a:spLocks noGrp="1"/>
           </p:cNvSpPr>
@@ -888,7 +528,7 @@
           <a:bodyPr/>
           <a:lstStyle/>
           <a:p>
-            <a:fld id="{667349A5-3503-0648-883D-952D6AF504E3}" type="slidenum">
+            <a:fld id="{C919BC13-7D77-144A-8A42-8BE965DE52FB}" type="slidenum">
               <a:rPr lang="en-US" smtClean="0"/>
               <a:t>‹#›</a:t>
             </a:fld>
@@ -899,7 +539,7 @@
     </p:spTree>
     <p:extLst>
       <p:ext uri="{BB962C8B-B14F-4D97-AF65-F5344CB8AC3E}">
-        <p14:creationId xmlns:p14="http://schemas.microsoft.com/office/powerpoint/2010/main" val="2214113024"/>
+        <p14:creationId xmlns:p14="http://schemas.microsoft.com/office/powerpoint/2010/main" val="3196085951"/>
       </p:ext>
     </p:extLst>
   </p:cSld>
@@ -928,7 +568,13 @@
       </p:grpSpPr>
       <p:sp>
         <p:nvSpPr>
-          <p:cNvPr id="2" name="Vertical Title 1"/>
+          <p:cNvPr id="2" name="Vertical Title 1">
+            <a:extLst>
+              <a:ext uri="{FF2B5EF4-FFF2-40B4-BE49-F238E27FC236}">
+                <a16:creationId xmlns:a16="http://schemas.microsoft.com/office/drawing/2014/main" id="{4C5EC72D-347B-2740-AE82-60C4F35E2C68}"/>
+              </a:ext>
+            </a:extLst>
+          </p:cNvPr>
           <p:cNvSpPr>
             <a:spLocks noGrp="1"/>
           </p:cNvSpPr>
@@ -938,8 +584,8 @@
         </p:nvSpPr>
         <p:spPr>
           <a:xfrm>
-            <a:off x="6629400" y="274638"/>
-            <a:ext cx="2057400" cy="5851525"/>
+            <a:off x="8724900" y="365125"/>
+            <a:ext cx="2628900" cy="5811838"/>
           </a:xfrm>
         </p:spPr>
         <p:txBody>
@@ -947,16 +593,21 @@
           <a:lstStyle/>
           <a:p>
             <a:r>
-              <a:rPr lang="x-none"/>
+              <a:rPr lang="en-US"/>
               <a:t>Click to edit Master title style</a:t>
             </a:r>
-            <a:endParaRPr lang="en-US"/>
-          </a:p>
-        </p:txBody>
-      </p:sp>
-      <p:sp>
-        <p:nvSpPr>
-          <p:cNvPr id="3" name="Vertical Text Placeholder 2"/>
+          </a:p>
+        </p:txBody>
+      </p:sp>
+      <p:sp>
+        <p:nvSpPr>
+          <p:cNvPr id="3" name="Vertical Text Placeholder 2">
+            <a:extLst>
+              <a:ext uri="{FF2B5EF4-FFF2-40B4-BE49-F238E27FC236}">
+                <a16:creationId xmlns:a16="http://schemas.microsoft.com/office/drawing/2014/main" id="{E7180078-D277-884B-BCC7-83C2BE7BC4F2}"/>
+              </a:ext>
+            </a:extLst>
+          </p:cNvPr>
           <p:cNvSpPr>
             <a:spLocks noGrp="1"/>
           </p:cNvSpPr>
@@ -966,8 +617,8 @@
         </p:nvSpPr>
         <p:spPr>
           <a:xfrm>
-            <a:off x="457200" y="274638"/>
-            <a:ext cx="6019800" cy="5851525"/>
+            <a:off x="838200" y="365125"/>
+            <a:ext cx="7734300" cy="5811838"/>
           </a:xfrm>
         </p:spPr>
         <p:txBody>
@@ -976,44 +627,49 @@
           <a:p>
             <a:pPr lvl="0"/>
             <a:r>
-              <a:rPr lang="x-none"/>
+              <a:rPr lang="en-US"/>
               <a:t>Click to edit Master text styles</a:t>
             </a:r>
           </a:p>
           <a:p>
             <a:pPr lvl="1"/>
             <a:r>
-              <a:rPr lang="x-none"/>
+              <a:rPr lang="en-US"/>
               <a:t>Second level</a:t>
             </a:r>
           </a:p>
           <a:p>
             <a:pPr lvl="2"/>
             <a:r>
-              <a:rPr lang="x-none"/>
+              <a:rPr lang="en-US"/>
               <a:t>Third level</a:t>
             </a:r>
           </a:p>
           <a:p>
             <a:pPr lvl="3"/>
             <a:r>
-              <a:rPr lang="x-none"/>
+              <a:rPr lang="en-US"/>
               <a:t>Fourth level</a:t>
             </a:r>
           </a:p>
           <a:p>
             <a:pPr lvl="4"/>
             <a:r>
-              <a:rPr lang="x-none"/>
+              <a:rPr lang="en-US"/>
               <a:t>Fifth level</a:t>
             </a:r>
-            <a:endParaRPr lang="en-US"/>
-          </a:p>
-        </p:txBody>
-      </p:sp>
-      <p:sp>
-        <p:nvSpPr>
-          <p:cNvPr id="4" name="Date Placeholder 3"/>
+          </a:p>
+        </p:txBody>
+      </p:sp>
+      <p:sp>
+        <p:nvSpPr>
+          <p:cNvPr id="4" name="Date Placeholder 3">
+            <a:extLst>
+              <a:ext uri="{FF2B5EF4-FFF2-40B4-BE49-F238E27FC236}">
+                <a16:creationId xmlns:a16="http://schemas.microsoft.com/office/drawing/2014/main" id="{0046291E-A633-BE43-BAF5-1B0FAA5421AE}"/>
+              </a:ext>
+            </a:extLst>
+          </p:cNvPr>
           <p:cNvSpPr>
             <a:spLocks noGrp="1"/>
           </p:cNvSpPr>
@@ -1026,9 +682,9 @@
           <a:bodyPr/>
           <a:lstStyle/>
           <a:p>
-            <a:fld id="{0675A308-8787-9B42-956E-CA40C2F0F6AE}" type="datetimeFigureOut">
+            <a:fld id="{543EA0BC-44CB-0248-A89B-C226E29B5A5F}" type="datetimeFigureOut">
               <a:rPr lang="en-US" smtClean="0"/>
-              <a:t>1/22/19</a:t>
+              <a:t>3/11/19</a:t>
             </a:fld>
             <a:endParaRPr lang="en-US"/>
           </a:p>
@@ -1036,7 +692,13 @@
       </p:sp>
       <p:sp>
         <p:nvSpPr>
-          <p:cNvPr id="5" name="Footer Placeholder 4"/>
+          <p:cNvPr id="5" name="Footer Placeholder 4">
+            <a:extLst>
+              <a:ext uri="{FF2B5EF4-FFF2-40B4-BE49-F238E27FC236}">
+                <a16:creationId xmlns:a16="http://schemas.microsoft.com/office/drawing/2014/main" id="{E940A3AD-297D-8144-A992-CC7BEF528B18}"/>
+              </a:ext>
+            </a:extLst>
+          </p:cNvPr>
           <p:cNvSpPr>
             <a:spLocks noGrp="1"/>
           </p:cNvSpPr>
@@ -1055,7 +717,13 @@
       </p:sp>
       <p:sp>
         <p:nvSpPr>
-          <p:cNvPr id="6" name="Slide Number Placeholder 5"/>
+          <p:cNvPr id="6" name="Slide Number Placeholder 5">
+            <a:extLst>
+              <a:ext uri="{FF2B5EF4-FFF2-40B4-BE49-F238E27FC236}">
+                <a16:creationId xmlns:a16="http://schemas.microsoft.com/office/drawing/2014/main" id="{71E69039-3BDA-CD4A-9D2E-EFFFCB9F9A13}"/>
+              </a:ext>
+            </a:extLst>
+          </p:cNvPr>
           <p:cNvSpPr>
             <a:spLocks noGrp="1"/>
           </p:cNvSpPr>
@@ -1068,7 +736,7 @@
           <a:bodyPr/>
           <a:lstStyle/>
           <a:p>
-            <a:fld id="{667349A5-3503-0648-883D-952D6AF504E3}" type="slidenum">
+            <a:fld id="{C919BC13-7D77-144A-8A42-8BE965DE52FB}" type="slidenum">
               <a:rPr lang="en-US" smtClean="0"/>
               <a:t>‹#›</a:t>
             </a:fld>
@@ -1079,7 +747,7 @@
     </p:spTree>
     <p:extLst>
       <p:ext uri="{BB962C8B-B14F-4D97-AF65-F5344CB8AC3E}">
-        <p14:creationId xmlns:p14="http://schemas.microsoft.com/office/powerpoint/2010/main" val="3503539498"/>
+        <p14:creationId xmlns:p14="http://schemas.microsoft.com/office/powerpoint/2010/main" val="3827132236"/>
       </p:ext>
     </p:extLst>
   </p:cSld>
@@ -1108,7 +776,13 @@
       </p:grpSpPr>
       <p:sp>
         <p:nvSpPr>
-          <p:cNvPr id="2" name="Title 1"/>
+          <p:cNvPr id="2" name="Title 1">
+            <a:extLst>
+              <a:ext uri="{FF2B5EF4-FFF2-40B4-BE49-F238E27FC236}">
+                <a16:creationId xmlns:a16="http://schemas.microsoft.com/office/drawing/2014/main" id="{680DEFFB-6F01-B64B-84E4-D62B06CAEB8E}"/>
+              </a:ext>
+            </a:extLst>
+          </p:cNvPr>
           <p:cNvSpPr>
             <a:spLocks noGrp="1"/>
           </p:cNvSpPr>
@@ -1122,16 +796,21 @@
           <a:lstStyle/>
           <a:p>
             <a:r>
-              <a:rPr lang="x-none"/>
+              <a:rPr lang="en-US"/>
               <a:t>Click to edit Master title style</a:t>
             </a:r>
-            <a:endParaRPr lang="en-US"/>
-          </a:p>
-        </p:txBody>
-      </p:sp>
-      <p:sp>
-        <p:nvSpPr>
-          <p:cNvPr id="3" name="Content Placeholder 2"/>
+          </a:p>
+        </p:txBody>
+      </p:sp>
+      <p:sp>
+        <p:nvSpPr>
+          <p:cNvPr id="3" name="Content Placeholder 2">
+            <a:extLst>
+              <a:ext uri="{FF2B5EF4-FFF2-40B4-BE49-F238E27FC236}">
+                <a16:creationId xmlns:a16="http://schemas.microsoft.com/office/drawing/2014/main" id="{CD1728E6-2982-B546-B651-9F591357AA08}"/>
+              </a:ext>
+            </a:extLst>
+          </p:cNvPr>
           <p:cNvSpPr>
             <a:spLocks noGrp="1"/>
           </p:cNvSpPr>
@@ -1146,44 +825,49 @@
           <a:p>
             <a:pPr lvl="0"/>
             <a:r>
-              <a:rPr lang="x-none"/>
+              <a:rPr lang="en-US"/>
               <a:t>Click to edit Master text styles</a:t>
             </a:r>
           </a:p>
           <a:p>
             <a:pPr lvl="1"/>
             <a:r>
-              <a:rPr lang="x-none"/>
+              <a:rPr lang="en-US"/>
               <a:t>Second level</a:t>
             </a:r>
           </a:p>
           <a:p>
             <a:pPr lvl="2"/>
             <a:r>
-              <a:rPr lang="x-none"/>
+              <a:rPr lang="en-US"/>
               <a:t>Third level</a:t>
             </a:r>
           </a:p>
           <a:p>
             <a:pPr lvl="3"/>
             <a:r>
-              <a:rPr lang="x-none"/>
+              <a:rPr lang="en-US"/>
               <a:t>Fourth level</a:t>
             </a:r>
           </a:p>
           <a:p>
             <a:pPr lvl="4"/>
             <a:r>
-              <a:rPr lang="x-none"/>
+              <a:rPr lang="en-US"/>
               <a:t>Fifth level</a:t>
             </a:r>
-            <a:endParaRPr lang="en-US"/>
-          </a:p>
-        </p:txBody>
-      </p:sp>
-      <p:sp>
-        <p:nvSpPr>
-          <p:cNvPr id="4" name="Date Placeholder 3"/>
+          </a:p>
+        </p:txBody>
+      </p:sp>
+      <p:sp>
+        <p:nvSpPr>
+          <p:cNvPr id="4" name="Date Placeholder 3">
+            <a:extLst>
+              <a:ext uri="{FF2B5EF4-FFF2-40B4-BE49-F238E27FC236}">
+                <a16:creationId xmlns:a16="http://schemas.microsoft.com/office/drawing/2014/main" id="{0CE49CDE-5D64-3642-8CBB-F89B3E8F99C8}"/>
+              </a:ext>
+            </a:extLst>
+          </p:cNvPr>
           <p:cNvSpPr>
             <a:spLocks noGrp="1"/>
           </p:cNvSpPr>
@@ -1196,9 +880,9 @@
           <a:bodyPr/>
           <a:lstStyle/>
           <a:p>
-            <a:fld id="{0675A308-8787-9B42-956E-CA40C2F0F6AE}" type="datetimeFigureOut">
+            <a:fld id="{543EA0BC-44CB-0248-A89B-C226E29B5A5F}" type="datetimeFigureOut">
               <a:rPr lang="en-US" smtClean="0"/>
-              <a:t>1/22/19</a:t>
+              <a:t>3/11/19</a:t>
             </a:fld>
             <a:endParaRPr lang="en-US"/>
           </a:p>
@@ -1206,7 +890,13 @@
       </p:sp>
       <p:sp>
         <p:nvSpPr>
-          <p:cNvPr id="5" name="Footer Placeholder 4"/>
+          <p:cNvPr id="5" name="Footer Placeholder 4">
+            <a:extLst>
+              <a:ext uri="{FF2B5EF4-FFF2-40B4-BE49-F238E27FC236}">
+                <a16:creationId xmlns:a16="http://schemas.microsoft.com/office/drawing/2014/main" id="{24E72876-452A-0540-90A4-44604914ABFF}"/>
+              </a:ext>
+            </a:extLst>
+          </p:cNvPr>
           <p:cNvSpPr>
             <a:spLocks noGrp="1"/>
           </p:cNvSpPr>
@@ -1225,7 +915,13 @@
       </p:sp>
       <p:sp>
         <p:nvSpPr>
-          <p:cNvPr id="6" name="Slide Number Placeholder 5"/>
+          <p:cNvPr id="6" name="Slide Number Placeholder 5">
+            <a:extLst>
+              <a:ext uri="{FF2B5EF4-FFF2-40B4-BE49-F238E27FC236}">
+                <a16:creationId xmlns:a16="http://schemas.microsoft.com/office/drawing/2014/main" id="{E8589413-0B3B-A248-8E7B-9101285181CD}"/>
+              </a:ext>
+            </a:extLst>
+          </p:cNvPr>
           <p:cNvSpPr>
             <a:spLocks noGrp="1"/>
           </p:cNvSpPr>
@@ -1238,7 +934,7 @@
           <a:bodyPr/>
           <a:lstStyle/>
           <a:p>
-            <a:fld id="{667349A5-3503-0648-883D-952D6AF504E3}" type="slidenum">
+            <a:fld id="{C919BC13-7D77-144A-8A42-8BE965DE52FB}" type="slidenum">
               <a:rPr lang="en-US" smtClean="0"/>
               <a:t>‹#›</a:t>
             </a:fld>
@@ -1249,7 +945,7 @@
     </p:spTree>
     <p:extLst>
       <p:ext uri="{BB962C8B-B14F-4D97-AF65-F5344CB8AC3E}">
-        <p14:creationId xmlns:p14="http://schemas.microsoft.com/office/powerpoint/2010/main" val="1493754000"/>
+        <p14:creationId xmlns:p14="http://schemas.microsoft.com/office/powerpoint/2010/main" val="3925165295"/>
       </p:ext>
     </p:extLst>
   </p:cSld>
@@ -1278,7 +974,13 @@
       </p:grpSpPr>
       <p:sp>
         <p:nvSpPr>
-          <p:cNvPr id="2" name="Title 1"/>
+          <p:cNvPr id="2" name="Title 1">
+            <a:extLst>
+              <a:ext uri="{FF2B5EF4-FFF2-40B4-BE49-F238E27FC236}">
+                <a16:creationId xmlns:a16="http://schemas.microsoft.com/office/drawing/2014/main" id="{F30815C2-0F5A-4A4B-A7D7-0BAAFA14CFEA}"/>
+              </a:ext>
+            </a:extLst>
+          </p:cNvPr>
           <p:cNvSpPr>
             <a:spLocks noGrp="1"/>
           </p:cNvSpPr>
@@ -1288,29 +990,34 @@
         </p:nvSpPr>
         <p:spPr>
           <a:xfrm>
-            <a:off x="722313" y="4406900"/>
-            <a:ext cx="7772400" cy="1362075"/>
+            <a:off x="831850" y="1709738"/>
+            <a:ext cx="10515600" cy="2852737"/>
           </a:xfrm>
         </p:spPr>
         <p:txBody>
-          <a:bodyPr anchor="t"/>
+          <a:bodyPr anchor="b"/>
           <a:lstStyle>
-            <a:lvl1pPr algn="l">
-              <a:defRPr sz="4000" b="1" cap="all"/>
+            <a:lvl1pPr>
+              <a:defRPr sz="6000"/>
             </a:lvl1pPr>
           </a:lstStyle>
           <a:p>
             <a:r>
-              <a:rPr lang="x-none"/>
+              <a:rPr lang="en-US"/>
               <a:t>Click to edit Master title style</a:t>
             </a:r>
-            <a:endParaRPr lang="en-US"/>
-          </a:p>
-        </p:txBody>
-      </p:sp>
-      <p:sp>
-        <p:nvSpPr>
-          <p:cNvPr id="3" name="Text Placeholder 2"/>
+          </a:p>
+        </p:txBody>
+      </p:sp>
+      <p:sp>
+        <p:nvSpPr>
+          <p:cNvPr id="3" name="Text Placeholder 2">
+            <a:extLst>
+              <a:ext uri="{FF2B5EF4-FFF2-40B4-BE49-F238E27FC236}">
+                <a16:creationId xmlns:a16="http://schemas.microsoft.com/office/drawing/2014/main" id="{B6111BD0-22F3-4D4F-B241-4FF4E90B2BEB}"/>
+              </a:ext>
+            </a:extLst>
+          </p:cNvPr>
           <p:cNvSpPr>
             <a:spLocks noGrp="1"/>
           </p:cNvSpPr>
@@ -1320,16 +1027,16 @@
         </p:nvSpPr>
         <p:spPr>
           <a:xfrm>
-            <a:off x="722313" y="2906713"/>
-            <a:ext cx="7772400" cy="1500187"/>
+            <a:off x="831850" y="4589463"/>
+            <a:ext cx="10515600" cy="1500187"/>
           </a:xfrm>
         </p:spPr>
         <p:txBody>
-          <a:bodyPr anchor="b"/>
+          <a:bodyPr/>
           <a:lstStyle>
             <a:lvl1pPr marL="0" indent="0">
               <a:buNone/>
-              <a:defRPr sz="2000">
+              <a:defRPr sz="2400">
                 <a:solidFill>
                   <a:schemeClr val="tx1">
                     <a:tint val="75000"/>
@@ -1339,7 +1046,7 @@
             </a:lvl1pPr>
             <a:lvl2pPr marL="457200" indent="0">
               <a:buNone/>
-              <a:defRPr sz="1800">
+              <a:defRPr sz="2000">
                 <a:solidFill>
                   <a:schemeClr val="tx1">
                     <a:tint val="75000"/>
@@ -1349,7 +1056,7 @@
             </a:lvl2pPr>
             <a:lvl3pPr marL="914400" indent="0">
               <a:buNone/>
-              <a:defRPr sz="1600">
+              <a:defRPr sz="1800">
                 <a:solidFill>
                   <a:schemeClr val="tx1">
                     <a:tint val="75000"/>
@@ -1359,7 +1066,7 @@
             </a:lvl3pPr>
             <a:lvl4pPr marL="1371600" indent="0">
               <a:buNone/>
-              <a:defRPr sz="1400">
+              <a:defRPr sz="1600">
                 <a:solidFill>
                   <a:schemeClr val="tx1">
                     <a:tint val="75000"/>
@@ -1369,7 +1076,7 @@
             </a:lvl4pPr>
             <a:lvl5pPr marL="1828800" indent="0">
               <a:buNone/>
-              <a:defRPr sz="1400">
+              <a:defRPr sz="1600">
                 <a:solidFill>
                   <a:schemeClr val="tx1">
                     <a:tint val="75000"/>
@@ -1379,7 +1086,7 @@
             </a:lvl5pPr>
             <a:lvl6pPr marL="2286000" indent="0">
               <a:buNone/>
-              <a:defRPr sz="1400">
+              <a:defRPr sz="1600">
                 <a:solidFill>
                   <a:schemeClr val="tx1">
                     <a:tint val="75000"/>
@@ -1389,7 +1096,7 @@
             </a:lvl6pPr>
             <a:lvl7pPr marL="2743200" indent="0">
               <a:buNone/>
-              <a:defRPr sz="1400">
+              <a:defRPr sz="1600">
                 <a:solidFill>
                   <a:schemeClr val="tx1">
                     <a:tint val="75000"/>
@@ -1399,7 +1106,7 @@
             </a:lvl7pPr>
             <a:lvl8pPr marL="3200400" indent="0">
               <a:buNone/>
-              <a:defRPr sz="1400">
+              <a:defRPr sz="1600">
                 <a:solidFill>
                   <a:schemeClr val="tx1">
                     <a:tint val="75000"/>
@@ -1409,7 +1116,7 @@
             </a:lvl8pPr>
             <a:lvl9pPr marL="3657600" indent="0">
               <a:buNone/>
-              <a:defRPr sz="1400">
+              <a:defRPr sz="1600">
                 <a:solidFill>
                   <a:schemeClr val="tx1">
                     <a:tint val="75000"/>
@@ -1421,7 +1128,7 @@
           <a:p>
             <a:pPr lvl="0"/>
             <a:r>
-              <a:rPr lang="x-none"/>
+              <a:rPr lang="en-US"/>
               <a:t>Click to edit Master text styles</a:t>
             </a:r>
           </a:p>
@@ -1429,7 +1136,13 @@
       </p:sp>
       <p:sp>
         <p:nvSpPr>
-          <p:cNvPr id="4" name="Date Placeholder 3"/>
+          <p:cNvPr id="4" name="Date Placeholder 3">
+            <a:extLst>
+              <a:ext uri="{FF2B5EF4-FFF2-40B4-BE49-F238E27FC236}">
+                <a16:creationId xmlns:a16="http://schemas.microsoft.com/office/drawing/2014/main" id="{547E6F00-6A7C-CF43-8CBB-6208BC52168E}"/>
+              </a:ext>
+            </a:extLst>
+          </p:cNvPr>
           <p:cNvSpPr>
             <a:spLocks noGrp="1"/>
           </p:cNvSpPr>
@@ -1442,9 +1155,9 @@
           <a:bodyPr/>
           <a:lstStyle/>
           <a:p>
-            <a:fld id="{0675A308-8787-9B42-956E-CA40C2F0F6AE}" type="datetimeFigureOut">
+            <a:fld id="{543EA0BC-44CB-0248-A89B-C226E29B5A5F}" type="datetimeFigureOut">
               <a:rPr lang="en-US" smtClean="0"/>
-              <a:t>1/22/19</a:t>
+              <a:t>3/11/19</a:t>
             </a:fld>
             <a:endParaRPr lang="en-US"/>
           </a:p>
@@ -1452,7 +1165,13 @@
       </p:sp>
       <p:sp>
         <p:nvSpPr>
-          <p:cNvPr id="5" name="Footer Placeholder 4"/>
+          <p:cNvPr id="5" name="Footer Placeholder 4">
+            <a:extLst>
+              <a:ext uri="{FF2B5EF4-FFF2-40B4-BE49-F238E27FC236}">
+                <a16:creationId xmlns:a16="http://schemas.microsoft.com/office/drawing/2014/main" id="{440814CA-AD96-7340-9838-7B22E3E28CA4}"/>
+              </a:ext>
+            </a:extLst>
+          </p:cNvPr>
           <p:cNvSpPr>
             <a:spLocks noGrp="1"/>
           </p:cNvSpPr>
@@ -1471,7 +1190,13 @@
       </p:sp>
       <p:sp>
         <p:nvSpPr>
-          <p:cNvPr id="6" name="Slide Number Placeholder 5"/>
+          <p:cNvPr id="6" name="Slide Number Placeholder 5">
+            <a:extLst>
+              <a:ext uri="{FF2B5EF4-FFF2-40B4-BE49-F238E27FC236}">
+                <a16:creationId xmlns:a16="http://schemas.microsoft.com/office/drawing/2014/main" id="{414965EE-8CB3-124E-89EB-F05CC41EFEC7}"/>
+              </a:ext>
+            </a:extLst>
+          </p:cNvPr>
           <p:cNvSpPr>
             <a:spLocks noGrp="1"/>
           </p:cNvSpPr>
@@ -1484,7 +1209,7 @@
           <a:bodyPr/>
           <a:lstStyle/>
           <a:p>
-            <a:fld id="{667349A5-3503-0648-883D-952D6AF504E3}" type="slidenum">
+            <a:fld id="{C919BC13-7D77-144A-8A42-8BE965DE52FB}" type="slidenum">
               <a:rPr lang="en-US" smtClean="0"/>
               <a:t>‹#›</a:t>
             </a:fld>
@@ -1495,7 +1220,7 @@
     </p:spTree>
     <p:extLst>
       <p:ext uri="{BB962C8B-B14F-4D97-AF65-F5344CB8AC3E}">
-        <p14:creationId xmlns:p14="http://schemas.microsoft.com/office/powerpoint/2010/main" val="3194992232"/>
+        <p14:creationId xmlns:p14="http://schemas.microsoft.com/office/powerpoint/2010/main" val="2085710050"/>
       </p:ext>
     </p:extLst>
   </p:cSld>
@@ -1524,7 +1249,13 @@
       </p:grpSpPr>
       <p:sp>
         <p:nvSpPr>
-          <p:cNvPr id="2" name="Title 1"/>
+          <p:cNvPr id="2" name="Title 1">
+            <a:extLst>
+              <a:ext uri="{FF2B5EF4-FFF2-40B4-BE49-F238E27FC236}">
+                <a16:creationId xmlns:a16="http://schemas.microsoft.com/office/drawing/2014/main" id="{FE35A699-2D06-4049-81A8-D6E1BE25283A}"/>
+              </a:ext>
+            </a:extLst>
+          </p:cNvPr>
           <p:cNvSpPr>
             <a:spLocks noGrp="1"/>
           </p:cNvSpPr>
@@ -1538,16 +1269,21 @@
           <a:lstStyle/>
           <a:p>
             <a:r>
-              <a:rPr lang="x-none"/>
+              <a:rPr lang="en-US"/>
               <a:t>Click to edit Master title style</a:t>
             </a:r>
-            <a:endParaRPr lang="en-US"/>
-          </a:p>
-        </p:txBody>
-      </p:sp>
-      <p:sp>
-        <p:nvSpPr>
-          <p:cNvPr id="3" name="Content Placeholder 2"/>
+          </a:p>
+        </p:txBody>
+      </p:sp>
+      <p:sp>
+        <p:nvSpPr>
+          <p:cNvPr id="3" name="Content Placeholder 2">
+            <a:extLst>
+              <a:ext uri="{FF2B5EF4-FFF2-40B4-BE49-F238E27FC236}">
+                <a16:creationId xmlns:a16="http://schemas.microsoft.com/office/drawing/2014/main" id="{E8837847-6CEB-0D48-8199-ABEABAFE9EB9}"/>
+              </a:ext>
+            </a:extLst>
+          </p:cNvPr>
           <p:cNvSpPr>
             <a:spLocks noGrp="1"/>
           </p:cNvSpPr>
@@ -1557,82 +1293,59 @@
         </p:nvSpPr>
         <p:spPr>
           <a:xfrm>
-            <a:off x="457200" y="1600200"/>
-            <a:ext cx="4038600" cy="4525963"/>
+            <a:off x="838200" y="1825625"/>
+            <a:ext cx="5181600" cy="4351338"/>
           </a:xfrm>
         </p:spPr>
         <p:txBody>
           <a:bodyPr/>
-          <a:lstStyle>
-            <a:lvl1pPr>
-              <a:defRPr sz="2800"/>
-            </a:lvl1pPr>
-            <a:lvl2pPr>
-              <a:defRPr sz="2400"/>
-            </a:lvl2pPr>
-            <a:lvl3pPr>
-              <a:defRPr sz="2000"/>
-            </a:lvl3pPr>
-            <a:lvl4pPr>
-              <a:defRPr sz="1800"/>
-            </a:lvl4pPr>
-            <a:lvl5pPr>
-              <a:defRPr sz="1800"/>
-            </a:lvl5pPr>
-            <a:lvl6pPr>
-              <a:defRPr sz="1800"/>
-            </a:lvl6pPr>
-            <a:lvl7pPr>
-              <a:defRPr sz="1800"/>
-            </a:lvl7pPr>
-            <a:lvl8pPr>
-              <a:defRPr sz="1800"/>
-            </a:lvl8pPr>
-            <a:lvl9pPr>
-              <a:defRPr sz="1800"/>
-            </a:lvl9pPr>
-          </a:lstStyle>
+          <a:lstStyle/>
           <a:p>
             <a:pPr lvl="0"/>
             <a:r>
-              <a:rPr lang="x-none"/>
+              <a:rPr lang="en-US"/>
               <a:t>Click to edit Master text styles</a:t>
             </a:r>
           </a:p>
           <a:p>
             <a:pPr lvl="1"/>
             <a:r>
-              <a:rPr lang="x-none"/>
+              <a:rPr lang="en-US"/>
               <a:t>Second level</a:t>
             </a:r>
           </a:p>
           <a:p>
             <a:pPr lvl="2"/>
             <a:r>
-              <a:rPr lang="x-none"/>
+              <a:rPr lang="en-US"/>
               <a:t>Third level</a:t>
             </a:r>
           </a:p>
           <a:p>
             <a:pPr lvl="3"/>
             <a:r>
-              <a:rPr lang="x-none"/>
+              <a:rPr lang="en-US"/>
               <a:t>Fourth level</a:t>
             </a:r>
           </a:p>
           <a:p>
             <a:pPr lvl="4"/>
             <a:r>
-              <a:rPr lang="x-none"/>
+              <a:rPr lang="en-US"/>
               <a:t>Fifth level</a:t>
             </a:r>
-            <a:endParaRPr lang="en-US"/>
-          </a:p>
-        </p:txBody>
-      </p:sp>
-      <p:sp>
-        <p:nvSpPr>
-          <p:cNvPr id="4" name="Content Placeholder 3"/>
+          </a:p>
+        </p:txBody>
+      </p:sp>
+      <p:sp>
+        <p:nvSpPr>
+          <p:cNvPr id="4" name="Content Placeholder 3">
+            <a:extLst>
+              <a:ext uri="{FF2B5EF4-FFF2-40B4-BE49-F238E27FC236}">
+                <a16:creationId xmlns:a16="http://schemas.microsoft.com/office/drawing/2014/main" id="{E1D80007-CB85-A24E-90C9-23B33690F9C9}"/>
+              </a:ext>
+            </a:extLst>
+          </p:cNvPr>
           <p:cNvSpPr>
             <a:spLocks noGrp="1"/>
           </p:cNvSpPr>
@@ -1642,82 +1355,59 @@
         </p:nvSpPr>
         <p:spPr>
           <a:xfrm>
-            <a:off x="4648200" y="1600200"/>
-            <a:ext cx="4038600" cy="4525963"/>
+            <a:off x="6172200" y="1825625"/>
+            <a:ext cx="5181600" cy="4351338"/>
           </a:xfrm>
         </p:spPr>
         <p:txBody>
           <a:bodyPr/>
-          <a:lstStyle>
-            <a:lvl1pPr>
-              <a:defRPr sz="2800"/>
-            </a:lvl1pPr>
-            <a:lvl2pPr>
-              <a:defRPr sz="2400"/>
-            </a:lvl2pPr>
-            <a:lvl3pPr>
-              <a:defRPr sz="2000"/>
-            </a:lvl3pPr>
-            <a:lvl4pPr>
-              <a:defRPr sz="1800"/>
-            </a:lvl4pPr>
-            <a:lvl5pPr>
-              <a:defRPr sz="1800"/>
-            </a:lvl5pPr>
-            <a:lvl6pPr>
-              <a:defRPr sz="1800"/>
-            </a:lvl6pPr>
-            <a:lvl7pPr>
-              <a:defRPr sz="1800"/>
-            </a:lvl7pPr>
-            <a:lvl8pPr>
-              <a:defRPr sz="1800"/>
-            </a:lvl8pPr>
-            <a:lvl9pPr>
-              <a:defRPr sz="1800"/>
-            </a:lvl9pPr>
-          </a:lstStyle>
+          <a:lstStyle/>
           <a:p>
             <a:pPr lvl="0"/>
             <a:r>
-              <a:rPr lang="x-none"/>
+              <a:rPr lang="en-US"/>
               <a:t>Click to edit Master text styles</a:t>
             </a:r>
           </a:p>
           <a:p>
             <a:pPr lvl="1"/>
             <a:r>
-              <a:rPr lang="x-none"/>
+              <a:rPr lang="en-US"/>
               <a:t>Second level</a:t>
             </a:r>
           </a:p>
           <a:p>
             <a:pPr lvl="2"/>
             <a:r>
-              <a:rPr lang="x-none"/>
+              <a:rPr lang="en-US"/>
               <a:t>Third level</a:t>
             </a:r>
           </a:p>
           <a:p>
             <a:pPr lvl="3"/>
             <a:r>
-              <a:rPr lang="x-none"/>
+              <a:rPr lang="en-US"/>
               <a:t>Fourth level</a:t>
             </a:r>
           </a:p>
           <a:p>
             <a:pPr lvl="4"/>
             <a:r>
-              <a:rPr lang="x-none"/>
+              <a:rPr lang="en-US"/>
               <a:t>Fifth level</a:t>
             </a:r>
-            <a:endParaRPr lang="en-US"/>
-          </a:p>
-        </p:txBody>
-      </p:sp>
-      <p:sp>
-        <p:nvSpPr>
-          <p:cNvPr id="5" name="Date Placeholder 4"/>
+          </a:p>
+        </p:txBody>
+      </p:sp>
+      <p:sp>
+        <p:nvSpPr>
+          <p:cNvPr id="5" name="Date Placeholder 4">
+            <a:extLst>
+              <a:ext uri="{FF2B5EF4-FFF2-40B4-BE49-F238E27FC236}">
+                <a16:creationId xmlns:a16="http://schemas.microsoft.com/office/drawing/2014/main" id="{26E532FA-EC72-264F-8509-5F41BEFF471C}"/>
+              </a:ext>
+            </a:extLst>
+          </p:cNvPr>
           <p:cNvSpPr>
             <a:spLocks noGrp="1"/>
           </p:cNvSpPr>
@@ -1730,9 +1420,9 @@
           <a:bodyPr/>
           <a:lstStyle/>
           <a:p>
-            <a:fld id="{0675A308-8787-9B42-956E-CA40C2F0F6AE}" type="datetimeFigureOut">
+            <a:fld id="{543EA0BC-44CB-0248-A89B-C226E29B5A5F}" type="datetimeFigureOut">
               <a:rPr lang="en-US" smtClean="0"/>
-              <a:t>1/22/19</a:t>
+              <a:t>3/11/19</a:t>
             </a:fld>
             <a:endParaRPr lang="en-US"/>
           </a:p>
@@ -1740,7 +1430,13 @@
       </p:sp>
       <p:sp>
         <p:nvSpPr>
-          <p:cNvPr id="6" name="Footer Placeholder 5"/>
+          <p:cNvPr id="6" name="Footer Placeholder 5">
+            <a:extLst>
+              <a:ext uri="{FF2B5EF4-FFF2-40B4-BE49-F238E27FC236}">
+                <a16:creationId xmlns:a16="http://schemas.microsoft.com/office/drawing/2014/main" id="{0CBE3186-3824-9943-9B98-BD13FD550D13}"/>
+              </a:ext>
+            </a:extLst>
+          </p:cNvPr>
           <p:cNvSpPr>
             <a:spLocks noGrp="1"/>
           </p:cNvSpPr>
@@ -1759,7 +1455,13 @@
       </p:sp>
       <p:sp>
         <p:nvSpPr>
-          <p:cNvPr id="7" name="Slide Number Placeholder 6"/>
+          <p:cNvPr id="7" name="Slide Number Placeholder 6">
+            <a:extLst>
+              <a:ext uri="{FF2B5EF4-FFF2-40B4-BE49-F238E27FC236}">
+                <a16:creationId xmlns:a16="http://schemas.microsoft.com/office/drawing/2014/main" id="{DEF2FA9D-7C47-6C4D-BB1B-2DFE65DC1139}"/>
+              </a:ext>
+            </a:extLst>
+          </p:cNvPr>
           <p:cNvSpPr>
             <a:spLocks noGrp="1"/>
           </p:cNvSpPr>
@@ -1772,7 +1474,7 @@
           <a:bodyPr/>
           <a:lstStyle/>
           <a:p>
-            <a:fld id="{667349A5-3503-0648-883D-952D6AF504E3}" type="slidenum">
+            <a:fld id="{C919BC13-7D77-144A-8A42-8BE965DE52FB}" type="slidenum">
               <a:rPr lang="en-US" smtClean="0"/>
               <a:t>‹#›</a:t>
             </a:fld>
@@ -1783,7 +1485,7 @@
     </p:spTree>
     <p:extLst>
       <p:ext uri="{BB962C8B-B14F-4D97-AF65-F5344CB8AC3E}">
-        <p14:creationId xmlns:p14="http://schemas.microsoft.com/office/powerpoint/2010/main" val="640341477"/>
+        <p14:creationId xmlns:p14="http://schemas.microsoft.com/office/powerpoint/2010/main" val="3472377842"/>
       </p:ext>
     </p:extLst>
   </p:cSld>
@@ -1812,45 +1514,57 @@
       </p:grpSpPr>
       <p:sp>
         <p:nvSpPr>
-          <p:cNvPr id="2" name="Title 1"/>
+          <p:cNvPr id="2" name="Title 1">
+            <a:extLst>
+              <a:ext uri="{FF2B5EF4-FFF2-40B4-BE49-F238E27FC236}">
+                <a16:creationId xmlns:a16="http://schemas.microsoft.com/office/drawing/2014/main" id="{89DA7852-5257-454A-92D8-2593962FDF3B}"/>
+              </a:ext>
+            </a:extLst>
+          </p:cNvPr>
           <p:cNvSpPr>
             <a:spLocks noGrp="1"/>
           </p:cNvSpPr>
           <p:nvPr>
             <p:ph type="title"/>
-          </p:nvPr>
-        </p:nvSpPr>
-        <p:spPr/>
-        <p:txBody>
-          <a:bodyPr/>
-          <a:lstStyle>
-            <a:lvl1pPr>
-              <a:defRPr/>
-            </a:lvl1pPr>
-          </a:lstStyle>
-          <a:p>
-            <a:r>
-              <a:rPr lang="x-none"/>
-              <a:t>Click to edit Master title style</a:t>
-            </a:r>
-            <a:endParaRPr lang="en-US"/>
-          </a:p>
-        </p:txBody>
-      </p:sp>
-      <p:sp>
-        <p:nvSpPr>
-          <p:cNvPr id="3" name="Text Placeholder 2"/>
-          <p:cNvSpPr>
-            <a:spLocks noGrp="1"/>
-          </p:cNvSpPr>
-          <p:nvPr>
-            <p:ph type="body" idx="1"/>
           </p:nvPr>
         </p:nvSpPr>
         <p:spPr>
           <a:xfrm>
-            <a:off x="457200" y="1535113"/>
-            <a:ext cx="4040188" cy="639762"/>
+            <a:off x="839788" y="365125"/>
+            <a:ext cx="10515600" cy="1325563"/>
+          </a:xfrm>
+        </p:spPr>
+        <p:txBody>
+          <a:bodyPr/>
+          <a:lstStyle/>
+          <a:p>
+            <a:r>
+              <a:rPr lang="en-US"/>
+              <a:t>Click to edit Master title style</a:t>
+            </a:r>
+          </a:p>
+        </p:txBody>
+      </p:sp>
+      <p:sp>
+        <p:nvSpPr>
+          <p:cNvPr id="3" name="Text Placeholder 2">
+            <a:extLst>
+              <a:ext uri="{FF2B5EF4-FFF2-40B4-BE49-F238E27FC236}">
+                <a16:creationId xmlns:a16="http://schemas.microsoft.com/office/drawing/2014/main" id="{F6EAA5A4-C9BD-4344-A369-710937AEEC14}"/>
+              </a:ext>
+            </a:extLst>
+          </p:cNvPr>
+          <p:cNvSpPr>
+            <a:spLocks noGrp="1"/>
+          </p:cNvSpPr>
+          <p:nvPr>
+            <p:ph type="body" idx="1"/>
+          </p:nvPr>
+        </p:nvSpPr>
+        <p:spPr>
+          <a:xfrm>
+            <a:off x="839788" y="1681163"/>
+            <a:ext cx="5157787" cy="823912"/>
           </a:xfrm>
         </p:spPr>
         <p:txBody>
@@ -1896,7 +1610,7 @@
           <a:p>
             <a:pPr lvl="0"/>
             <a:r>
-              <a:rPr lang="x-none"/>
+              <a:rPr lang="en-US"/>
               <a:t>Click to edit Master text styles</a:t>
             </a:r>
           </a:p>
@@ -1904,7 +1618,13 @@
       </p:sp>
       <p:sp>
         <p:nvSpPr>
-          <p:cNvPr id="4" name="Content Placeholder 3"/>
+          <p:cNvPr id="4" name="Content Placeholder 3">
+            <a:extLst>
+              <a:ext uri="{FF2B5EF4-FFF2-40B4-BE49-F238E27FC236}">
+                <a16:creationId xmlns:a16="http://schemas.microsoft.com/office/drawing/2014/main" id="{BDAAAC04-F415-D941-A2C2-88D901B302E7}"/>
+              </a:ext>
+            </a:extLst>
+          </p:cNvPr>
           <p:cNvSpPr>
             <a:spLocks noGrp="1"/>
           </p:cNvSpPr>
@@ -1914,82 +1634,59 @@
         </p:nvSpPr>
         <p:spPr>
           <a:xfrm>
-            <a:off x="457200" y="2174875"/>
-            <a:ext cx="4040188" cy="3951288"/>
+            <a:off x="839788" y="2505075"/>
+            <a:ext cx="5157787" cy="3684588"/>
           </a:xfrm>
         </p:spPr>
         <p:txBody>
           <a:bodyPr/>
-          <a:lstStyle>
-            <a:lvl1pPr>
-              <a:defRPr sz="2400"/>
-            </a:lvl1pPr>
-            <a:lvl2pPr>
-              <a:defRPr sz="2000"/>
-            </a:lvl2pPr>
-            <a:lvl3pPr>
-              <a:defRPr sz="1800"/>
-            </a:lvl3pPr>
-            <a:lvl4pPr>
-              <a:defRPr sz="1600"/>
-            </a:lvl4pPr>
-            <a:lvl5pPr>
-              <a:defRPr sz="1600"/>
-            </a:lvl5pPr>
-            <a:lvl6pPr>
-              <a:defRPr sz="1600"/>
-            </a:lvl6pPr>
-            <a:lvl7pPr>
-              <a:defRPr sz="1600"/>
-            </a:lvl7pPr>
-            <a:lvl8pPr>
-              <a:defRPr sz="1600"/>
-            </a:lvl8pPr>
-            <a:lvl9pPr>
-              <a:defRPr sz="1600"/>
-            </a:lvl9pPr>
-          </a:lstStyle>
+          <a:lstStyle/>
           <a:p>
             <a:pPr lvl="0"/>
             <a:r>
-              <a:rPr lang="x-none"/>
+              <a:rPr lang="en-US"/>
               <a:t>Click to edit Master text styles</a:t>
             </a:r>
           </a:p>
           <a:p>
             <a:pPr lvl="1"/>
             <a:r>
-              <a:rPr lang="x-none"/>
+              <a:rPr lang="en-US"/>
               <a:t>Second level</a:t>
             </a:r>
           </a:p>
           <a:p>
             <a:pPr lvl="2"/>
             <a:r>
-              <a:rPr lang="x-none"/>
+              <a:rPr lang="en-US"/>
               <a:t>Third level</a:t>
             </a:r>
           </a:p>
           <a:p>
             <a:pPr lvl="3"/>
             <a:r>
-              <a:rPr lang="x-none"/>
+              <a:rPr lang="en-US"/>
               <a:t>Fourth level</a:t>
             </a:r>
           </a:p>
           <a:p>
             <a:pPr lvl="4"/>
             <a:r>
-              <a:rPr lang="x-none"/>
+              <a:rPr lang="en-US"/>
               <a:t>Fifth level</a:t>
             </a:r>
-            <a:endParaRPr lang="en-US"/>
-          </a:p>
-        </p:txBody>
-      </p:sp>
-      <p:sp>
-        <p:nvSpPr>
-          <p:cNvPr id="5" name="Text Placeholder 4"/>
+          </a:p>
+        </p:txBody>
+      </p:sp>
+      <p:sp>
+        <p:nvSpPr>
+          <p:cNvPr id="5" name="Text Placeholder 4">
+            <a:extLst>
+              <a:ext uri="{FF2B5EF4-FFF2-40B4-BE49-F238E27FC236}">
+                <a16:creationId xmlns:a16="http://schemas.microsoft.com/office/drawing/2014/main" id="{83ACF850-0127-0440-8384-3BA79FC6FA52}"/>
+              </a:ext>
+            </a:extLst>
+          </p:cNvPr>
           <p:cNvSpPr>
             <a:spLocks noGrp="1"/>
           </p:cNvSpPr>
@@ -1999,8 +1696,8 @@
         </p:nvSpPr>
         <p:spPr>
           <a:xfrm>
-            <a:off x="4645025" y="1535113"/>
-            <a:ext cx="4041775" cy="639762"/>
+            <a:off x="6172200" y="1681163"/>
+            <a:ext cx="5183188" cy="823912"/>
           </a:xfrm>
         </p:spPr>
         <p:txBody>
@@ -2046,7 +1743,7 @@
           <a:p>
             <a:pPr lvl="0"/>
             <a:r>
-              <a:rPr lang="x-none"/>
+              <a:rPr lang="en-US"/>
               <a:t>Click to edit Master text styles</a:t>
             </a:r>
           </a:p>
@@ -2054,7 +1751,13 @@
       </p:sp>
       <p:sp>
         <p:nvSpPr>
-          <p:cNvPr id="6" name="Content Placeholder 5"/>
+          <p:cNvPr id="6" name="Content Placeholder 5">
+            <a:extLst>
+              <a:ext uri="{FF2B5EF4-FFF2-40B4-BE49-F238E27FC236}">
+                <a16:creationId xmlns:a16="http://schemas.microsoft.com/office/drawing/2014/main" id="{C35F14E1-9732-564D-AE26-7E62CBD408D9}"/>
+              </a:ext>
+            </a:extLst>
+          </p:cNvPr>
           <p:cNvSpPr>
             <a:spLocks noGrp="1"/>
           </p:cNvSpPr>
@@ -2064,82 +1767,59 @@
         </p:nvSpPr>
         <p:spPr>
           <a:xfrm>
-            <a:off x="4645025" y="2174875"/>
-            <a:ext cx="4041775" cy="3951288"/>
+            <a:off x="6172200" y="2505075"/>
+            <a:ext cx="5183188" cy="3684588"/>
           </a:xfrm>
         </p:spPr>
         <p:txBody>
           <a:bodyPr/>
-          <a:lstStyle>
-            <a:lvl1pPr>
-              <a:defRPr sz="2400"/>
-            </a:lvl1pPr>
-            <a:lvl2pPr>
-              <a:defRPr sz="2000"/>
-            </a:lvl2pPr>
-            <a:lvl3pPr>
-              <a:defRPr sz="1800"/>
-            </a:lvl3pPr>
-            <a:lvl4pPr>
-              <a:defRPr sz="1600"/>
-            </a:lvl4pPr>
-            <a:lvl5pPr>
-              <a:defRPr sz="1600"/>
-            </a:lvl5pPr>
-            <a:lvl6pPr>
-              <a:defRPr sz="1600"/>
-            </a:lvl6pPr>
-            <a:lvl7pPr>
-              <a:defRPr sz="1600"/>
-            </a:lvl7pPr>
-            <a:lvl8pPr>
-              <a:defRPr sz="1600"/>
-            </a:lvl8pPr>
-            <a:lvl9pPr>
-              <a:defRPr sz="1600"/>
-            </a:lvl9pPr>
-          </a:lstStyle>
+          <a:lstStyle/>
           <a:p>
             <a:pPr lvl="0"/>
             <a:r>
-              <a:rPr lang="x-none"/>
+              <a:rPr lang="en-US"/>
               <a:t>Click to edit Master text styles</a:t>
             </a:r>
           </a:p>
           <a:p>
             <a:pPr lvl="1"/>
             <a:r>
-              <a:rPr lang="x-none"/>
+              <a:rPr lang="en-US"/>
               <a:t>Second level</a:t>
             </a:r>
           </a:p>
           <a:p>
             <a:pPr lvl="2"/>
             <a:r>
-              <a:rPr lang="x-none"/>
+              <a:rPr lang="en-US"/>
               <a:t>Third level</a:t>
             </a:r>
           </a:p>
           <a:p>
             <a:pPr lvl="3"/>
             <a:r>
-              <a:rPr lang="x-none"/>
+              <a:rPr lang="en-US"/>
               <a:t>Fourth level</a:t>
             </a:r>
           </a:p>
           <a:p>
             <a:pPr lvl="4"/>
             <a:r>
-              <a:rPr lang="x-none"/>
+              <a:rPr lang="en-US"/>
               <a:t>Fifth level</a:t>
             </a:r>
-            <a:endParaRPr lang="en-US"/>
-          </a:p>
-        </p:txBody>
-      </p:sp>
-      <p:sp>
-        <p:nvSpPr>
-          <p:cNvPr id="7" name="Date Placeholder 6"/>
+          </a:p>
+        </p:txBody>
+      </p:sp>
+      <p:sp>
+        <p:nvSpPr>
+          <p:cNvPr id="7" name="Date Placeholder 6">
+            <a:extLst>
+              <a:ext uri="{FF2B5EF4-FFF2-40B4-BE49-F238E27FC236}">
+                <a16:creationId xmlns:a16="http://schemas.microsoft.com/office/drawing/2014/main" id="{59DD1558-6A85-B749-99E8-30ADFB75352D}"/>
+              </a:ext>
+            </a:extLst>
+          </p:cNvPr>
           <p:cNvSpPr>
             <a:spLocks noGrp="1"/>
           </p:cNvSpPr>
@@ -2152,9 +1832,9 @@
           <a:bodyPr/>
           <a:lstStyle/>
           <a:p>
-            <a:fld id="{0675A308-8787-9B42-956E-CA40C2F0F6AE}" type="datetimeFigureOut">
+            <a:fld id="{543EA0BC-44CB-0248-A89B-C226E29B5A5F}" type="datetimeFigureOut">
               <a:rPr lang="en-US" smtClean="0"/>
-              <a:t>1/22/19</a:t>
+              <a:t>3/11/19</a:t>
             </a:fld>
             <a:endParaRPr lang="en-US"/>
           </a:p>
@@ -2162,7 +1842,13 @@
       </p:sp>
       <p:sp>
         <p:nvSpPr>
-          <p:cNvPr id="8" name="Footer Placeholder 7"/>
+          <p:cNvPr id="8" name="Footer Placeholder 7">
+            <a:extLst>
+              <a:ext uri="{FF2B5EF4-FFF2-40B4-BE49-F238E27FC236}">
+                <a16:creationId xmlns:a16="http://schemas.microsoft.com/office/drawing/2014/main" id="{83606E68-934D-D340-A57E-DF15AC4C5550}"/>
+              </a:ext>
+            </a:extLst>
+          </p:cNvPr>
           <p:cNvSpPr>
             <a:spLocks noGrp="1"/>
           </p:cNvSpPr>
@@ -2181,7 +1867,13 @@
       </p:sp>
       <p:sp>
         <p:nvSpPr>
-          <p:cNvPr id="9" name="Slide Number Placeholder 8"/>
+          <p:cNvPr id="9" name="Slide Number Placeholder 8">
+            <a:extLst>
+              <a:ext uri="{FF2B5EF4-FFF2-40B4-BE49-F238E27FC236}">
+                <a16:creationId xmlns:a16="http://schemas.microsoft.com/office/drawing/2014/main" id="{9EF34F05-1284-AF42-9D64-553EF8580F9D}"/>
+              </a:ext>
+            </a:extLst>
+          </p:cNvPr>
           <p:cNvSpPr>
             <a:spLocks noGrp="1"/>
           </p:cNvSpPr>
@@ -2194,7 +1886,7 @@
           <a:bodyPr/>
           <a:lstStyle/>
           <a:p>
-            <a:fld id="{667349A5-3503-0648-883D-952D6AF504E3}" type="slidenum">
+            <a:fld id="{C919BC13-7D77-144A-8A42-8BE965DE52FB}" type="slidenum">
               <a:rPr lang="en-US" smtClean="0"/>
               <a:t>‹#›</a:t>
             </a:fld>
@@ -2205,7 +1897,7 @@
     </p:spTree>
     <p:extLst>
       <p:ext uri="{BB962C8B-B14F-4D97-AF65-F5344CB8AC3E}">
-        <p14:creationId xmlns:p14="http://schemas.microsoft.com/office/powerpoint/2010/main" val="1486972678"/>
+        <p14:creationId xmlns:p14="http://schemas.microsoft.com/office/powerpoint/2010/main" val="84696927"/>
       </p:ext>
     </p:extLst>
   </p:cSld>
@@ -2234,7 +1926,13 @@
       </p:grpSpPr>
       <p:sp>
         <p:nvSpPr>
-          <p:cNvPr id="2" name="Title 1"/>
+          <p:cNvPr id="2" name="Title 1">
+            <a:extLst>
+              <a:ext uri="{FF2B5EF4-FFF2-40B4-BE49-F238E27FC236}">
+                <a16:creationId xmlns:a16="http://schemas.microsoft.com/office/drawing/2014/main" id="{0F650770-0A88-624C-8BF0-ED117509E982}"/>
+              </a:ext>
+            </a:extLst>
+          </p:cNvPr>
           <p:cNvSpPr>
             <a:spLocks noGrp="1"/>
           </p:cNvSpPr>
@@ -2248,16 +1946,21 @@
           <a:lstStyle/>
           <a:p>
             <a:r>
-              <a:rPr lang="x-none"/>
+              <a:rPr lang="en-US"/>
               <a:t>Click to edit Master title style</a:t>
             </a:r>
-            <a:endParaRPr lang="en-US"/>
-          </a:p>
-        </p:txBody>
-      </p:sp>
-      <p:sp>
-        <p:nvSpPr>
-          <p:cNvPr id="3" name="Date Placeholder 2"/>
+          </a:p>
+        </p:txBody>
+      </p:sp>
+      <p:sp>
+        <p:nvSpPr>
+          <p:cNvPr id="3" name="Date Placeholder 2">
+            <a:extLst>
+              <a:ext uri="{FF2B5EF4-FFF2-40B4-BE49-F238E27FC236}">
+                <a16:creationId xmlns:a16="http://schemas.microsoft.com/office/drawing/2014/main" id="{487BB565-FD37-4245-BFB4-3C3B5094792B}"/>
+              </a:ext>
+            </a:extLst>
+          </p:cNvPr>
           <p:cNvSpPr>
             <a:spLocks noGrp="1"/>
           </p:cNvSpPr>
@@ -2270,9 +1973,9 @@
           <a:bodyPr/>
           <a:lstStyle/>
           <a:p>
-            <a:fld id="{0675A308-8787-9B42-956E-CA40C2F0F6AE}" type="datetimeFigureOut">
+            <a:fld id="{543EA0BC-44CB-0248-A89B-C226E29B5A5F}" type="datetimeFigureOut">
               <a:rPr lang="en-US" smtClean="0"/>
-              <a:t>1/22/19</a:t>
+              <a:t>3/11/19</a:t>
             </a:fld>
             <a:endParaRPr lang="en-US"/>
           </a:p>
@@ -2280,7 +1983,13 @@
       </p:sp>
       <p:sp>
         <p:nvSpPr>
-          <p:cNvPr id="4" name="Footer Placeholder 3"/>
+          <p:cNvPr id="4" name="Footer Placeholder 3">
+            <a:extLst>
+              <a:ext uri="{FF2B5EF4-FFF2-40B4-BE49-F238E27FC236}">
+                <a16:creationId xmlns:a16="http://schemas.microsoft.com/office/drawing/2014/main" id="{B313619F-5805-E643-B8B6-E788166D000D}"/>
+              </a:ext>
+            </a:extLst>
+          </p:cNvPr>
           <p:cNvSpPr>
             <a:spLocks noGrp="1"/>
           </p:cNvSpPr>
@@ -2299,7 +2008,13 @@
       </p:sp>
       <p:sp>
         <p:nvSpPr>
-          <p:cNvPr id="5" name="Slide Number Placeholder 4"/>
+          <p:cNvPr id="5" name="Slide Number Placeholder 4">
+            <a:extLst>
+              <a:ext uri="{FF2B5EF4-FFF2-40B4-BE49-F238E27FC236}">
+                <a16:creationId xmlns:a16="http://schemas.microsoft.com/office/drawing/2014/main" id="{E3B1C033-941C-8E42-BD6C-63AF23EFF77C}"/>
+              </a:ext>
+            </a:extLst>
+          </p:cNvPr>
           <p:cNvSpPr>
             <a:spLocks noGrp="1"/>
           </p:cNvSpPr>
@@ -2312,7 +2027,7 @@
           <a:bodyPr/>
           <a:lstStyle/>
           <a:p>
-            <a:fld id="{667349A5-3503-0648-883D-952D6AF504E3}" type="slidenum">
+            <a:fld id="{C919BC13-7D77-144A-8A42-8BE965DE52FB}" type="slidenum">
               <a:rPr lang="en-US" smtClean="0"/>
               <a:t>‹#›</a:t>
             </a:fld>
@@ -2323,7 +2038,7 @@
     </p:spTree>
     <p:extLst>
       <p:ext uri="{BB962C8B-B14F-4D97-AF65-F5344CB8AC3E}">
-        <p14:creationId xmlns:p14="http://schemas.microsoft.com/office/powerpoint/2010/main" val="1123922832"/>
+        <p14:creationId xmlns:p14="http://schemas.microsoft.com/office/powerpoint/2010/main" val="578029177"/>
       </p:ext>
     </p:extLst>
   </p:cSld>
@@ -2352,7 +2067,13 @@
       </p:grpSpPr>
       <p:sp>
         <p:nvSpPr>
-          <p:cNvPr id="2" name="Date Placeholder 1"/>
+          <p:cNvPr id="2" name="Date Placeholder 1">
+            <a:extLst>
+              <a:ext uri="{FF2B5EF4-FFF2-40B4-BE49-F238E27FC236}">
+                <a16:creationId xmlns:a16="http://schemas.microsoft.com/office/drawing/2014/main" id="{5BDE81F1-3183-8747-BEAF-C88CF944F359}"/>
+              </a:ext>
+            </a:extLst>
+          </p:cNvPr>
           <p:cNvSpPr>
             <a:spLocks noGrp="1"/>
           </p:cNvSpPr>
@@ -2365,9 +2086,9 @@
           <a:bodyPr/>
           <a:lstStyle/>
           <a:p>
-            <a:fld id="{0675A308-8787-9B42-956E-CA40C2F0F6AE}" type="datetimeFigureOut">
+            <a:fld id="{543EA0BC-44CB-0248-A89B-C226E29B5A5F}" type="datetimeFigureOut">
               <a:rPr lang="en-US" smtClean="0"/>
-              <a:t>1/22/19</a:t>
+              <a:t>3/11/19</a:t>
             </a:fld>
             <a:endParaRPr lang="en-US"/>
           </a:p>
@@ -2375,7 +2096,13 @@
       </p:sp>
       <p:sp>
         <p:nvSpPr>
-          <p:cNvPr id="3" name="Footer Placeholder 2"/>
+          <p:cNvPr id="3" name="Footer Placeholder 2">
+            <a:extLst>
+              <a:ext uri="{FF2B5EF4-FFF2-40B4-BE49-F238E27FC236}">
+                <a16:creationId xmlns:a16="http://schemas.microsoft.com/office/drawing/2014/main" id="{D2B30FF6-E2D2-9044-8DB8-988E9D55A895}"/>
+              </a:ext>
+            </a:extLst>
+          </p:cNvPr>
           <p:cNvSpPr>
             <a:spLocks noGrp="1"/>
           </p:cNvSpPr>
@@ -2394,7 +2121,13 @@
       </p:sp>
       <p:sp>
         <p:nvSpPr>
-          <p:cNvPr id="4" name="Slide Number Placeholder 3"/>
+          <p:cNvPr id="4" name="Slide Number Placeholder 3">
+            <a:extLst>
+              <a:ext uri="{FF2B5EF4-FFF2-40B4-BE49-F238E27FC236}">
+                <a16:creationId xmlns:a16="http://schemas.microsoft.com/office/drawing/2014/main" id="{16CA6B01-8775-A04C-96B4-178FB02A6A8E}"/>
+              </a:ext>
+            </a:extLst>
+          </p:cNvPr>
           <p:cNvSpPr>
             <a:spLocks noGrp="1"/>
           </p:cNvSpPr>
@@ -2407,7 +2140,7 @@
           <a:bodyPr/>
           <a:lstStyle/>
           <a:p>
-            <a:fld id="{667349A5-3503-0648-883D-952D6AF504E3}" type="slidenum">
+            <a:fld id="{C919BC13-7D77-144A-8A42-8BE965DE52FB}" type="slidenum">
               <a:rPr lang="en-US" smtClean="0"/>
               <a:t>‹#›</a:t>
             </a:fld>
@@ -2418,7 +2151,7 @@
     </p:spTree>
     <p:extLst>
       <p:ext uri="{BB962C8B-B14F-4D97-AF65-F5344CB8AC3E}">
-        <p14:creationId xmlns:p14="http://schemas.microsoft.com/office/powerpoint/2010/main" val="3862753477"/>
+        <p14:creationId xmlns:p14="http://schemas.microsoft.com/office/powerpoint/2010/main" val="2237303964"/>
       </p:ext>
     </p:extLst>
   </p:cSld>
@@ -2447,7 +2180,13 @@
       </p:grpSpPr>
       <p:sp>
         <p:nvSpPr>
-          <p:cNvPr id="2" name="Title 1"/>
+          <p:cNvPr id="2" name="Title 1">
+            <a:extLst>
+              <a:ext uri="{FF2B5EF4-FFF2-40B4-BE49-F238E27FC236}">
+                <a16:creationId xmlns:a16="http://schemas.microsoft.com/office/drawing/2014/main" id="{C0AB73C4-B863-DE45-82B4-00AA5000A35C}"/>
+              </a:ext>
+            </a:extLst>
+          </p:cNvPr>
           <p:cNvSpPr>
             <a:spLocks noGrp="1"/>
           </p:cNvSpPr>
@@ -2457,29 +2196,34 @@
         </p:nvSpPr>
         <p:spPr>
           <a:xfrm>
-            <a:off x="457200" y="273050"/>
-            <a:ext cx="3008313" cy="1162050"/>
+            <a:off x="839788" y="457200"/>
+            <a:ext cx="3932237" cy="1600200"/>
           </a:xfrm>
         </p:spPr>
         <p:txBody>
           <a:bodyPr anchor="b"/>
           <a:lstStyle>
-            <a:lvl1pPr algn="l">
-              <a:defRPr sz="2000" b="1"/>
+            <a:lvl1pPr>
+              <a:defRPr sz="3200"/>
             </a:lvl1pPr>
           </a:lstStyle>
           <a:p>
             <a:r>
-              <a:rPr lang="x-none"/>
+              <a:rPr lang="en-US"/>
               <a:t>Click to edit Master title style</a:t>
             </a:r>
-            <a:endParaRPr lang="en-US"/>
-          </a:p>
-        </p:txBody>
-      </p:sp>
-      <p:sp>
-        <p:nvSpPr>
-          <p:cNvPr id="3" name="Content Placeholder 2"/>
+          </a:p>
+        </p:txBody>
+      </p:sp>
+      <p:sp>
+        <p:nvSpPr>
+          <p:cNvPr id="3" name="Content Placeholder 2">
+            <a:extLst>
+              <a:ext uri="{FF2B5EF4-FFF2-40B4-BE49-F238E27FC236}">
+                <a16:creationId xmlns:a16="http://schemas.microsoft.com/office/drawing/2014/main" id="{81283F6A-9E9E-074F-99D8-3EE01B086391}"/>
+              </a:ext>
+            </a:extLst>
+          </p:cNvPr>
           <p:cNvSpPr>
             <a:spLocks noGrp="1"/>
           </p:cNvSpPr>
@@ -2489,8 +2233,8 @@
         </p:nvSpPr>
         <p:spPr>
           <a:xfrm>
-            <a:off x="3575050" y="273050"/>
-            <a:ext cx="5111750" cy="5853113"/>
+            <a:off x="5183188" y="987425"/>
+            <a:ext cx="6172200" cy="4873625"/>
           </a:xfrm>
         </p:spPr>
         <p:txBody>
@@ -2527,44 +2271,49 @@
           <a:p>
             <a:pPr lvl="0"/>
             <a:r>
-              <a:rPr lang="x-none"/>
+              <a:rPr lang="en-US"/>
               <a:t>Click to edit Master text styles</a:t>
             </a:r>
           </a:p>
           <a:p>
             <a:pPr lvl="1"/>
             <a:r>
-              <a:rPr lang="x-none"/>
+              <a:rPr lang="en-US"/>
               <a:t>Second level</a:t>
             </a:r>
           </a:p>
           <a:p>
             <a:pPr lvl="2"/>
             <a:r>
-              <a:rPr lang="x-none"/>
+              <a:rPr lang="en-US"/>
               <a:t>Third level</a:t>
             </a:r>
           </a:p>
           <a:p>
             <a:pPr lvl="3"/>
             <a:r>
-              <a:rPr lang="x-none"/>
+              <a:rPr lang="en-US"/>
               <a:t>Fourth level</a:t>
             </a:r>
           </a:p>
           <a:p>
             <a:pPr lvl="4"/>
             <a:r>
-              <a:rPr lang="x-none"/>
+              <a:rPr lang="en-US"/>
               <a:t>Fifth level</a:t>
             </a:r>
-            <a:endParaRPr lang="en-US"/>
-          </a:p>
-        </p:txBody>
-      </p:sp>
-      <p:sp>
-        <p:nvSpPr>
-          <p:cNvPr id="4" name="Text Placeholder 3"/>
+          </a:p>
+        </p:txBody>
+      </p:sp>
+      <p:sp>
+        <p:nvSpPr>
+          <p:cNvPr id="4" name="Text Placeholder 3">
+            <a:extLst>
+              <a:ext uri="{FF2B5EF4-FFF2-40B4-BE49-F238E27FC236}">
+                <a16:creationId xmlns:a16="http://schemas.microsoft.com/office/drawing/2014/main" id="{2B23BB39-E7DF-C348-A248-B78BA038224F}"/>
+              </a:ext>
+            </a:extLst>
+          </p:cNvPr>
           <p:cNvSpPr>
             <a:spLocks noGrp="1"/>
           </p:cNvSpPr>
@@ -2574,8 +2323,8 @@
         </p:nvSpPr>
         <p:spPr>
           <a:xfrm>
-            <a:off x="457200" y="1435100"/>
-            <a:ext cx="3008313" cy="4691063"/>
+            <a:off x="839788" y="2057400"/>
+            <a:ext cx="3932237" cy="3811588"/>
           </a:xfrm>
         </p:spPr>
         <p:txBody>
@@ -2583,45 +2332,45 @@
           <a:lstStyle>
             <a:lvl1pPr marL="0" indent="0">
               <a:buNone/>
-              <a:defRPr sz="1400"/>
+              <a:defRPr sz="1600"/>
             </a:lvl1pPr>
             <a:lvl2pPr marL="457200" indent="0">
               <a:buNone/>
-              <a:defRPr sz="1200"/>
+              <a:defRPr sz="1400"/>
             </a:lvl2pPr>
             <a:lvl3pPr marL="914400" indent="0">
               <a:buNone/>
-              <a:defRPr sz="1000"/>
+              <a:defRPr sz="1200"/>
             </a:lvl3pPr>
             <a:lvl4pPr marL="1371600" indent="0">
               <a:buNone/>
-              <a:defRPr sz="900"/>
+              <a:defRPr sz="1000"/>
             </a:lvl4pPr>
             <a:lvl5pPr marL="1828800" indent="0">
               <a:buNone/>
-              <a:defRPr sz="900"/>
+              <a:defRPr sz="1000"/>
             </a:lvl5pPr>
             <a:lvl6pPr marL="2286000" indent="0">
               <a:buNone/>
-              <a:defRPr sz="900"/>
+              <a:defRPr sz="1000"/>
             </a:lvl6pPr>
             <a:lvl7pPr marL="2743200" indent="0">
               <a:buNone/>
-              <a:defRPr sz="900"/>
+              <a:defRPr sz="1000"/>
             </a:lvl7pPr>
             <a:lvl8pPr marL="3200400" indent="0">
               <a:buNone/>
-              <a:defRPr sz="900"/>
+              <a:defRPr sz="1000"/>
             </a:lvl8pPr>
             <a:lvl9pPr marL="3657600" indent="0">
               <a:buNone/>
-              <a:defRPr sz="900"/>
+              <a:defRPr sz="1000"/>
             </a:lvl9pPr>
           </a:lstStyle>
           <a:p>
             <a:pPr lvl="0"/>
             <a:r>
-              <a:rPr lang="x-none"/>
+              <a:rPr lang="en-US"/>
               <a:t>Click to edit Master text styles</a:t>
             </a:r>
           </a:p>
@@ -2629,7 +2378,13 @@
       </p:sp>
       <p:sp>
         <p:nvSpPr>
-          <p:cNvPr id="5" name="Date Placeholder 4"/>
+          <p:cNvPr id="5" name="Date Placeholder 4">
+            <a:extLst>
+              <a:ext uri="{FF2B5EF4-FFF2-40B4-BE49-F238E27FC236}">
+                <a16:creationId xmlns:a16="http://schemas.microsoft.com/office/drawing/2014/main" id="{F7E1327C-28B6-EA4F-A392-40E4C682EFFD}"/>
+              </a:ext>
+            </a:extLst>
+          </p:cNvPr>
           <p:cNvSpPr>
             <a:spLocks noGrp="1"/>
           </p:cNvSpPr>
@@ -2642,9 +2397,9 @@
           <a:bodyPr/>
           <a:lstStyle/>
           <a:p>
-            <a:fld id="{0675A308-8787-9B42-956E-CA40C2F0F6AE}" type="datetimeFigureOut">
+            <a:fld id="{543EA0BC-44CB-0248-A89B-C226E29B5A5F}" type="datetimeFigureOut">
               <a:rPr lang="en-US" smtClean="0"/>
-              <a:t>1/22/19</a:t>
+              <a:t>3/11/19</a:t>
             </a:fld>
             <a:endParaRPr lang="en-US"/>
           </a:p>
@@ -2652,7 +2407,13 @@
       </p:sp>
       <p:sp>
         <p:nvSpPr>
-          <p:cNvPr id="6" name="Footer Placeholder 5"/>
+          <p:cNvPr id="6" name="Footer Placeholder 5">
+            <a:extLst>
+              <a:ext uri="{FF2B5EF4-FFF2-40B4-BE49-F238E27FC236}">
+                <a16:creationId xmlns:a16="http://schemas.microsoft.com/office/drawing/2014/main" id="{2E42DC9C-3276-2545-A91F-36CFADC869E5}"/>
+              </a:ext>
+            </a:extLst>
+          </p:cNvPr>
           <p:cNvSpPr>
             <a:spLocks noGrp="1"/>
           </p:cNvSpPr>
@@ -2671,7 +2432,13 @@
       </p:sp>
       <p:sp>
         <p:nvSpPr>
-          <p:cNvPr id="7" name="Slide Number Placeholder 6"/>
+          <p:cNvPr id="7" name="Slide Number Placeholder 6">
+            <a:extLst>
+              <a:ext uri="{FF2B5EF4-FFF2-40B4-BE49-F238E27FC236}">
+                <a16:creationId xmlns:a16="http://schemas.microsoft.com/office/drawing/2014/main" id="{0600BB40-888A-804E-9B22-434E8D16B3BB}"/>
+              </a:ext>
+            </a:extLst>
+          </p:cNvPr>
           <p:cNvSpPr>
             <a:spLocks noGrp="1"/>
           </p:cNvSpPr>
@@ -2684,7 +2451,7 @@
           <a:bodyPr/>
           <a:lstStyle/>
           <a:p>
-            <a:fld id="{667349A5-3503-0648-883D-952D6AF504E3}" type="slidenum">
+            <a:fld id="{C919BC13-7D77-144A-8A42-8BE965DE52FB}" type="slidenum">
               <a:rPr lang="en-US" smtClean="0"/>
               <a:t>‹#›</a:t>
             </a:fld>
@@ -2695,7 +2462,7 @@
     </p:spTree>
     <p:extLst>
       <p:ext uri="{BB962C8B-B14F-4D97-AF65-F5344CB8AC3E}">
-        <p14:creationId xmlns:p14="http://schemas.microsoft.com/office/powerpoint/2010/main" val="4246753621"/>
+        <p14:creationId xmlns:p14="http://schemas.microsoft.com/office/powerpoint/2010/main" val="3878369816"/>
       </p:ext>
     </p:extLst>
   </p:cSld>
@@ -2724,7 +2491,13 @@
       </p:grpSpPr>
       <p:sp>
         <p:nvSpPr>
-          <p:cNvPr id="2" name="Title 1"/>
+          <p:cNvPr id="2" name="Title 1">
+            <a:extLst>
+              <a:ext uri="{FF2B5EF4-FFF2-40B4-BE49-F238E27FC236}">
+                <a16:creationId xmlns:a16="http://schemas.microsoft.com/office/drawing/2014/main" id="{31185E70-AFEA-6F4E-A006-5D28E467994E}"/>
+              </a:ext>
+            </a:extLst>
+          </p:cNvPr>
           <p:cNvSpPr>
             <a:spLocks noGrp="1"/>
           </p:cNvSpPr>
@@ -2734,29 +2507,34 @@
         </p:nvSpPr>
         <p:spPr>
           <a:xfrm>
-            <a:off x="1792288" y="4800600"/>
-            <a:ext cx="5486400" cy="566738"/>
+            <a:off x="839788" y="457200"/>
+            <a:ext cx="3932237" cy="1600200"/>
           </a:xfrm>
         </p:spPr>
         <p:txBody>
           <a:bodyPr anchor="b"/>
           <a:lstStyle>
-            <a:lvl1pPr algn="l">
-              <a:defRPr sz="2000" b="1"/>
+            <a:lvl1pPr>
+              <a:defRPr sz="3200"/>
             </a:lvl1pPr>
           </a:lstStyle>
           <a:p>
             <a:r>
-              <a:rPr lang="x-none"/>
+              <a:rPr lang="en-US"/>
               <a:t>Click to edit Master title style</a:t>
             </a:r>
-            <a:endParaRPr lang="en-US"/>
-          </a:p>
-        </p:txBody>
-      </p:sp>
-      <p:sp>
-        <p:nvSpPr>
-          <p:cNvPr id="3" name="Picture Placeholder 2"/>
+          </a:p>
+        </p:txBody>
+      </p:sp>
+      <p:sp>
+        <p:nvSpPr>
+          <p:cNvPr id="3" name="Picture Placeholder 2">
+            <a:extLst>
+              <a:ext uri="{FF2B5EF4-FFF2-40B4-BE49-F238E27FC236}">
+                <a16:creationId xmlns:a16="http://schemas.microsoft.com/office/drawing/2014/main" id="{EFF5C133-BD80-5643-B416-74CAC34BA629}"/>
+              </a:ext>
+            </a:extLst>
+          </p:cNvPr>
           <p:cNvSpPr>
             <a:spLocks noGrp="1"/>
           </p:cNvSpPr>
@@ -2766,8 +2544,8 @@
         </p:nvSpPr>
         <p:spPr>
           <a:xfrm>
-            <a:off x="1792288" y="612775"/>
-            <a:ext cx="5486400" cy="4114800"/>
+            <a:off x="5183188" y="987425"/>
+            <a:ext cx="6172200" cy="4873625"/>
           </a:xfrm>
         </p:spPr>
         <p:txBody>
@@ -2817,7 +2595,13 @@
       </p:sp>
       <p:sp>
         <p:nvSpPr>
-          <p:cNvPr id="4" name="Text Placeholder 3"/>
+          <p:cNvPr id="4" name="Text Placeholder 3">
+            <a:extLst>
+              <a:ext uri="{FF2B5EF4-FFF2-40B4-BE49-F238E27FC236}">
+                <a16:creationId xmlns:a16="http://schemas.microsoft.com/office/drawing/2014/main" id="{D1B705EC-D0C6-4C4A-8245-5F3036B69A8F}"/>
+              </a:ext>
+            </a:extLst>
+          </p:cNvPr>
           <p:cNvSpPr>
             <a:spLocks noGrp="1"/>
           </p:cNvSpPr>
@@ -2827,8 +2611,8 @@
         </p:nvSpPr>
         <p:spPr>
           <a:xfrm>
-            <a:off x="1792288" y="5367338"/>
-            <a:ext cx="5486400" cy="804862"/>
+            <a:off x="839788" y="2057400"/>
+            <a:ext cx="3932237" cy="3811588"/>
           </a:xfrm>
         </p:spPr>
         <p:txBody>
@@ -2836,45 +2620,45 @@
           <a:lstStyle>
             <a:lvl1pPr marL="0" indent="0">
               <a:buNone/>
-              <a:defRPr sz="1400"/>
+              <a:defRPr sz="1600"/>
             </a:lvl1pPr>
             <a:lvl2pPr marL="457200" indent="0">
               <a:buNone/>
-              <a:defRPr sz="1200"/>
+              <a:defRPr sz="1400"/>
             </a:lvl2pPr>
             <a:lvl3pPr marL="914400" indent="0">
               <a:buNone/>
-              <a:defRPr sz="1000"/>
+              <a:defRPr sz="1200"/>
             </a:lvl3pPr>
             <a:lvl4pPr marL="1371600" indent="0">
               <a:buNone/>
-              <a:defRPr sz="900"/>
+              <a:defRPr sz="1000"/>
             </a:lvl4pPr>
             <a:lvl5pPr marL="1828800" indent="0">
               <a:buNone/>
-              <a:defRPr sz="900"/>
+              <a:defRPr sz="1000"/>
             </a:lvl5pPr>
             <a:lvl6pPr marL="2286000" indent="0">
               <a:buNone/>
-              <a:defRPr sz="900"/>
+              <a:defRPr sz="1000"/>
             </a:lvl6pPr>
             <a:lvl7pPr marL="2743200" indent="0">
               <a:buNone/>
-              <a:defRPr sz="900"/>
+              <a:defRPr sz="1000"/>
             </a:lvl7pPr>
             <a:lvl8pPr marL="3200400" indent="0">
               <a:buNone/>
-              <a:defRPr sz="900"/>
+              <a:defRPr sz="1000"/>
             </a:lvl8pPr>
             <a:lvl9pPr marL="3657600" indent="0">
               <a:buNone/>
-              <a:defRPr sz="900"/>
+              <a:defRPr sz="1000"/>
             </a:lvl9pPr>
           </a:lstStyle>
           <a:p>
             <a:pPr lvl="0"/>
             <a:r>
-              <a:rPr lang="x-none"/>
+              <a:rPr lang="en-US"/>
               <a:t>Click to edit Master text styles</a:t>
             </a:r>
           </a:p>
@@ -2882,7 +2666,13 @@
       </p:sp>
       <p:sp>
         <p:nvSpPr>
-          <p:cNvPr id="5" name="Date Placeholder 4"/>
+          <p:cNvPr id="5" name="Date Placeholder 4">
+            <a:extLst>
+              <a:ext uri="{FF2B5EF4-FFF2-40B4-BE49-F238E27FC236}">
+                <a16:creationId xmlns:a16="http://schemas.microsoft.com/office/drawing/2014/main" id="{6D5AE02A-31F7-8347-A2F9-CEFC150927EA}"/>
+              </a:ext>
+            </a:extLst>
+          </p:cNvPr>
           <p:cNvSpPr>
             <a:spLocks noGrp="1"/>
           </p:cNvSpPr>
@@ -2895,9 +2685,9 @@
           <a:bodyPr/>
           <a:lstStyle/>
           <a:p>
-            <a:fld id="{0675A308-8787-9B42-956E-CA40C2F0F6AE}" type="datetimeFigureOut">
+            <a:fld id="{543EA0BC-44CB-0248-A89B-C226E29B5A5F}" type="datetimeFigureOut">
               <a:rPr lang="en-US" smtClean="0"/>
-              <a:t>1/22/19</a:t>
+              <a:t>3/11/19</a:t>
             </a:fld>
             <a:endParaRPr lang="en-US"/>
           </a:p>
@@ -2905,7 +2695,13 @@
       </p:sp>
       <p:sp>
         <p:nvSpPr>
-          <p:cNvPr id="6" name="Footer Placeholder 5"/>
+          <p:cNvPr id="6" name="Footer Placeholder 5">
+            <a:extLst>
+              <a:ext uri="{FF2B5EF4-FFF2-40B4-BE49-F238E27FC236}">
+                <a16:creationId xmlns:a16="http://schemas.microsoft.com/office/drawing/2014/main" id="{BFD17F31-BA93-2C46-9DB2-55452C15CC36}"/>
+              </a:ext>
+            </a:extLst>
+          </p:cNvPr>
           <p:cNvSpPr>
             <a:spLocks noGrp="1"/>
           </p:cNvSpPr>
@@ -2924,7 +2720,13 @@
       </p:sp>
       <p:sp>
         <p:nvSpPr>
-          <p:cNvPr id="7" name="Slide Number Placeholder 6"/>
+          <p:cNvPr id="7" name="Slide Number Placeholder 6">
+            <a:extLst>
+              <a:ext uri="{FF2B5EF4-FFF2-40B4-BE49-F238E27FC236}">
+                <a16:creationId xmlns:a16="http://schemas.microsoft.com/office/drawing/2014/main" id="{67139A7E-293B-4B48-A308-B175110966AD}"/>
+              </a:ext>
+            </a:extLst>
+          </p:cNvPr>
           <p:cNvSpPr>
             <a:spLocks noGrp="1"/>
           </p:cNvSpPr>
@@ -2937,7 +2739,7 @@
           <a:bodyPr/>
           <a:lstStyle/>
           <a:p>
-            <a:fld id="{667349A5-3503-0648-883D-952D6AF504E3}" type="slidenum">
+            <a:fld id="{C919BC13-7D77-144A-8A42-8BE965DE52FB}" type="slidenum">
               <a:rPr lang="en-US" smtClean="0"/>
               <a:t>‹#›</a:t>
             </a:fld>
@@ -2948,7 +2750,7 @@
     </p:spTree>
     <p:extLst>
       <p:ext uri="{BB962C8B-B14F-4D97-AF65-F5344CB8AC3E}">
-        <p14:creationId xmlns:p14="http://schemas.microsoft.com/office/powerpoint/2010/main" val="2423699421"/>
+        <p14:creationId xmlns:p14="http://schemas.microsoft.com/office/powerpoint/2010/main" val="1990759167"/>
       </p:ext>
     </p:extLst>
   </p:cSld>
@@ -2982,7 +2784,13 @@
       </p:grpSpPr>
       <p:sp>
         <p:nvSpPr>
-          <p:cNvPr id="2" name="Title Placeholder 1"/>
+          <p:cNvPr id="2" name="Title Placeholder 1">
+            <a:extLst>
+              <a:ext uri="{FF2B5EF4-FFF2-40B4-BE49-F238E27FC236}">
+                <a16:creationId xmlns:a16="http://schemas.microsoft.com/office/drawing/2014/main" id="{A69184FA-3671-D04E-9C7D-8406E1939656}"/>
+              </a:ext>
+            </a:extLst>
+          </p:cNvPr>
           <p:cNvSpPr>
             <a:spLocks noGrp="1"/>
           </p:cNvSpPr>
@@ -2992,8 +2800,8 @@
         </p:nvSpPr>
         <p:spPr>
           <a:xfrm>
-            <a:off x="457200" y="274638"/>
-            <a:ext cx="8229600" cy="1143000"/>
+            <a:off x="838200" y="365125"/>
+            <a:ext cx="10515600" cy="1325563"/>
           </a:xfrm>
           <a:prstGeom prst="rect">
             <a:avLst/>
@@ -3006,16 +2814,21 @@
           <a:lstStyle/>
           <a:p>
             <a:r>
-              <a:rPr lang="x-none"/>
+              <a:rPr lang="en-US"/>
               <a:t>Click to edit Master title style</a:t>
             </a:r>
-            <a:endParaRPr lang="en-US"/>
-          </a:p>
-        </p:txBody>
-      </p:sp>
-      <p:sp>
-        <p:nvSpPr>
-          <p:cNvPr id="3" name="Text Placeholder 2"/>
+          </a:p>
+        </p:txBody>
+      </p:sp>
+      <p:sp>
+        <p:nvSpPr>
+          <p:cNvPr id="3" name="Text Placeholder 2">
+            <a:extLst>
+              <a:ext uri="{FF2B5EF4-FFF2-40B4-BE49-F238E27FC236}">
+                <a16:creationId xmlns:a16="http://schemas.microsoft.com/office/drawing/2014/main" id="{A461C487-3379-D843-928C-4EC1B534D372}"/>
+              </a:ext>
+            </a:extLst>
+          </p:cNvPr>
           <p:cNvSpPr>
             <a:spLocks noGrp="1"/>
           </p:cNvSpPr>
@@ -3025,8 +2838,8 @@
         </p:nvSpPr>
         <p:spPr>
           <a:xfrm>
-            <a:off x="457200" y="1600200"/>
-            <a:ext cx="8229600" cy="4525963"/>
+            <a:off x="838200" y="1825625"/>
+            <a:ext cx="10515600" cy="4351338"/>
           </a:xfrm>
           <a:prstGeom prst="rect">
             <a:avLst/>
@@ -3040,44 +2853,49 @@
           <a:p>
             <a:pPr lvl="0"/>
             <a:r>
-              <a:rPr lang="x-none"/>
+              <a:rPr lang="en-US"/>
               <a:t>Click to edit Master text styles</a:t>
             </a:r>
           </a:p>
           <a:p>
             <a:pPr lvl="1"/>
             <a:r>
-              <a:rPr lang="x-none"/>
+              <a:rPr lang="en-US"/>
               <a:t>Second level</a:t>
             </a:r>
           </a:p>
           <a:p>
             <a:pPr lvl="2"/>
             <a:r>
-              <a:rPr lang="x-none"/>
+              <a:rPr lang="en-US"/>
               <a:t>Third level</a:t>
             </a:r>
           </a:p>
           <a:p>
             <a:pPr lvl="3"/>
             <a:r>
-              <a:rPr lang="x-none"/>
+              <a:rPr lang="en-US"/>
               <a:t>Fourth level</a:t>
             </a:r>
           </a:p>
           <a:p>
             <a:pPr lvl="4"/>
             <a:r>
-              <a:rPr lang="x-none"/>
+              <a:rPr lang="en-US"/>
               <a:t>Fifth level</a:t>
             </a:r>
-            <a:endParaRPr lang="en-US"/>
-          </a:p>
-        </p:txBody>
-      </p:sp>
-      <p:sp>
-        <p:nvSpPr>
-          <p:cNvPr id="4" name="Date Placeholder 3"/>
+          </a:p>
+        </p:txBody>
+      </p:sp>
+      <p:sp>
+        <p:nvSpPr>
+          <p:cNvPr id="4" name="Date Placeholder 3">
+            <a:extLst>
+              <a:ext uri="{FF2B5EF4-FFF2-40B4-BE49-F238E27FC236}">
+                <a16:creationId xmlns:a16="http://schemas.microsoft.com/office/drawing/2014/main" id="{8620E62D-8A26-0E48-8186-10ED2D112E79}"/>
+              </a:ext>
+            </a:extLst>
+          </p:cNvPr>
           <p:cNvSpPr>
             <a:spLocks noGrp="1"/>
           </p:cNvSpPr>
@@ -3087,8 +2905,8 @@
         </p:nvSpPr>
         <p:spPr>
           <a:xfrm>
-            <a:off x="457200" y="6356350"/>
-            <a:ext cx="2133600" cy="365125"/>
+            <a:off x="838200" y="6356350"/>
+            <a:ext cx="2743200" cy="365125"/>
           </a:xfrm>
           <a:prstGeom prst="rect">
             <a:avLst/>
@@ -3108,9 +2926,9 @@
             </a:lvl1pPr>
           </a:lstStyle>
           <a:p>
-            <a:fld id="{0675A308-8787-9B42-956E-CA40C2F0F6AE}" type="datetimeFigureOut">
+            <a:fld id="{543EA0BC-44CB-0248-A89B-C226E29B5A5F}" type="datetimeFigureOut">
               <a:rPr lang="en-US" smtClean="0"/>
-              <a:t>1/22/19</a:t>
+              <a:t>3/11/19</a:t>
             </a:fld>
             <a:endParaRPr lang="en-US"/>
           </a:p>
@@ -3118,7 +2936,13 @@
       </p:sp>
       <p:sp>
         <p:nvSpPr>
-          <p:cNvPr id="5" name="Footer Placeholder 4"/>
+          <p:cNvPr id="5" name="Footer Placeholder 4">
+            <a:extLst>
+              <a:ext uri="{FF2B5EF4-FFF2-40B4-BE49-F238E27FC236}">
+                <a16:creationId xmlns:a16="http://schemas.microsoft.com/office/drawing/2014/main" id="{F62D8E43-BECC-C74C-979E-730BEF0531C1}"/>
+              </a:ext>
+            </a:extLst>
+          </p:cNvPr>
           <p:cNvSpPr>
             <a:spLocks noGrp="1"/>
           </p:cNvSpPr>
@@ -3128,8 +2952,8 @@
         </p:nvSpPr>
         <p:spPr>
           <a:xfrm>
-            <a:off x="3124200" y="6356350"/>
-            <a:ext cx="2895600" cy="365125"/>
+            <a:off x="4038600" y="6356350"/>
+            <a:ext cx="4114800" cy="365125"/>
           </a:xfrm>
           <a:prstGeom prst="rect">
             <a:avLst/>
@@ -3155,7 +2979,13 @@
       </p:sp>
       <p:sp>
         <p:nvSpPr>
-          <p:cNvPr id="6" name="Slide Number Placeholder 5"/>
+          <p:cNvPr id="6" name="Slide Number Placeholder 5">
+            <a:extLst>
+              <a:ext uri="{FF2B5EF4-FFF2-40B4-BE49-F238E27FC236}">
+                <a16:creationId xmlns:a16="http://schemas.microsoft.com/office/drawing/2014/main" id="{88F297D7-3528-5F43-9715-33C60F8CB36E}"/>
+              </a:ext>
+            </a:extLst>
+          </p:cNvPr>
           <p:cNvSpPr>
             <a:spLocks noGrp="1"/>
           </p:cNvSpPr>
@@ -3165,8 +2995,8 @@
         </p:nvSpPr>
         <p:spPr>
           <a:xfrm>
-            <a:off x="6553200" y="6356350"/>
-            <a:ext cx="2133600" cy="365125"/>
+            <a:off x="8610600" y="6356350"/>
+            <a:ext cx="2743200" cy="365125"/>
           </a:xfrm>
           <a:prstGeom prst="rect">
             <a:avLst/>
@@ -3186,7 +3016,7 @@
             </a:lvl1pPr>
           </a:lstStyle>
           <a:p>
-            <a:fld id="{667349A5-3503-0648-883D-952D6AF504E3}" type="slidenum">
+            <a:fld id="{C919BC13-7D77-144A-8A42-8BE965DE52FB}" type="slidenum">
               <a:rPr lang="en-US" smtClean="0"/>
               <a:t>‹#›</a:t>
             </a:fld>
@@ -3197,7 +3027,7 @@
     </p:spTree>
     <p:extLst>
       <p:ext uri="{BB962C8B-B14F-4D97-AF65-F5344CB8AC3E}">
-        <p14:creationId xmlns:p14="http://schemas.microsoft.com/office/powerpoint/2010/main" val="1599370150"/>
+        <p14:creationId xmlns:p14="http://schemas.microsoft.com/office/powerpoint/2010/main" val="490935831"/>
       </p:ext>
     </p:extLst>
   </p:cSld>
@@ -3217,7 +3047,10 @@
   </p:sldLayoutIdLst>
   <p:txStyles>
     <p:titleStyle>
-      <a:lvl1pPr algn="ctr" defTabSz="457200" rtl="0" eaLnBrk="1" latinLnBrk="0" hangingPunct="1">
+      <a:lvl1pPr algn="l" defTabSz="914400" rtl="0" eaLnBrk="1" latinLnBrk="0" hangingPunct="1">
+        <a:lnSpc>
+          <a:spcPct val="90000"/>
+        </a:lnSpc>
         <a:spcBef>
           <a:spcPct val="0"/>
         </a:spcBef>
@@ -3233,13 +3066,16 @@
       </a:lvl1pPr>
     </p:titleStyle>
     <p:bodyStyle>
-      <a:lvl1pPr marL="342900" indent="-342900" algn="l" defTabSz="457200" rtl="0" eaLnBrk="1" latinLnBrk="0" hangingPunct="1">
+      <a:lvl1pPr marL="228600" indent="-228600" algn="l" defTabSz="914400" rtl="0" eaLnBrk="1" latinLnBrk="0" hangingPunct="1">
+        <a:lnSpc>
+          <a:spcPct val="90000"/>
+        </a:lnSpc>
         <a:spcBef>
-          <a:spcPct val="20000"/>
+          <a:spcPts val="1000"/>
         </a:spcBef>
-        <a:buFont typeface="Arial"/>
+        <a:buFont typeface="Arial" panose="020B0604020202020204" pitchFamily="34" charset="0"/>
         <a:buChar char="•"/>
-        <a:defRPr sz="3200" kern="1200">
+        <a:defRPr sz="2800" kern="1200">
           <a:solidFill>
             <a:schemeClr val="tx1"/>
           </a:solidFill>
@@ -3248,26 +3084,14 @@
           <a:cs typeface="+mn-cs"/>
         </a:defRPr>
       </a:lvl1pPr>
-      <a:lvl2pPr marL="742950" indent="-285750" algn="l" defTabSz="457200" rtl="0" eaLnBrk="1" latinLnBrk="0" hangingPunct="1">
+      <a:lvl2pPr marL="685800" indent="-228600" algn="l" defTabSz="914400" rtl="0" eaLnBrk="1" latinLnBrk="0" hangingPunct="1">
+        <a:lnSpc>
+          <a:spcPct val="90000"/>
+        </a:lnSpc>
         <a:spcBef>
-          <a:spcPct val="20000"/>
+          <a:spcPts val="500"/>
         </a:spcBef>
-        <a:buFont typeface="Arial"/>
-        <a:buChar char="–"/>
-        <a:defRPr sz="2800" kern="1200">
-          <a:solidFill>
-            <a:schemeClr val="tx1"/>
-          </a:solidFill>
-          <a:latin typeface="+mn-lt"/>
-          <a:ea typeface="+mn-ea"/>
-          <a:cs typeface="+mn-cs"/>
-        </a:defRPr>
-      </a:lvl2pPr>
-      <a:lvl3pPr marL="1143000" indent="-228600" algn="l" defTabSz="457200" rtl="0" eaLnBrk="1" latinLnBrk="0" hangingPunct="1">
-        <a:spcBef>
-          <a:spcPct val="20000"/>
-        </a:spcBef>
-        <a:buFont typeface="Arial"/>
+        <a:buFont typeface="Arial" panose="020B0604020202020204" pitchFamily="34" charset="0"/>
         <a:buChar char="•"/>
         <a:defRPr sz="2400" kern="1200">
           <a:solidFill>
@@ -3277,42 +3101,15 @@
           <a:ea typeface="+mn-ea"/>
           <a:cs typeface="+mn-cs"/>
         </a:defRPr>
-      </a:lvl3pPr>
-      <a:lvl4pPr marL="1600200" indent="-228600" algn="l" defTabSz="457200" rtl="0" eaLnBrk="1" latinLnBrk="0" hangingPunct="1">
+      </a:lvl2pPr>
+      <a:lvl3pPr marL="1143000" indent="-228600" algn="l" defTabSz="914400" rtl="0" eaLnBrk="1" latinLnBrk="0" hangingPunct="1">
+        <a:lnSpc>
+          <a:spcPct val="90000"/>
+        </a:lnSpc>
         <a:spcBef>
-          <a:spcPct val="20000"/>
+          <a:spcPts val="500"/>
         </a:spcBef>
-        <a:buFont typeface="Arial"/>
-        <a:buChar char="–"/>
-        <a:defRPr sz="2000" kern="1200">
-          <a:solidFill>
-            <a:schemeClr val="tx1"/>
-          </a:solidFill>
-          <a:latin typeface="+mn-lt"/>
-          <a:ea typeface="+mn-ea"/>
-          <a:cs typeface="+mn-cs"/>
-        </a:defRPr>
-      </a:lvl4pPr>
-      <a:lvl5pPr marL="2057400" indent="-228600" algn="l" defTabSz="457200" rtl="0" eaLnBrk="1" latinLnBrk="0" hangingPunct="1">
-        <a:spcBef>
-          <a:spcPct val="20000"/>
-        </a:spcBef>
-        <a:buFont typeface="Arial"/>
-        <a:buChar char="»"/>
-        <a:defRPr sz="2000" kern="1200">
-          <a:solidFill>
-            <a:schemeClr val="tx1"/>
-          </a:solidFill>
-          <a:latin typeface="+mn-lt"/>
-          <a:ea typeface="+mn-ea"/>
-          <a:cs typeface="+mn-cs"/>
-        </a:defRPr>
-      </a:lvl5pPr>
-      <a:lvl6pPr marL="2514600" indent="-228600" algn="l" defTabSz="457200" rtl="0" eaLnBrk="1" latinLnBrk="0" hangingPunct="1">
-        <a:spcBef>
-          <a:spcPct val="20000"/>
-        </a:spcBef>
-        <a:buFont typeface="Arial"/>
+        <a:buFont typeface="Arial" panose="020B0604020202020204" pitchFamily="34" charset="0"/>
         <a:buChar char="•"/>
         <a:defRPr sz="2000" kern="1200">
           <a:solidFill>
@@ -3322,14 +3119,71 @@
           <a:ea typeface="+mn-ea"/>
           <a:cs typeface="+mn-cs"/>
         </a:defRPr>
+      </a:lvl3pPr>
+      <a:lvl4pPr marL="1600200" indent="-228600" algn="l" defTabSz="914400" rtl="0" eaLnBrk="1" latinLnBrk="0" hangingPunct="1">
+        <a:lnSpc>
+          <a:spcPct val="90000"/>
+        </a:lnSpc>
+        <a:spcBef>
+          <a:spcPts val="500"/>
+        </a:spcBef>
+        <a:buFont typeface="Arial" panose="020B0604020202020204" pitchFamily="34" charset="0"/>
+        <a:buChar char="•"/>
+        <a:defRPr sz="1800" kern="1200">
+          <a:solidFill>
+            <a:schemeClr val="tx1"/>
+          </a:solidFill>
+          <a:latin typeface="+mn-lt"/>
+          <a:ea typeface="+mn-ea"/>
+          <a:cs typeface="+mn-cs"/>
+        </a:defRPr>
+      </a:lvl4pPr>
+      <a:lvl5pPr marL="2057400" indent="-228600" algn="l" defTabSz="914400" rtl="0" eaLnBrk="1" latinLnBrk="0" hangingPunct="1">
+        <a:lnSpc>
+          <a:spcPct val="90000"/>
+        </a:lnSpc>
+        <a:spcBef>
+          <a:spcPts val="500"/>
+        </a:spcBef>
+        <a:buFont typeface="Arial" panose="020B0604020202020204" pitchFamily="34" charset="0"/>
+        <a:buChar char="•"/>
+        <a:defRPr sz="1800" kern="1200">
+          <a:solidFill>
+            <a:schemeClr val="tx1"/>
+          </a:solidFill>
+          <a:latin typeface="+mn-lt"/>
+          <a:ea typeface="+mn-ea"/>
+          <a:cs typeface="+mn-cs"/>
+        </a:defRPr>
+      </a:lvl5pPr>
+      <a:lvl6pPr marL="2514600" indent="-228600" algn="l" defTabSz="914400" rtl="0" eaLnBrk="1" latinLnBrk="0" hangingPunct="1">
+        <a:lnSpc>
+          <a:spcPct val="90000"/>
+        </a:lnSpc>
+        <a:spcBef>
+          <a:spcPts val="500"/>
+        </a:spcBef>
+        <a:buFont typeface="Arial" panose="020B0604020202020204" pitchFamily="34" charset="0"/>
+        <a:buChar char="•"/>
+        <a:defRPr sz="1800" kern="1200">
+          <a:solidFill>
+            <a:schemeClr val="tx1"/>
+          </a:solidFill>
+          <a:latin typeface="+mn-lt"/>
+          <a:ea typeface="+mn-ea"/>
+          <a:cs typeface="+mn-cs"/>
+        </a:defRPr>
       </a:lvl6pPr>
-      <a:lvl7pPr marL="2971800" indent="-228600" algn="l" defTabSz="457200" rtl="0" eaLnBrk="1" latinLnBrk="0" hangingPunct="1">
+      <a:lvl7pPr marL="2971800" indent="-228600" algn="l" defTabSz="914400" rtl="0" eaLnBrk="1" latinLnBrk="0" hangingPunct="1">
+        <a:lnSpc>
+          <a:spcPct val="90000"/>
+        </a:lnSpc>
         <a:spcBef>
-          <a:spcPct val="20000"/>
+          <a:spcPts val="500"/>
         </a:spcBef>
-        <a:buFont typeface="Arial"/>
+        <a:buFont typeface="Arial" panose="020B0604020202020204" pitchFamily="34" charset="0"/>
         <a:buChar char="•"/>
-        <a:defRPr sz="2000" kern="1200">
+        <a:defRPr sz="1800" kern="1200">
           <a:solidFill>
             <a:schemeClr val="tx1"/>
           </a:solidFill>
@@ -3338,13 +3192,16 @@
           <a:cs typeface="+mn-cs"/>
         </a:defRPr>
       </a:lvl7pPr>
-      <a:lvl8pPr marL="3429000" indent="-228600" algn="l" defTabSz="457200" rtl="0" eaLnBrk="1" latinLnBrk="0" hangingPunct="1">
+      <a:lvl8pPr marL="3429000" indent="-228600" algn="l" defTabSz="914400" rtl="0" eaLnBrk="1" latinLnBrk="0" hangingPunct="1">
+        <a:lnSpc>
+          <a:spcPct val="90000"/>
+        </a:lnSpc>
         <a:spcBef>
-          <a:spcPct val="20000"/>
+          <a:spcPts val="500"/>
         </a:spcBef>
-        <a:buFont typeface="Arial"/>
+        <a:buFont typeface="Arial" panose="020B0604020202020204" pitchFamily="34" charset="0"/>
         <a:buChar char="•"/>
-        <a:defRPr sz="2000" kern="1200">
+        <a:defRPr sz="1800" kern="1200">
           <a:solidFill>
             <a:schemeClr val="tx1"/>
           </a:solidFill>
@@ -3353,13 +3210,16 @@
           <a:cs typeface="+mn-cs"/>
         </a:defRPr>
       </a:lvl8pPr>
-      <a:lvl9pPr marL="3886200" indent="-228600" algn="l" defTabSz="457200" rtl="0" eaLnBrk="1" latinLnBrk="0" hangingPunct="1">
+      <a:lvl9pPr marL="3886200" indent="-228600" algn="l" defTabSz="914400" rtl="0" eaLnBrk="1" latinLnBrk="0" hangingPunct="1">
+        <a:lnSpc>
+          <a:spcPct val="90000"/>
+        </a:lnSpc>
         <a:spcBef>
-          <a:spcPct val="20000"/>
+          <a:spcPts val="500"/>
         </a:spcBef>
-        <a:buFont typeface="Arial"/>
+        <a:buFont typeface="Arial" panose="020B0604020202020204" pitchFamily="34" charset="0"/>
         <a:buChar char="•"/>
-        <a:defRPr sz="2000" kern="1200">
+        <a:defRPr sz="1800" kern="1200">
           <a:solidFill>
             <a:schemeClr val="tx1"/>
           </a:solidFill>
@@ -3373,7 +3233,7 @@
       <a:defPPr>
         <a:defRPr lang="en-US"/>
       </a:defPPr>
-      <a:lvl1pPr marL="0" algn="l" defTabSz="457200" rtl="0" eaLnBrk="1" latinLnBrk="0" hangingPunct="1">
+      <a:lvl1pPr marL="0" algn="l" defTabSz="914400" rtl="0" eaLnBrk="1" latinLnBrk="0" hangingPunct="1">
         <a:defRPr sz="1800" kern="1200">
           <a:solidFill>
             <a:schemeClr val="tx1"/>
@@ -3383,7 +3243,7 @@
           <a:cs typeface="+mn-cs"/>
         </a:defRPr>
       </a:lvl1pPr>
-      <a:lvl2pPr marL="457200" algn="l" defTabSz="457200" rtl="0" eaLnBrk="1" latinLnBrk="0" hangingPunct="1">
+      <a:lvl2pPr marL="457200" algn="l" defTabSz="914400" rtl="0" eaLnBrk="1" latinLnBrk="0" hangingPunct="1">
         <a:defRPr sz="1800" kern="1200">
           <a:solidFill>
             <a:schemeClr val="tx1"/>
@@ -3393,7 +3253,7 @@
           <a:cs typeface="+mn-cs"/>
         </a:defRPr>
       </a:lvl2pPr>
-      <a:lvl3pPr marL="914400" algn="l" defTabSz="457200" rtl="0" eaLnBrk="1" latinLnBrk="0" hangingPunct="1">
+      <a:lvl3pPr marL="914400" algn="l" defTabSz="914400" rtl="0" eaLnBrk="1" latinLnBrk="0" hangingPunct="1">
         <a:defRPr sz="1800" kern="1200">
           <a:solidFill>
             <a:schemeClr val="tx1"/>
@@ -3403,7 +3263,7 @@
           <a:cs typeface="+mn-cs"/>
         </a:defRPr>
       </a:lvl3pPr>
-      <a:lvl4pPr marL="1371600" algn="l" defTabSz="457200" rtl="0" eaLnBrk="1" latinLnBrk="0" hangingPunct="1">
+      <a:lvl4pPr marL="1371600" algn="l" defTabSz="914400" rtl="0" eaLnBrk="1" latinLnBrk="0" hangingPunct="1">
         <a:defRPr sz="1800" kern="1200">
           <a:solidFill>
             <a:schemeClr val="tx1"/>
@@ -3413,7 +3273,7 @@
           <a:cs typeface="+mn-cs"/>
         </a:defRPr>
       </a:lvl4pPr>
-      <a:lvl5pPr marL="1828800" algn="l" defTabSz="457200" rtl="0" eaLnBrk="1" latinLnBrk="0" hangingPunct="1">
+      <a:lvl5pPr marL="1828800" algn="l" defTabSz="914400" rtl="0" eaLnBrk="1" latinLnBrk="0" hangingPunct="1">
         <a:defRPr sz="1800" kern="1200">
           <a:solidFill>
             <a:schemeClr val="tx1"/>
@@ -3423,7 +3283,7 @@
           <a:cs typeface="+mn-cs"/>
         </a:defRPr>
       </a:lvl5pPr>
-      <a:lvl6pPr marL="2286000" algn="l" defTabSz="457200" rtl="0" eaLnBrk="1" latinLnBrk="0" hangingPunct="1">
+      <a:lvl6pPr marL="2286000" algn="l" defTabSz="914400" rtl="0" eaLnBrk="1" latinLnBrk="0" hangingPunct="1">
         <a:defRPr sz="1800" kern="1200">
           <a:solidFill>
             <a:schemeClr val="tx1"/>
@@ -3433,7 +3293,7 @@
           <a:cs typeface="+mn-cs"/>
         </a:defRPr>
       </a:lvl6pPr>
-      <a:lvl7pPr marL="2743200" algn="l" defTabSz="457200" rtl="0" eaLnBrk="1" latinLnBrk="0" hangingPunct="1">
+      <a:lvl7pPr marL="2743200" algn="l" defTabSz="914400" rtl="0" eaLnBrk="1" latinLnBrk="0" hangingPunct="1">
         <a:defRPr sz="1800" kern="1200">
           <a:solidFill>
             <a:schemeClr val="tx1"/>
@@ -3443,7 +3303,7 @@
           <a:cs typeface="+mn-cs"/>
         </a:defRPr>
       </a:lvl7pPr>
-      <a:lvl8pPr marL="3200400" algn="l" defTabSz="457200" rtl="0" eaLnBrk="1" latinLnBrk="0" hangingPunct="1">
+      <a:lvl8pPr marL="3200400" algn="l" defTabSz="914400" rtl="0" eaLnBrk="1" latinLnBrk="0" hangingPunct="1">
         <a:defRPr sz="1800" kern="1200">
           <a:solidFill>
             <a:schemeClr val="tx1"/>
@@ -3453,7 +3313,7 @@
           <a:cs typeface="+mn-cs"/>
         </a:defRPr>
       </a:lvl8pPr>
-      <a:lvl9pPr marL="3657600" algn="l" defTabSz="457200" rtl="0" eaLnBrk="1" latinLnBrk="0" hangingPunct="1">
+      <a:lvl9pPr marL="3657600" algn="l" defTabSz="914400" rtl="0" eaLnBrk="1" latinLnBrk="0" hangingPunct="1">
         <a:defRPr sz="1800" kern="1200">
           <a:solidFill>
             <a:schemeClr val="tx1"/>
@@ -3529,7 +3389,7 @@
     </p:spTree>
     <p:extLst>
       <p:ext uri="{BB962C8B-B14F-4D97-AF65-F5344CB8AC3E}">
-        <p14:creationId xmlns:p14="http://schemas.microsoft.com/office/powerpoint/2010/main" val="359273895"/>
+        <p14:creationId xmlns:p14="http://schemas.microsoft.com/office/powerpoint/2010/main" val="1592328087"/>
       </p:ext>
     </p:extLst>
   </p:cSld>
@@ -3648,7 +3508,7 @@
     </p:spTree>
     <p:extLst>
       <p:ext uri="{BB962C8B-B14F-4D97-AF65-F5344CB8AC3E}">
-        <p14:creationId xmlns:p14="http://schemas.microsoft.com/office/powerpoint/2010/main" val="275399017"/>
+        <p14:creationId xmlns:p14="http://schemas.microsoft.com/office/powerpoint/2010/main" val="672917857"/>
       </p:ext>
     </p:extLst>
   </p:cSld>
@@ -3756,7 +3616,7 @@
     </p:spTree>
     <p:extLst>
       <p:ext uri="{BB962C8B-B14F-4D97-AF65-F5344CB8AC3E}">
-        <p14:creationId xmlns:p14="http://schemas.microsoft.com/office/powerpoint/2010/main" val="199760183"/>
+        <p14:creationId xmlns:p14="http://schemas.microsoft.com/office/powerpoint/2010/main" val="2599116900"/>
       </p:ext>
     </p:extLst>
   </p:cSld>
@@ -3863,7 +3723,7 @@
     </p:spTree>
     <p:extLst>
       <p:ext uri="{BB962C8B-B14F-4D97-AF65-F5344CB8AC3E}">
-        <p14:creationId xmlns:p14="http://schemas.microsoft.com/office/powerpoint/2010/main" val="638521074"/>
+        <p14:creationId xmlns:p14="http://schemas.microsoft.com/office/powerpoint/2010/main" val="1419728546"/>
       </p:ext>
     </p:extLst>
   </p:cSld>
@@ -3955,7 +3815,7 @@
     </p:spTree>
     <p:extLst>
       <p:ext uri="{BB962C8B-B14F-4D97-AF65-F5344CB8AC3E}">
-        <p14:creationId xmlns:p14="http://schemas.microsoft.com/office/powerpoint/2010/main" val="1342602792"/>
+        <p14:creationId xmlns:p14="http://schemas.microsoft.com/office/powerpoint/2010/main" val="505691184"/>
       </p:ext>
     </p:extLst>
   </p:cSld>
@@ -4026,7 +3886,7 @@
     </p:spTree>
     <p:extLst>
       <p:ext uri="{BB962C8B-B14F-4D97-AF65-F5344CB8AC3E}">
-        <p14:creationId xmlns:p14="http://schemas.microsoft.com/office/powerpoint/2010/main" val="561162856"/>
+        <p14:creationId xmlns:p14="http://schemas.microsoft.com/office/powerpoint/2010/main" val="3286188797"/>
       </p:ext>
     </p:extLst>
   </p:cSld>
@@ -4109,7 +3969,7 @@
     </p:spTree>
     <p:extLst>
       <p:ext uri="{BB962C8B-B14F-4D97-AF65-F5344CB8AC3E}">
-        <p14:creationId xmlns:p14="http://schemas.microsoft.com/office/powerpoint/2010/main" val="2129490068"/>
+        <p14:creationId xmlns:p14="http://schemas.microsoft.com/office/powerpoint/2010/main" val="3744426911"/>
       </p:ext>
     </p:extLst>
   </p:cSld>
@@ -4168,12 +4028,7 @@
             <p:ph idx="1"/>
           </p:nvPr>
         </p:nvSpPr>
-        <p:spPr>
-          <a:xfrm>
-            <a:off x="457200" y="1195294"/>
-            <a:ext cx="8229600" cy="5468471"/>
-          </a:xfrm>
-        </p:spPr>
+        <p:spPr/>
         <p:txBody>
           <a:bodyPr>
             <a:normAutofit fontScale="62500" lnSpcReduction="20000"/>
@@ -4306,7 +4161,7 @@
     </p:spTree>
     <p:extLst>
       <p:ext uri="{BB962C8B-B14F-4D97-AF65-F5344CB8AC3E}">
-        <p14:creationId xmlns:p14="http://schemas.microsoft.com/office/powerpoint/2010/main" val="1454318617"/>
+        <p14:creationId xmlns:p14="http://schemas.microsoft.com/office/powerpoint/2010/main" val="566385594"/>
       </p:ext>
     </p:extLst>
   </p:cSld>
@@ -4419,7 +4274,7 @@
     </p:spTree>
     <p:extLst>
       <p:ext uri="{BB962C8B-B14F-4D97-AF65-F5344CB8AC3E}">
-        <p14:creationId xmlns:p14="http://schemas.microsoft.com/office/powerpoint/2010/main" val="3909963707"/>
+        <p14:creationId xmlns:p14="http://schemas.microsoft.com/office/powerpoint/2010/main" val="3816271031"/>
       </p:ext>
     </p:extLst>
   </p:cSld>
@@ -4517,7 +4372,7 @@
     </p:spTree>
     <p:extLst>
       <p:ext uri="{BB962C8B-B14F-4D97-AF65-F5344CB8AC3E}">
-        <p14:creationId xmlns:p14="http://schemas.microsoft.com/office/powerpoint/2010/main" val="2385978848"/>
+        <p14:creationId xmlns:p14="http://schemas.microsoft.com/office/powerpoint/2010/main" val="2430319984"/>
       </p:ext>
     </p:extLst>
   </p:cSld>
@@ -4588,7 +4443,7 @@
     </p:spTree>
     <p:extLst>
       <p:ext uri="{BB962C8B-B14F-4D97-AF65-F5344CB8AC3E}">
-        <p14:creationId xmlns:p14="http://schemas.microsoft.com/office/powerpoint/2010/main" val="4080650690"/>
+        <p14:creationId xmlns:p14="http://schemas.microsoft.com/office/powerpoint/2010/main" val="2136779027"/>
       </p:ext>
     </p:extLst>
   </p:cSld>
@@ -4650,7 +4505,7 @@
         <p:spPr/>
         <p:txBody>
           <a:bodyPr>
-            <a:normAutofit fontScale="77500" lnSpcReduction="20000"/>
+            <a:normAutofit lnSpcReduction="10000"/>
           </a:bodyPr>
           <a:lstStyle/>
           <a:p>
@@ -4726,7 +4581,7 @@
     </p:spTree>
     <p:extLst>
       <p:ext uri="{BB962C8B-B14F-4D97-AF65-F5344CB8AC3E}">
-        <p14:creationId xmlns:p14="http://schemas.microsoft.com/office/powerpoint/2010/main" val="250201672"/>
+        <p14:creationId xmlns:p14="http://schemas.microsoft.com/office/powerpoint/2010/main" val="2478735664"/>
       </p:ext>
     </p:extLst>
   </p:cSld>
@@ -4871,7 +4726,7 @@
     </p:spTree>
     <p:extLst>
       <p:ext uri="{BB962C8B-B14F-4D97-AF65-F5344CB8AC3E}">
-        <p14:creationId xmlns:p14="http://schemas.microsoft.com/office/powerpoint/2010/main" val="2466621111"/>
+        <p14:creationId xmlns:p14="http://schemas.microsoft.com/office/powerpoint/2010/main" val="4286829495"/>
       </p:ext>
     </p:extLst>
   </p:cSld>
@@ -4942,7 +4797,7 @@
     </p:spTree>
     <p:extLst>
       <p:ext uri="{BB962C8B-B14F-4D97-AF65-F5344CB8AC3E}">
-        <p14:creationId xmlns:p14="http://schemas.microsoft.com/office/powerpoint/2010/main" val="86481886"/>
+        <p14:creationId xmlns:p14="http://schemas.microsoft.com/office/powerpoint/2010/main" val="530783078"/>
       </p:ext>
     </p:extLst>
   </p:cSld>
@@ -5030,7 +4885,556 @@
     </p:spTree>
     <p:extLst>
       <p:ext uri="{BB962C8B-B14F-4D97-AF65-F5344CB8AC3E}">
-        <p14:creationId xmlns:p14="http://schemas.microsoft.com/office/powerpoint/2010/main" val="1569695830"/>
+        <p14:creationId xmlns:p14="http://schemas.microsoft.com/office/powerpoint/2010/main" val="2929391607"/>
+      </p:ext>
+    </p:extLst>
+  </p:cSld>
+  <p:clrMapOvr>
+    <a:masterClrMapping/>
+  </p:clrMapOvr>
+</p:sld>
+</file>
+
+<file path=ppt/slides/slide23.xml><?xml version="1.0" encoding="utf-8"?>
+<p:sld xmlns:a="http://schemas.openxmlformats.org/drawingml/2006/main" xmlns:r="http://schemas.openxmlformats.org/officeDocument/2006/relationships" xmlns:p="http://schemas.openxmlformats.org/presentationml/2006/main">
+  <p:cSld>
+    <p:spTree>
+      <p:nvGrpSpPr>
+        <p:cNvPr id="1" name=""/>
+        <p:cNvGrpSpPr/>
+        <p:nvPr/>
+      </p:nvGrpSpPr>
+      <p:grpSpPr>
+        <a:xfrm>
+          <a:off x="0" y="0"/>
+          <a:ext cx="0" cy="0"/>
+          <a:chOff x="0" y="0"/>
+          <a:chExt cx="0" cy="0"/>
+        </a:xfrm>
+      </p:grpSpPr>
+      <p:sp>
+        <p:nvSpPr>
+          <p:cNvPr id="4" name="Title 3">
+            <a:extLst>
+              <a:ext uri="{FF2B5EF4-FFF2-40B4-BE49-F238E27FC236}">
+                <a16:creationId xmlns:a16="http://schemas.microsoft.com/office/drawing/2014/main" id="{B44DCD34-5627-184E-AC47-69F691AB516B}"/>
+              </a:ext>
+            </a:extLst>
+          </p:cNvPr>
+          <p:cNvSpPr>
+            <a:spLocks noGrp="1"/>
+          </p:cNvSpPr>
+          <p:nvPr>
+            <p:ph type="title"/>
+          </p:nvPr>
+        </p:nvSpPr>
+        <p:spPr/>
+        <p:txBody>
+          <a:bodyPr/>
+          <a:lstStyle/>
+          <a:p>
+            <a:r>
+              <a:rPr lang="en-US" dirty="0"/>
+              <a:t>Motor Power: Resistance</a:t>
+            </a:r>
+          </a:p>
+        </p:txBody>
+      </p:sp>
+      <p:sp>
+        <p:nvSpPr>
+          <p:cNvPr id="5" name="Content Placeholder 4">
+            <a:extLst>
+              <a:ext uri="{FF2B5EF4-FFF2-40B4-BE49-F238E27FC236}">
+                <a16:creationId xmlns:a16="http://schemas.microsoft.com/office/drawing/2014/main" id="{580D2C22-2004-FB46-B048-D95EDE4A5F63}"/>
+              </a:ext>
+            </a:extLst>
+          </p:cNvPr>
+          <p:cNvSpPr>
+            <a:spLocks noGrp="1"/>
+          </p:cNvSpPr>
+          <p:nvPr>
+            <p:ph sz="half" idx="1"/>
+          </p:nvPr>
+        </p:nvSpPr>
+        <p:spPr>
+          <a:xfrm>
+            <a:off x="838200" y="1825625"/>
+            <a:ext cx="4528127" cy="4351338"/>
+          </a:xfrm>
+        </p:spPr>
+        <p:txBody>
+          <a:bodyPr>
+            <a:normAutofit fontScale="85000" lnSpcReduction="20000"/>
+          </a:bodyPr>
+          <a:lstStyle/>
+          <a:p>
+            <a:r>
+              <a:rPr lang="en-US" dirty="0"/>
+              <a:t>Motors take a lot of current!</a:t>
+            </a:r>
+          </a:p>
+          <a:p>
+            <a:r>
+              <a:rPr lang="en-US" dirty="0"/>
+              <a:t>We want all the power to go to the motors</a:t>
+            </a:r>
+          </a:p>
+          <a:p>
+            <a:r>
+              <a:rPr lang="en-US" dirty="0"/>
+              <a:t>Copper is an imperfect conductor</a:t>
+            </a:r>
+          </a:p>
+          <a:p>
+            <a:pPr lvl="1"/>
+            <a:r>
+              <a:rPr lang="en-US" dirty="0"/>
+              <a:t>Voltage drop on power lines is non-trivial</a:t>
+            </a:r>
+          </a:p>
+          <a:p>
+            <a:pPr lvl="1"/>
+            <a:r>
+              <a:rPr lang="en-US" dirty="0"/>
+              <a:t>Resistance is a function of aspect ratio</a:t>
+            </a:r>
+          </a:p>
+          <a:p>
+            <a:pPr lvl="1"/>
+            <a:r>
+              <a:rPr lang="en-US" dirty="0"/>
+              <a:t>0.5 </a:t>
+            </a:r>
+            <a:r>
+              <a:rPr lang="en-US" dirty="0" err="1"/>
+              <a:t>mΩ</a:t>
+            </a:r>
+            <a:r>
+              <a:rPr lang="en-US" dirty="0"/>
+              <a:t>/square</a:t>
+            </a:r>
+          </a:p>
+          <a:p>
+            <a:r>
+              <a:rPr lang="en-US" dirty="0"/>
+              <a:t>So, make the power lines wide!</a:t>
+            </a:r>
+          </a:p>
+          <a:p>
+            <a:pPr lvl="1"/>
+            <a:r>
+              <a:rPr lang="en-US" dirty="0"/>
+              <a:t>Use a trace-width calculator</a:t>
+            </a:r>
+          </a:p>
+          <a:p>
+            <a:pPr lvl="1"/>
+            <a:r>
+              <a:rPr lang="en-US" dirty="0"/>
+              <a:t>https://www.4pcb.com/trace-width-</a:t>
+            </a:r>
+            <a:r>
+              <a:rPr lang="en-US" dirty="0" err="1"/>
+              <a:t>calculator.html</a:t>
+            </a:r>
+            <a:endParaRPr lang="en-US" dirty="0"/>
+          </a:p>
+          <a:p>
+            <a:pPr lvl="1"/>
+            <a:endParaRPr lang="en-US" dirty="0"/>
+          </a:p>
+        </p:txBody>
+      </p:sp>
+      <p:pic>
+        <p:nvPicPr>
+          <p:cNvPr id="7" name="Content Placeholder 6">
+            <a:extLst>
+              <a:ext uri="{FF2B5EF4-FFF2-40B4-BE49-F238E27FC236}">
+                <a16:creationId xmlns:a16="http://schemas.microsoft.com/office/drawing/2014/main" id="{F4457DEB-E633-AB4D-879F-77A71AAE4C61}"/>
+              </a:ext>
+            </a:extLst>
+          </p:cNvPr>
+          <p:cNvPicPr>
+            <a:picLocks noGrp="1" noChangeAspect="1"/>
+          </p:cNvPicPr>
+          <p:nvPr>
+            <p:ph sz="half" idx="2"/>
+          </p:nvPr>
+        </p:nvPicPr>
+        <p:blipFill>
+          <a:blip r:embed="rId2"/>
+          <a:stretch>
+            <a:fillRect/>
+          </a:stretch>
+        </p:blipFill>
+        <p:spPr>
+          <a:xfrm>
+            <a:off x="6964955" y="342900"/>
+            <a:ext cx="5029200" cy="3086100"/>
+          </a:xfrm>
+          <a:prstGeom prst="rect">
+            <a:avLst/>
+          </a:prstGeom>
+        </p:spPr>
+      </p:pic>
+      <p:pic>
+        <p:nvPicPr>
+          <p:cNvPr id="8" name="Picture 7">
+            <a:extLst>
+              <a:ext uri="{FF2B5EF4-FFF2-40B4-BE49-F238E27FC236}">
+                <a16:creationId xmlns:a16="http://schemas.microsoft.com/office/drawing/2014/main" id="{24D531CA-C648-7141-B7D0-1030703CB466}"/>
+              </a:ext>
+            </a:extLst>
+          </p:cNvPr>
+          <p:cNvPicPr>
+            <a:picLocks noChangeAspect="1"/>
+          </p:cNvPicPr>
+          <p:nvPr/>
+        </p:nvPicPr>
+        <p:blipFill>
+          <a:blip r:embed="rId3"/>
+          <a:stretch>
+            <a:fillRect/>
+          </a:stretch>
+        </p:blipFill>
+        <p:spPr>
+          <a:xfrm>
+            <a:off x="5798127" y="3282156"/>
+            <a:ext cx="2082800" cy="1016000"/>
+          </a:xfrm>
+          <a:prstGeom prst="rect">
+            <a:avLst/>
+          </a:prstGeom>
+        </p:spPr>
+      </p:pic>
+      <p:pic>
+        <p:nvPicPr>
+          <p:cNvPr id="9" name="Picture 8">
+            <a:extLst>
+              <a:ext uri="{FF2B5EF4-FFF2-40B4-BE49-F238E27FC236}">
+                <a16:creationId xmlns:a16="http://schemas.microsoft.com/office/drawing/2014/main" id="{536AC832-7BF2-0C45-92F3-18F1A73C0621}"/>
+              </a:ext>
+            </a:extLst>
+          </p:cNvPr>
+          <p:cNvPicPr>
+            <a:picLocks noChangeAspect="1"/>
+          </p:cNvPicPr>
+          <p:nvPr/>
+        </p:nvPicPr>
+        <p:blipFill>
+          <a:blip r:embed="rId4"/>
+          <a:stretch>
+            <a:fillRect/>
+          </a:stretch>
+        </p:blipFill>
+        <p:spPr>
+          <a:xfrm>
+            <a:off x="9479555" y="3260514"/>
+            <a:ext cx="2679700" cy="1016000"/>
+          </a:xfrm>
+          <a:prstGeom prst="rect">
+            <a:avLst/>
+          </a:prstGeom>
+        </p:spPr>
+      </p:pic>
+      <p:pic>
+        <p:nvPicPr>
+          <p:cNvPr id="10" name="Picture 9">
+            <a:extLst>
+              <a:ext uri="{FF2B5EF4-FFF2-40B4-BE49-F238E27FC236}">
+                <a16:creationId xmlns:a16="http://schemas.microsoft.com/office/drawing/2014/main" id="{78AAC983-AF99-2F4F-80B0-440BEC5B8E12}"/>
+              </a:ext>
+            </a:extLst>
+          </p:cNvPr>
+          <p:cNvPicPr>
+            <a:picLocks noChangeAspect="1"/>
+          </p:cNvPicPr>
+          <p:nvPr/>
+        </p:nvPicPr>
+        <p:blipFill>
+          <a:blip r:embed="rId5"/>
+          <a:stretch>
+            <a:fillRect/>
+          </a:stretch>
+        </p:blipFill>
+        <p:spPr>
+          <a:xfrm>
+            <a:off x="7518333" y="3887617"/>
+            <a:ext cx="2781300" cy="1651000"/>
+          </a:xfrm>
+          <a:prstGeom prst="rect">
+            <a:avLst/>
+          </a:prstGeom>
+        </p:spPr>
+      </p:pic>
+      <p:pic>
+        <p:nvPicPr>
+          <p:cNvPr id="11" name="Picture 10">
+            <a:extLst>
+              <a:ext uri="{FF2B5EF4-FFF2-40B4-BE49-F238E27FC236}">
+                <a16:creationId xmlns:a16="http://schemas.microsoft.com/office/drawing/2014/main" id="{1FE4148F-7D90-814D-8CA6-F1958788DAB6}"/>
+              </a:ext>
+            </a:extLst>
+          </p:cNvPr>
+          <p:cNvPicPr>
+            <a:picLocks noChangeAspect="1"/>
+          </p:cNvPicPr>
+          <p:nvPr/>
+        </p:nvPicPr>
+        <p:blipFill>
+          <a:blip r:embed="rId6"/>
+          <a:stretch>
+            <a:fillRect/>
+          </a:stretch>
+        </p:blipFill>
+        <p:spPr>
+          <a:xfrm>
+            <a:off x="4836583" y="5625929"/>
+            <a:ext cx="6921500" cy="1104900"/>
+          </a:xfrm>
+          <a:prstGeom prst="rect">
+            <a:avLst/>
+          </a:prstGeom>
+        </p:spPr>
+      </p:pic>
+    </p:spTree>
+    <p:extLst>
+      <p:ext uri="{BB962C8B-B14F-4D97-AF65-F5344CB8AC3E}">
+        <p14:creationId xmlns:p14="http://schemas.microsoft.com/office/powerpoint/2010/main" val="4081657967"/>
+      </p:ext>
+    </p:extLst>
+  </p:cSld>
+  <p:clrMapOvr>
+    <a:masterClrMapping/>
+  </p:clrMapOvr>
+</p:sld>
+</file>
+
+<file path=ppt/slides/slide24.xml><?xml version="1.0" encoding="utf-8"?>
+<p:sld xmlns:a="http://schemas.openxmlformats.org/drawingml/2006/main" xmlns:r="http://schemas.openxmlformats.org/officeDocument/2006/relationships" xmlns:p="http://schemas.openxmlformats.org/presentationml/2006/main">
+  <p:cSld>
+    <p:spTree>
+      <p:nvGrpSpPr>
+        <p:cNvPr id="1" name=""/>
+        <p:cNvGrpSpPr/>
+        <p:nvPr/>
+      </p:nvGrpSpPr>
+      <p:grpSpPr>
+        <a:xfrm>
+          <a:off x="0" y="0"/>
+          <a:ext cx="0" cy="0"/>
+          <a:chOff x="0" y="0"/>
+          <a:chExt cx="0" cy="0"/>
+        </a:xfrm>
+      </p:grpSpPr>
+      <p:sp>
+        <p:nvSpPr>
+          <p:cNvPr id="4" name="Title 3">
+            <a:extLst>
+              <a:ext uri="{FF2B5EF4-FFF2-40B4-BE49-F238E27FC236}">
+                <a16:creationId xmlns:a16="http://schemas.microsoft.com/office/drawing/2014/main" id="{B44DCD34-5627-184E-AC47-69F691AB516B}"/>
+              </a:ext>
+            </a:extLst>
+          </p:cNvPr>
+          <p:cNvSpPr>
+            <a:spLocks noGrp="1"/>
+          </p:cNvSpPr>
+          <p:nvPr>
+            <p:ph type="title"/>
+          </p:nvPr>
+        </p:nvSpPr>
+        <p:spPr/>
+        <p:txBody>
+          <a:bodyPr/>
+          <a:lstStyle/>
+          <a:p>
+            <a:r>
+              <a:rPr lang="en-US" dirty="0"/>
+              <a:t>Motor Power: Inductance</a:t>
+            </a:r>
+          </a:p>
+        </p:txBody>
+      </p:sp>
+      <p:sp>
+        <p:nvSpPr>
+          <p:cNvPr id="5" name="Content Placeholder 4">
+            <a:extLst>
+              <a:ext uri="{FF2B5EF4-FFF2-40B4-BE49-F238E27FC236}">
+                <a16:creationId xmlns:a16="http://schemas.microsoft.com/office/drawing/2014/main" id="{580D2C22-2004-FB46-B048-D95EDE4A5F63}"/>
+              </a:ext>
+            </a:extLst>
+          </p:cNvPr>
+          <p:cNvSpPr>
+            <a:spLocks noGrp="1"/>
+          </p:cNvSpPr>
+          <p:nvPr>
+            <p:ph sz="half" idx="1"/>
+          </p:nvPr>
+        </p:nvSpPr>
+        <p:spPr>
+          <a:xfrm>
+            <a:off x="838200" y="1825625"/>
+            <a:ext cx="4528127" cy="4351338"/>
+          </a:xfrm>
+        </p:spPr>
+        <p:txBody>
+          <a:bodyPr>
+            <a:normAutofit/>
+          </a:bodyPr>
+          <a:lstStyle/>
+          <a:p>
+            <a:r>
+              <a:rPr lang="en-US" dirty="0"/>
+              <a:t>Inductance</a:t>
+            </a:r>
+          </a:p>
+        </p:txBody>
+      </p:sp>
+      <p:sp>
+        <p:nvSpPr>
+          <p:cNvPr id="3" name="Content Placeholder 2">
+            <a:extLst>
+              <a:ext uri="{FF2B5EF4-FFF2-40B4-BE49-F238E27FC236}">
+                <a16:creationId xmlns:a16="http://schemas.microsoft.com/office/drawing/2014/main" id="{D9DD746E-E481-614A-BC5B-C941B11D3A66}"/>
+              </a:ext>
+            </a:extLst>
+          </p:cNvPr>
+          <p:cNvSpPr>
+            <a:spLocks noGrp="1"/>
+          </p:cNvSpPr>
+          <p:nvPr>
+            <p:ph sz="half" idx="2"/>
+          </p:nvPr>
+        </p:nvSpPr>
+        <p:spPr/>
+        <p:txBody>
+          <a:bodyPr/>
+          <a:lstStyle/>
+          <a:p>
+            <a:endParaRPr lang="en-US"/>
+          </a:p>
+        </p:txBody>
+      </p:sp>
+    </p:spTree>
+    <p:extLst>
+      <p:ext uri="{BB962C8B-B14F-4D97-AF65-F5344CB8AC3E}">
+        <p14:creationId xmlns:p14="http://schemas.microsoft.com/office/powerpoint/2010/main" val="1959214347"/>
+      </p:ext>
+    </p:extLst>
+  </p:cSld>
+  <p:clrMapOvr>
+    <a:masterClrMapping/>
+  </p:clrMapOvr>
+</p:sld>
+</file>
+
+<file path=ppt/slides/slide25.xml><?xml version="1.0" encoding="utf-8"?>
+<p:sld xmlns:a="http://schemas.openxmlformats.org/drawingml/2006/main" xmlns:r="http://schemas.openxmlformats.org/officeDocument/2006/relationships" xmlns:p="http://schemas.openxmlformats.org/presentationml/2006/main">
+  <p:cSld>
+    <p:spTree>
+      <p:nvGrpSpPr>
+        <p:cNvPr id="1" name=""/>
+        <p:cNvGrpSpPr/>
+        <p:nvPr/>
+      </p:nvGrpSpPr>
+      <p:grpSpPr>
+        <a:xfrm>
+          <a:off x="0" y="0"/>
+          <a:ext cx="0" cy="0"/>
+          <a:chOff x="0" y="0"/>
+          <a:chExt cx="0" cy="0"/>
+        </a:xfrm>
+      </p:grpSpPr>
+      <p:sp>
+        <p:nvSpPr>
+          <p:cNvPr id="4" name="Title 3">
+            <a:extLst>
+              <a:ext uri="{FF2B5EF4-FFF2-40B4-BE49-F238E27FC236}">
+                <a16:creationId xmlns:a16="http://schemas.microsoft.com/office/drawing/2014/main" id="{B44DCD34-5627-184E-AC47-69F691AB516B}"/>
+              </a:ext>
+            </a:extLst>
+          </p:cNvPr>
+          <p:cNvSpPr>
+            <a:spLocks noGrp="1"/>
+          </p:cNvSpPr>
+          <p:nvPr>
+            <p:ph type="title"/>
+          </p:nvPr>
+        </p:nvSpPr>
+        <p:spPr/>
+        <p:txBody>
+          <a:bodyPr/>
+          <a:lstStyle/>
+          <a:p>
+            <a:r>
+              <a:rPr lang="en-US" dirty="0"/>
+              <a:t>Microcontroller and IMU Controller: Noise</a:t>
+            </a:r>
+          </a:p>
+        </p:txBody>
+      </p:sp>
+      <p:sp>
+        <p:nvSpPr>
+          <p:cNvPr id="5" name="Content Placeholder 4">
+            <a:extLst>
+              <a:ext uri="{FF2B5EF4-FFF2-40B4-BE49-F238E27FC236}">
+                <a16:creationId xmlns:a16="http://schemas.microsoft.com/office/drawing/2014/main" id="{580D2C22-2004-FB46-B048-D95EDE4A5F63}"/>
+              </a:ext>
+            </a:extLst>
+          </p:cNvPr>
+          <p:cNvSpPr>
+            <a:spLocks noGrp="1"/>
+          </p:cNvSpPr>
+          <p:nvPr>
+            <p:ph sz="half" idx="1"/>
+          </p:nvPr>
+        </p:nvSpPr>
+        <p:spPr>
+          <a:xfrm>
+            <a:off x="838200" y="1825625"/>
+            <a:ext cx="4528127" cy="4351338"/>
+          </a:xfrm>
+        </p:spPr>
+        <p:txBody>
+          <a:bodyPr>
+            <a:normAutofit/>
+          </a:bodyPr>
+          <a:lstStyle/>
+          <a:p>
+            <a:pPr lvl="1"/>
+            <a:endParaRPr lang="en-US" dirty="0"/>
+          </a:p>
+        </p:txBody>
+      </p:sp>
+      <p:sp>
+        <p:nvSpPr>
+          <p:cNvPr id="3" name="Content Placeholder 2">
+            <a:extLst>
+              <a:ext uri="{FF2B5EF4-FFF2-40B4-BE49-F238E27FC236}">
+                <a16:creationId xmlns:a16="http://schemas.microsoft.com/office/drawing/2014/main" id="{D9DD746E-E481-614A-BC5B-C941B11D3A66}"/>
+              </a:ext>
+            </a:extLst>
+          </p:cNvPr>
+          <p:cNvSpPr>
+            <a:spLocks noGrp="1"/>
+          </p:cNvSpPr>
+          <p:nvPr>
+            <p:ph sz="half" idx="2"/>
+          </p:nvPr>
+        </p:nvSpPr>
+        <p:spPr/>
+        <p:txBody>
+          <a:bodyPr/>
+          <a:lstStyle/>
+          <a:p>
+            <a:endParaRPr lang="en-US"/>
+          </a:p>
+        </p:txBody>
+      </p:sp>
+    </p:spTree>
+    <p:extLst>
+      <p:ext uri="{BB962C8B-B14F-4D97-AF65-F5344CB8AC3E}">
+        <p14:creationId xmlns:p14="http://schemas.microsoft.com/office/powerpoint/2010/main" val="582483006"/>
       </p:ext>
     </p:extLst>
   </p:cSld>
@@ -5146,7 +5550,7 @@
     </p:spTree>
     <p:extLst>
       <p:ext uri="{BB962C8B-B14F-4D97-AF65-F5344CB8AC3E}">
-        <p14:creationId xmlns:p14="http://schemas.microsoft.com/office/powerpoint/2010/main" val="1552720149"/>
+        <p14:creationId xmlns:p14="http://schemas.microsoft.com/office/powerpoint/2010/main" val="3749329050"/>
       </p:ext>
     </p:extLst>
   </p:cSld>
@@ -5230,7 +5634,7 @@
           <a:p>
             <a:r>
               <a:rPr lang="en-US" dirty="0"/>
-              <a:t>Reference designators can go on 0.1mm grid.</a:t>
+              <a:t>Reference designators can go on 0.5 or 0.1mm grid.</a:t>
             </a:r>
           </a:p>
           <a:p>
@@ -5256,7 +5660,7 @@
     </p:spTree>
     <p:extLst>
       <p:ext uri="{BB962C8B-B14F-4D97-AF65-F5344CB8AC3E}">
-        <p14:creationId xmlns:p14="http://schemas.microsoft.com/office/powerpoint/2010/main" val="3282921146"/>
+        <p14:creationId xmlns:p14="http://schemas.microsoft.com/office/powerpoint/2010/main" val="3567722507"/>
       </p:ext>
     </p:extLst>
   </p:cSld>
@@ -5330,7 +5734,7 @@
     </p:spTree>
     <p:extLst>
       <p:ext uri="{BB962C8B-B14F-4D97-AF65-F5344CB8AC3E}">
-        <p14:creationId xmlns:p14="http://schemas.microsoft.com/office/powerpoint/2010/main" val="2644763162"/>
+        <p14:creationId xmlns:p14="http://schemas.microsoft.com/office/powerpoint/2010/main" val="4182616968"/>
       </p:ext>
     </p:extLst>
   </p:cSld>
@@ -5392,46 +5796,13 @@
         <p:spPr/>
         <p:txBody>
           <a:bodyPr>
-            <a:normAutofit lnSpcReduction="10000"/>
+            <a:normAutofit/>
           </a:bodyPr>
           <a:lstStyle/>
           <a:p>
             <a:r>
               <a:rPr lang="en-US" dirty="0"/>
-              <a:t>You can also move around the reference designator</a:t>
-            </a:r>
-          </a:p>
-          <a:p>
-            <a:pPr lvl="1"/>
-            <a:r>
-              <a:rPr lang="en-US" dirty="0"/>
-              <a:t>Use the “squash” tool</a:t>
-            </a:r>
-          </a:p>
-          <a:p>
-            <a:r>
-              <a:rPr lang="en-US" dirty="0"/>
               <a:t>You can rotate components with the rotate tool.</a:t>
-            </a:r>
-          </a:p>
-          <a:p>
-            <a:r>
-              <a:rPr lang="en-US" dirty="0"/>
-              <a:t>You can put things on the back of the board</a:t>
-            </a:r>
-          </a:p>
-          <a:p>
-            <a:pPr lvl="1"/>
-            <a:r>
-              <a:rPr lang="en-US" dirty="0"/>
-              <a:t>Use the “Mirror” tool.</a:t>
-            </a:r>
-          </a:p>
-          <a:p>
-            <a:pPr lvl="1"/>
-            <a:r>
-              <a:rPr lang="en-US" dirty="0"/>
-              <a:t>This will make assembly harder.</a:t>
             </a:r>
           </a:p>
           <a:p>
@@ -5451,7 +5822,7 @@
     </p:spTree>
     <p:extLst>
       <p:ext uri="{BB962C8B-B14F-4D97-AF65-F5344CB8AC3E}">
-        <p14:creationId xmlns:p14="http://schemas.microsoft.com/office/powerpoint/2010/main" val="847403710"/>
+        <p14:creationId xmlns:p14="http://schemas.microsoft.com/office/powerpoint/2010/main" val="3899300758"/>
       </p:ext>
     </p:extLst>
   </p:cSld>
@@ -5534,7 +5905,7 @@
     </p:spTree>
     <p:extLst>
       <p:ext uri="{BB962C8B-B14F-4D97-AF65-F5344CB8AC3E}">
-        <p14:creationId xmlns:p14="http://schemas.microsoft.com/office/powerpoint/2010/main" val="2102886499"/>
+        <p14:creationId xmlns:p14="http://schemas.microsoft.com/office/powerpoint/2010/main" val="1295809181"/>
       </p:ext>
     </p:extLst>
   </p:cSld>
@@ -5596,7 +5967,7 @@
         <p:spPr/>
         <p:txBody>
           <a:bodyPr>
-            <a:normAutofit fontScale="77500" lnSpcReduction="20000"/>
+            <a:normAutofit/>
           </a:bodyPr>
           <a:lstStyle/>
           <a:p>
@@ -5667,7 +6038,7 @@
     </p:spTree>
     <p:extLst>
       <p:ext uri="{BB962C8B-B14F-4D97-AF65-F5344CB8AC3E}">
-        <p14:creationId xmlns:p14="http://schemas.microsoft.com/office/powerpoint/2010/main" val="1871447490"/>
+        <p14:creationId xmlns:p14="http://schemas.microsoft.com/office/powerpoint/2010/main" val="1927398484"/>
       </p:ext>
     </p:extLst>
   </p:cSld>
@@ -5784,7 +6155,7 @@
     </p:spTree>
     <p:extLst>
       <p:ext uri="{BB962C8B-B14F-4D97-AF65-F5344CB8AC3E}">
-        <p14:creationId xmlns:p14="http://schemas.microsoft.com/office/powerpoint/2010/main" val="1098705568"/>
+        <p14:creationId xmlns:p14="http://schemas.microsoft.com/office/powerpoint/2010/main" val="1928658376"/>
       </p:ext>
     </p:extLst>
   </p:cSld>
@@ -5805,44 +6176,44 @@
         <a:sysClr val="window" lastClr="FFFFFF"/>
       </a:lt1>
       <a:dk2>
-        <a:srgbClr val="1F497D"/>
+        <a:srgbClr val="44546A"/>
       </a:dk2>
       <a:lt2>
-        <a:srgbClr val="EEECE1"/>
+        <a:srgbClr val="E7E6E6"/>
       </a:lt2>
       <a:accent1>
-        <a:srgbClr val="4F81BD"/>
+        <a:srgbClr val="4472C4"/>
       </a:accent1>
       <a:accent2>
-        <a:srgbClr val="C0504D"/>
+        <a:srgbClr val="ED7D31"/>
       </a:accent2>
       <a:accent3>
-        <a:srgbClr val="9BBB59"/>
+        <a:srgbClr val="A5A5A5"/>
       </a:accent3>
       <a:accent4>
-        <a:srgbClr val="8064A2"/>
+        <a:srgbClr val="FFC000"/>
       </a:accent4>
       <a:accent5>
-        <a:srgbClr val="4BACC6"/>
+        <a:srgbClr val="5B9BD5"/>
       </a:accent5>
       <a:accent6>
-        <a:srgbClr val="F79646"/>
+        <a:srgbClr val="70AD47"/>
       </a:accent6>
       <a:hlink>
-        <a:srgbClr val="0000FF"/>
+        <a:srgbClr val="0563C1"/>
       </a:hlink>
       <a:folHlink>
-        <a:srgbClr val="800080"/>
+        <a:srgbClr val="954F72"/>
       </a:folHlink>
     </a:clrScheme>
     <a:fontScheme name="Office">
       <a:majorFont>
-        <a:latin typeface="Calibri"/>
+        <a:latin typeface="Calibri Light" panose="020F0302020204030204"/>
         <a:ea typeface=""/>
         <a:cs typeface=""/>
-        <a:font script="Jpan" typeface="ＭＳ Ｐゴシック"/>
+        <a:font script="Jpan" typeface="游ゴシック Light"/>
         <a:font script="Hang" typeface="맑은 고딕"/>
-        <a:font script="Hans" typeface="宋体"/>
+        <a:font script="Hans" typeface="等线 Light"/>
         <a:font script="Hant" typeface="新細明體"/>
         <a:font script="Arab" typeface="Times New Roman"/>
         <a:font script="Hebr" typeface="Times New Roman"/>
@@ -5870,14 +6241,31 @@
         <a:font script="Viet" typeface="Times New Roman"/>
         <a:font script="Uigh" typeface="Microsoft Uighur"/>
         <a:font script="Geor" typeface="Sylfaen"/>
+        <a:font script="Armn" typeface="Arial"/>
+        <a:font script="Bugi" typeface="Leelawadee UI"/>
+        <a:font script="Bopo" typeface="Microsoft JhengHei"/>
+        <a:font script="Java" typeface="Javanese Text"/>
+        <a:font script="Lisu" typeface="Segoe UI"/>
+        <a:font script="Mymr" typeface="Myanmar Text"/>
+        <a:font script="Nkoo" typeface="Ebrima"/>
+        <a:font script="Olck" typeface="Nirmala UI"/>
+        <a:font script="Osma" typeface="Ebrima"/>
+        <a:font script="Phag" typeface="Phagspa"/>
+        <a:font script="Syrn" typeface="Estrangelo Edessa"/>
+        <a:font script="Syrj" typeface="Estrangelo Edessa"/>
+        <a:font script="Syre" typeface="Estrangelo Edessa"/>
+        <a:font script="Sora" typeface="Nirmala UI"/>
+        <a:font script="Tale" typeface="Microsoft Tai Le"/>
+        <a:font script="Talu" typeface="Microsoft New Tai Lue"/>
+        <a:font script="Tfng" typeface="Ebrima"/>
       </a:majorFont>
       <a:minorFont>
-        <a:latin typeface="Calibri"/>
+        <a:latin typeface="Calibri" panose="020F0502020204030204"/>
         <a:ea typeface=""/>
         <a:cs typeface=""/>
-        <a:font script="Jpan" typeface="ＭＳ Ｐゴシック"/>
+        <a:font script="Jpan" typeface="游ゴシック"/>
         <a:font script="Hang" typeface="맑은 고딕"/>
-        <a:font script="Hans" typeface="宋体"/>
+        <a:font script="Hans" typeface="等线"/>
         <a:font script="Hant" typeface="新細明體"/>
         <a:font script="Arab" typeface="Arial"/>
         <a:font script="Hebr" typeface="Arial"/>
@@ -5905,6 +6293,23 @@
         <a:font script="Viet" typeface="Arial"/>
         <a:font script="Uigh" typeface="Microsoft Uighur"/>
         <a:font script="Geor" typeface="Sylfaen"/>
+        <a:font script="Armn" typeface="Arial"/>
+        <a:font script="Bugi" typeface="Leelawadee UI"/>
+        <a:font script="Bopo" typeface="Microsoft JhengHei"/>
+        <a:font script="Java" typeface="Javanese Text"/>
+        <a:font script="Lisu" typeface="Segoe UI"/>
+        <a:font script="Mymr" typeface="Myanmar Text"/>
+        <a:font script="Nkoo" typeface="Ebrima"/>
+        <a:font script="Olck" typeface="Nirmala UI"/>
+        <a:font script="Osma" typeface="Ebrima"/>
+        <a:font script="Phag" typeface="Phagspa"/>
+        <a:font script="Syrn" typeface="Estrangelo Edessa"/>
+        <a:font script="Syrj" typeface="Estrangelo Edessa"/>
+        <a:font script="Syre" typeface="Estrangelo Edessa"/>
+        <a:font script="Sora" typeface="Nirmala UI"/>
+        <a:font script="Tale" typeface="Microsoft Tai Le"/>
+        <a:font script="Talu" typeface="Microsoft New Tai Lue"/>
+        <a:font script="Tfng" typeface="Ebrima"/>
       </a:minorFont>
     </a:fontScheme>
     <a:fmtScheme name="Office">
@@ -5916,520 +6321,141 @@
           <a:gsLst>
             <a:gs pos="0">
               <a:schemeClr val="phClr">
-                <a:tint val="50000"/>
-                <a:satMod val="300000"/>
+                <a:lumMod val="110000"/>
+                <a:satMod val="105000"/>
+                <a:tint val="67000"/>
               </a:schemeClr>
             </a:gs>
-            <a:gs pos="35000">
+            <a:gs pos="50000">
               <a:schemeClr val="phClr">
-                <a:tint val="37000"/>
-                <a:satMod val="300000"/>
+                <a:lumMod val="105000"/>
+                <a:satMod val="103000"/>
+                <a:tint val="73000"/>
               </a:schemeClr>
             </a:gs>
             <a:gs pos="100000">
               <a:schemeClr val="phClr">
-                <a:tint val="15000"/>
-                <a:satMod val="350000"/>
+                <a:lumMod val="105000"/>
+                <a:satMod val="109000"/>
+                <a:tint val="81000"/>
               </a:schemeClr>
             </a:gs>
           </a:gsLst>
-          <a:lin ang="16200000" scaled="1"/>
+          <a:lin ang="5400000" scaled="0"/>
         </a:gradFill>
         <a:gradFill rotWithShape="1">
           <a:gsLst>
             <a:gs pos="0">
               <a:schemeClr val="phClr">
-                <a:tint val="100000"/>
+                <a:satMod val="103000"/>
+                <a:lumMod val="102000"/>
+                <a:tint val="94000"/>
+              </a:schemeClr>
+            </a:gs>
+            <a:gs pos="50000">
+              <a:schemeClr val="phClr">
+                <a:satMod val="110000"/>
+                <a:lumMod val="100000"/>
                 <a:shade val="100000"/>
-                <a:satMod val="130000"/>
               </a:schemeClr>
             </a:gs>
             <a:gs pos="100000">
               <a:schemeClr val="phClr">
-                <a:tint val="50000"/>
-                <a:shade val="100000"/>
-                <a:satMod val="350000"/>
+                <a:lumMod val="99000"/>
+                <a:satMod val="120000"/>
+                <a:shade val="78000"/>
               </a:schemeClr>
             </a:gs>
           </a:gsLst>
-          <a:lin ang="16200000" scaled="0"/>
+          <a:lin ang="5400000" scaled="0"/>
         </a:gradFill>
       </a:fillStyleLst>
       <a:lnStyleLst>
-        <a:ln w="9525" cap="flat" cmpd="sng" algn="ctr">
-          <a:solidFill>
-            <a:schemeClr val="phClr">
-              <a:shade val="95000"/>
-              <a:satMod val="105000"/>
-            </a:schemeClr>
-          </a:solidFill>
-          <a:prstDash val="solid"/>
-        </a:ln>
-        <a:ln w="25400" cap="flat" cmpd="sng" algn="ctr">
+        <a:ln w="6350" cap="flat" cmpd="sng" algn="ctr">
           <a:solidFill>
             <a:schemeClr val="phClr"/>
           </a:solidFill>
           <a:prstDash val="solid"/>
+          <a:miter lim="800000"/>
         </a:ln>
-        <a:ln w="38100" cap="flat" cmpd="sng" algn="ctr">
+        <a:ln w="12700" cap="flat" cmpd="sng" algn="ctr">
           <a:solidFill>
             <a:schemeClr val="phClr"/>
           </a:solidFill>
           <a:prstDash val="solid"/>
+          <a:miter lim="800000"/>
+        </a:ln>
+        <a:ln w="19050" cap="flat" cmpd="sng" algn="ctr">
+          <a:solidFill>
+            <a:schemeClr val="phClr"/>
+          </a:solidFill>
+          <a:prstDash val="solid"/>
+          <a:miter lim="800000"/>
         </a:ln>
       </a:lnStyleLst>
       <a:effectStyleLst>
         <a:effectStyle>
+          <a:effectLst/>
+        </a:effectStyle>
+        <a:effectStyle>
+          <a:effectLst/>
+        </a:effectStyle>
+        <a:effectStyle>
           <a:effectLst>
-            <a:outerShdw blurRad="40000" dist="20000" dir="5400000" rotWithShape="0">
+            <a:outerShdw blurRad="57150" dist="19050" dir="5400000" algn="ctr" rotWithShape="0">
               <a:srgbClr val="000000">
-                <a:alpha val="38000"/>
+                <a:alpha val="63000"/>
               </a:srgbClr>
             </a:outerShdw>
           </a:effectLst>
-        </a:effectStyle>
-        <a:effectStyle>
-          <a:effectLst>
-            <a:outerShdw blurRad="40000" dist="23000" dir="5400000" rotWithShape="0">
-              <a:srgbClr val="000000">
-                <a:alpha val="35000"/>
-              </a:srgbClr>
-            </a:outerShdw>
-          </a:effectLst>
-        </a:effectStyle>
-        <a:effectStyle>
-          <a:effectLst>
-            <a:outerShdw blurRad="40000" dist="23000" dir="5400000" rotWithShape="0">
-              <a:srgbClr val="000000">
-                <a:alpha val="35000"/>
-              </a:srgbClr>
-            </a:outerShdw>
-          </a:effectLst>
-          <a:scene3d>
-            <a:camera prst="orthographicFront">
-              <a:rot lat="0" lon="0" rev="0"/>
-            </a:camera>
-            <a:lightRig rig="threePt" dir="t">
-              <a:rot lat="0" lon="0" rev="1200000"/>
-            </a:lightRig>
-          </a:scene3d>
-          <a:sp3d>
-            <a:bevelT w="63500" h="25400"/>
-          </a:sp3d>
         </a:effectStyle>
       </a:effectStyleLst>
       <a:bgFillStyleLst>
         <a:solidFill>
           <a:schemeClr val="phClr"/>
         </a:solidFill>
-        <a:gradFill rotWithShape="1">
-          <a:gsLst>
-            <a:gs pos="0">
-              <a:schemeClr val="phClr">
-                <a:tint val="40000"/>
-                <a:satMod val="350000"/>
-              </a:schemeClr>
-            </a:gs>
-            <a:gs pos="40000">
-              <a:schemeClr val="phClr">
-                <a:tint val="45000"/>
-                <a:shade val="99000"/>
-                <a:satMod val="350000"/>
-              </a:schemeClr>
-            </a:gs>
-            <a:gs pos="100000">
-              <a:schemeClr val="phClr">
-                <a:shade val="20000"/>
-                <a:satMod val="255000"/>
-              </a:schemeClr>
-            </a:gs>
-          </a:gsLst>
-          <a:path path="circle">
-            <a:fillToRect l="50000" t="-80000" r="50000" b="180000"/>
-          </a:path>
-        </a:gradFill>
-        <a:gradFill rotWithShape="1">
-          <a:gsLst>
-            <a:gs pos="0">
-              <a:schemeClr val="phClr">
-                <a:tint val="80000"/>
-                <a:satMod val="300000"/>
-              </a:schemeClr>
-            </a:gs>
-            <a:gs pos="100000">
-              <a:schemeClr val="phClr">
-                <a:shade val="30000"/>
-                <a:satMod val="200000"/>
-              </a:schemeClr>
-            </a:gs>
-          </a:gsLst>
-          <a:path path="circle">
-            <a:fillToRect l="50000" t="50000" r="50000" b="50000"/>
-          </a:path>
-        </a:gradFill>
-      </a:bgFillStyleLst>
-    </a:fmtScheme>
-  </a:themeElements>
-  <a:objectDefaults>
-    <a:spDef>
-      <a:spPr/>
-      <a:bodyPr/>
-      <a:lstStyle/>
-      <a:style>
-        <a:lnRef idx="1">
-          <a:schemeClr val="accent1"/>
-        </a:lnRef>
-        <a:fillRef idx="3">
-          <a:schemeClr val="accent1"/>
-        </a:fillRef>
-        <a:effectRef idx="2">
-          <a:schemeClr val="accent1"/>
-        </a:effectRef>
-        <a:fontRef idx="minor">
-          <a:schemeClr val="lt1"/>
-        </a:fontRef>
-      </a:style>
-    </a:spDef>
-    <a:lnDef>
-      <a:spPr/>
-      <a:bodyPr/>
-      <a:lstStyle/>
-      <a:style>
-        <a:lnRef idx="2">
-          <a:schemeClr val="accent1"/>
-        </a:lnRef>
-        <a:fillRef idx="0">
-          <a:schemeClr val="accent1"/>
-        </a:fillRef>
-        <a:effectRef idx="1">
-          <a:schemeClr val="accent1"/>
-        </a:effectRef>
-        <a:fontRef idx="minor">
-          <a:schemeClr val="tx1"/>
-        </a:fontRef>
-      </a:style>
-    </a:lnDef>
-  </a:objectDefaults>
-  <a:extraClrSchemeLst/>
-</a:theme>
-</file>
-
-<file path=ppt/theme/theme2.xml><?xml version="1.0" encoding="utf-8"?>
-<a:theme xmlns:a="http://schemas.openxmlformats.org/drawingml/2006/main" name="Office Theme">
-  <a:themeElements>
-    <a:clrScheme name="Office">
-      <a:dk1>
-        <a:sysClr val="windowText" lastClr="000000"/>
-      </a:dk1>
-      <a:lt1>
-        <a:sysClr val="window" lastClr="FFFFFF"/>
-      </a:lt1>
-      <a:dk2>
-        <a:srgbClr val="1F497D"/>
-      </a:dk2>
-      <a:lt2>
-        <a:srgbClr val="EEECE1"/>
-      </a:lt2>
-      <a:accent1>
-        <a:srgbClr val="4F81BD"/>
-      </a:accent1>
-      <a:accent2>
-        <a:srgbClr val="C0504D"/>
-      </a:accent2>
-      <a:accent3>
-        <a:srgbClr val="9BBB59"/>
-      </a:accent3>
-      <a:accent4>
-        <a:srgbClr val="8064A2"/>
-      </a:accent4>
-      <a:accent5>
-        <a:srgbClr val="4BACC6"/>
-      </a:accent5>
-      <a:accent6>
-        <a:srgbClr val="F79646"/>
-      </a:accent6>
-      <a:hlink>
-        <a:srgbClr val="0000FF"/>
-      </a:hlink>
-      <a:folHlink>
-        <a:srgbClr val="800080"/>
-      </a:folHlink>
-    </a:clrScheme>
-    <a:fontScheme name="Office">
-      <a:majorFont>
-        <a:latin typeface="Calibri"/>
-        <a:ea typeface=""/>
-        <a:cs typeface=""/>
-        <a:font script="Jpan" typeface="ＭＳ Ｐゴシック"/>
-        <a:font script="Hang" typeface="맑은 고딕"/>
-        <a:font script="Hans" typeface="宋体"/>
-        <a:font script="Hant" typeface="新細明體"/>
-        <a:font script="Arab" typeface="Times New Roman"/>
-        <a:font script="Hebr" typeface="Times New Roman"/>
-        <a:font script="Thai" typeface="Angsana New"/>
-        <a:font script="Ethi" typeface="Nyala"/>
-        <a:font script="Beng" typeface="Vrinda"/>
-        <a:font script="Gujr" typeface="Shruti"/>
-        <a:font script="Khmr" typeface="MoolBoran"/>
-        <a:font script="Knda" typeface="Tunga"/>
-        <a:font script="Guru" typeface="Raavi"/>
-        <a:font script="Cans" typeface="Euphemia"/>
-        <a:font script="Cher" typeface="Plantagenet Cherokee"/>
-        <a:font script="Yiii" typeface="Microsoft Yi Baiti"/>
-        <a:font script="Tibt" typeface="Microsoft Himalaya"/>
-        <a:font script="Thaa" typeface="MV Boli"/>
-        <a:font script="Deva" typeface="Mangal"/>
-        <a:font script="Telu" typeface="Gautami"/>
-        <a:font script="Taml" typeface="Latha"/>
-        <a:font script="Syrc" typeface="Estrangelo Edessa"/>
-        <a:font script="Orya" typeface="Kalinga"/>
-        <a:font script="Mlym" typeface="Kartika"/>
-        <a:font script="Laoo" typeface="DokChampa"/>
-        <a:font script="Sinh" typeface="Iskoola Pota"/>
-        <a:font script="Mong" typeface="Mongolian Baiti"/>
-        <a:font script="Viet" typeface="Times New Roman"/>
-        <a:font script="Uigh" typeface="Microsoft Uighur"/>
-        <a:font script="Geor" typeface="Sylfaen"/>
-      </a:majorFont>
-      <a:minorFont>
-        <a:latin typeface="Calibri"/>
-        <a:ea typeface=""/>
-        <a:cs typeface=""/>
-        <a:font script="Jpan" typeface="ＭＳ Ｐゴシック"/>
-        <a:font script="Hang" typeface="맑은 고딕"/>
-        <a:font script="Hans" typeface="宋体"/>
-        <a:font script="Hant" typeface="新細明體"/>
-        <a:font script="Arab" typeface="Arial"/>
-        <a:font script="Hebr" typeface="Arial"/>
-        <a:font script="Thai" typeface="Cordia New"/>
-        <a:font script="Ethi" typeface="Nyala"/>
-        <a:font script="Beng" typeface="Vrinda"/>
-        <a:font script="Gujr" typeface="Shruti"/>
-        <a:font script="Khmr" typeface="DaunPenh"/>
-        <a:font script="Knda" typeface="Tunga"/>
-        <a:font script="Guru" typeface="Raavi"/>
-        <a:font script="Cans" typeface="Euphemia"/>
-        <a:font script="Cher" typeface="Plantagenet Cherokee"/>
-        <a:font script="Yiii" typeface="Microsoft Yi Baiti"/>
-        <a:font script="Tibt" typeface="Microsoft Himalaya"/>
-        <a:font script="Thaa" typeface="MV Boli"/>
-        <a:font script="Deva" typeface="Mangal"/>
-        <a:font script="Telu" typeface="Gautami"/>
-        <a:font script="Taml" typeface="Latha"/>
-        <a:font script="Syrc" typeface="Estrangelo Edessa"/>
-        <a:font script="Orya" typeface="Kalinga"/>
-        <a:font script="Mlym" typeface="Kartika"/>
-        <a:font script="Laoo" typeface="DokChampa"/>
-        <a:font script="Sinh" typeface="Iskoola Pota"/>
-        <a:font script="Mong" typeface="Mongolian Baiti"/>
-        <a:font script="Viet" typeface="Arial"/>
-        <a:font script="Uigh" typeface="Microsoft Uighur"/>
-        <a:font script="Geor" typeface="Sylfaen"/>
-      </a:minorFont>
-    </a:fontScheme>
-    <a:fmtScheme name="Office">
-      <a:fillStyleLst>
         <a:solidFill>
-          <a:schemeClr val="phClr"/>
+          <a:schemeClr val="phClr">
+            <a:tint val="95000"/>
+            <a:satMod val="170000"/>
+          </a:schemeClr>
         </a:solidFill>
         <a:gradFill rotWithShape="1">
           <a:gsLst>
             <a:gs pos="0">
               <a:schemeClr val="phClr">
-                <a:tint val="50000"/>
-                <a:satMod val="300000"/>
+                <a:tint val="93000"/>
+                <a:satMod val="150000"/>
+                <a:shade val="98000"/>
+                <a:lumMod val="102000"/>
               </a:schemeClr>
             </a:gs>
-            <a:gs pos="35000">
+            <a:gs pos="50000">
               <a:schemeClr val="phClr">
-                <a:tint val="37000"/>
-                <a:satMod val="300000"/>
+                <a:tint val="98000"/>
+                <a:satMod val="130000"/>
+                <a:shade val="90000"/>
+                <a:lumMod val="103000"/>
               </a:schemeClr>
             </a:gs>
             <a:gs pos="100000">
               <a:schemeClr val="phClr">
-                <a:tint val="15000"/>
-                <a:satMod val="350000"/>
+                <a:shade val="63000"/>
+                <a:satMod val="120000"/>
               </a:schemeClr>
             </a:gs>
           </a:gsLst>
-          <a:lin ang="16200000" scaled="1"/>
-        </a:gradFill>
-        <a:gradFill rotWithShape="1">
-          <a:gsLst>
-            <a:gs pos="0">
-              <a:schemeClr val="phClr">
-                <a:tint val="100000"/>
-                <a:shade val="100000"/>
-                <a:satMod val="130000"/>
-              </a:schemeClr>
-            </a:gs>
-            <a:gs pos="100000">
-              <a:schemeClr val="phClr">
-                <a:tint val="50000"/>
-                <a:shade val="100000"/>
-                <a:satMod val="350000"/>
-              </a:schemeClr>
-            </a:gs>
-          </a:gsLst>
-          <a:lin ang="16200000" scaled="0"/>
-        </a:gradFill>
-      </a:fillStyleLst>
-      <a:lnStyleLst>
-        <a:ln w="9525" cap="flat" cmpd="sng" algn="ctr">
-          <a:solidFill>
-            <a:schemeClr val="phClr">
-              <a:shade val="95000"/>
-              <a:satMod val="105000"/>
-            </a:schemeClr>
-          </a:solidFill>
-          <a:prstDash val="solid"/>
-        </a:ln>
-        <a:ln w="25400" cap="flat" cmpd="sng" algn="ctr">
-          <a:solidFill>
-            <a:schemeClr val="phClr"/>
-          </a:solidFill>
-          <a:prstDash val="solid"/>
-        </a:ln>
-        <a:ln w="38100" cap="flat" cmpd="sng" algn="ctr">
-          <a:solidFill>
-            <a:schemeClr val="phClr"/>
-          </a:solidFill>
-          <a:prstDash val="solid"/>
-        </a:ln>
-      </a:lnStyleLst>
-      <a:effectStyleLst>
-        <a:effectStyle>
-          <a:effectLst>
-            <a:outerShdw blurRad="40000" dist="20000" dir="5400000" rotWithShape="0">
-              <a:srgbClr val="000000">
-                <a:alpha val="38000"/>
-              </a:srgbClr>
-            </a:outerShdw>
-          </a:effectLst>
-        </a:effectStyle>
-        <a:effectStyle>
-          <a:effectLst>
-            <a:outerShdw blurRad="40000" dist="23000" dir="5400000" rotWithShape="0">
-              <a:srgbClr val="000000">
-                <a:alpha val="35000"/>
-              </a:srgbClr>
-            </a:outerShdw>
-          </a:effectLst>
-        </a:effectStyle>
-        <a:effectStyle>
-          <a:effectLst>
-            <a:outerShdw blurRad="40000" dist="23000" dir="5400000" rotWithShape="0">
-              <a:srgbClr val="000000">
-                <a:alpha val="35000"/>
-              </a:srgbClr>
-            </a:outerShdw>
-          </a:effectLst>
-          <a:scene3d>
-            <a:camera prst="orthographicFront">
-              <a:rot lat="0" lon="0" rev="0"/>
-            </a:camera>
-            <a:lightRig rig="threePt" dir="t">
-              <a:rot lat="0" lon="0" rev="1200000"/>
-            </a:lightRig>
-          </a:scene3d>
-          <a:sp3d>
-            <a:bevelT w="63500" h="25400"/>
-          </a:sp3d>
-        </a:effectStyle>
-      </a:effectStyleLst>
-      <a:bgFillStyleLst>
-        <a:solidFill>
-          <a:schemeClr val="phClr"/>
-        </a:solidFill>
-        <a:gradFill rotWithShape="1">
-          <a:gsLst>
-            <a:gs pos="0">
-              <a:schemeClr val="phClr">
-                <a:tint val="40000"/>
-                <a:satMod val="350000"/>
-              </a:schemeClr>
-            </a:gs>
-            <a:gs pos="40000">
-              <a:schemeClr val="phClr">
-                <a:tint val="45000"/>
-                <a:shade val="99000"/>
-                <a:satMod val="350000"/>
-              </a:schemeClr>
-            </a:gs>
-            <a:gs pos="100000">
-              <a:schemeClr val="phClr">
-                <a:shade val="20000"/>
-                <a:satMod val="255000"/>
-              </a:schemeClr>
-            </a:gs>
-          </a:gsLst>
-          <a:path path="circle">
-            <a:fillToRect l="50000" t="-80000" r="50000" b="180000"/>
-          </a:path>
-        </a:gradFill>
-        <a:gradFill rotWithShape="1">
-          <a:gsLst>
-            <a:gs pos="0">
-              <a:schemeClr val="phClr">
-                <a:tint val="80000"/>
-                <a:satMod val="300000"/>
-              </a:schemeClr>
-            </a:gs>
-            <a:gs pos="100000">
-              <a:schemeClr val="phClr">
-                <a:shade val="30000"/>
-                <a:satMod val="200000"/>
-              </a:schemeClr>
-            </a:gs>
-          </a:gsLst>
-          <a:path path="circle">
-            <a:fillToRect l="50000" t="50000" r="50000" b="50000"/>
-          </a:path>
+          <a:lin ang="5400000" scaled="0"/>
         </a:gradFill>
       </a:bgFillStyleLst>
     </a:fmtScheme>
   </a:themeElements>
-  <a:objectDefaults>
-    <a:spDef>
-      <a:spPr/>
-      <a:bodyPr/>
-      <a:lstStyle/>
-      <a:style>
-        <a:lnRef idx="1">
-          <a:schemeClr val="accent1"/>
-        </a:lnRef>
-        <a:fillRef idx="3">
-          <a:schemeClr val="accent1"/>
-        </a:fillRef>
-        <a:effectRef idx="2">
-          <a:schemeClr val="accent1"/>
-        </a:effectRef>
-        <a:fontRef idx="minor">
-          <a:schemeClr val="lt1"/>
-        </a:fontRef>
-      </a:style>
-    </a:spDef>
-    <a:lnDef>
-      <a:spPr/>
-      <a:bodyPr/>
-      <a:lstStyle/>
-      <a:style>
-        <a:lnRef idx="2">
-          <a:schemeClr val="accent1"/>
-        </a:lnRef>
-        <a:fillRef idx="0">
-          <a:schemeClr val="accent1"/>
-        </a:fillRef>
-        <a:effectRef idx="1">
-          <a:schemeClr val="accent1"/>
-        </a:effectRef>
-        <a:fontRef idx="minor">
-          <a:schemeClr val="tx1"/>
-        </a:fontRef>
-      </a:style>
-    </a:lnDef>
-  </a:objectDefaults>
+  <a:objectDefaults/>
   <a:extraClrSchemeLst/>
+  <a:extLst>
+    <a:ext uri="{05A4C25C-085E-4340-85A3-A5531E510DB2}">
+      <thm15:themeFamily xmlns:thm15="http://schemas.microsoft.com/office/thememl/2012/main" name="Office Theme" id="{62F939B6-93AF-4DB8-9C6B-D6C7DFDC589F}" vid="{4A3C46E8-61CC-4603-A589-7422A47A8E4A}"/>
+    </a:ext>
+  </a:extLst>
 </a:theme>
 </file>
</xml_diff>

<commit_message>
new slides.  Lots of tweaks to layout lab
</commit_message>
<xml_diff>
--- a/labs/Laying-Out-The-Board/Laying-Out-The-Board.pptx
+++ b/labs/Laying-Out-The-Board/Laying-Out-The-Board.pptx
@@ -8,28 +8,29 @@
     <p:sldId id="292" r:id="rId2"/>
     <p:sldId id="270" r:id="rId3"/>
     <p:sldId id="315" r:id="rId4"/>
-    <p:sldId id="314" r:id="rId5"/>
-    <p:sldId id="272" r:id="rId6"/>
-    <p:sldId id="271" r:id="rId7"/>
-    <p:sldId id="317" r:id="rId8"/>
-    <p:sldId id="273" r:id="rId9"/>
-    <p:sldId id="275" r:id="rId10"/>
-    <p:sldId id="316" r:id="rId11"/>
-    <p:sldId id="281" r:id="rId12"/>
-    <p:sldId id="290" r:id="rId13"/>
-    <p:sldId id="289" r:id="rId14"/>
-    <p:sldId id="276" r:id="rId15"/>
-    <p:sldId id="318" r:id="rId16"/>
-    <p:sldId id="261" r:id="rId17"/>
-    <p:sldId id="262" r:id="rId18"/>
-    <p:sldId id="268" r:id="rId19"/>
-    <p:sldId id="263" r:id="rId20"/>
-    <p:sldId id="264" r:id="rId21"/>
-    <p:sldId id="265" r:id="rId22"/>
-    <p:sldId id="319" r:id="rId23"/>
-    <p:sldId id="320" r:id="rId24"/>
-    <p:sldId id="321" r:id="rId25"/>
-    <p:sldId id="322" r:id="rId26"/>
+    <p:sldId id="284" r:id="rId5"/>
+    <p:sldId id="314" r:id="rId6"/>
+    <p:sldId id="272" r:id="rId7"/>
+    <p:sldId id="271" r:id="rId8"/>
+    <p:sldId id="317" r:id="rId9"/>
+    <p:sldId id="273" r:id="rId10"/>
+    <p:sldId id="275" r:id="rId11"/>
+    <p:sldId id="316" r:id="rId12"/>
+    <p:sldId id="281" r:id="rId13"/>
+    <p:sldId id="290" r:id="rId14"/>
+    <p:sldId id="289" r:id="rId15"/>
+    <p:sldId id="276" r:id="rId16"/>
+    <p:sldId id="318" r:id="rId17"/>
+    <p:sldId id="261" r:id="rId18"/>
+    <p:sldId id="262" r:id="rId19"/>
+    <p:sldId id="268" r:id="rId20"/>
+    <p:sldId id="263" r:id="rId21"/>
+    <p:sldId id="264" r:id="rId22"/>
+    <p:sldId id="265" r:id="rId23"/>
+    <p:sldId id="319" r:id="rId24"/>
+    <p:sldId id="320" r:id="rId25"/>
+    <p:sldId id="321" r:id="rId26"/>
+    <p:sldId id="322" r:id="rId27"/>
   </p:sldIdLst>
   <p:sldSz cx="12192000" cy="6858000"/>
   <p:notesSz cx="6858000" cy="9144000"/>
@@ -128,6 +129,11 @@
       </a:defRPr>
     </a:lvl9pPr>
   </p:defaultTextStyle>
+  <p:extLst>
+    <p:ext uri="{EFAFB233-063F-42B5-8137-9DF3F51BA10A}">
+      <p15:sldGuideLst xmlns:p15="http://schemas.microsoft.com/office/powerpoint/2012/main"/>
+    </p:ext>
+  </p:extLst>
 </p:presentation>
 </file>
 
@@ -278,7 +284,7 @@
           <a:p>
             <a:fld id="{543EA0BC-44CB-0248-A89B-C226E29B5A5F}" type="datetimeFigureOut">
               <a:rPr lang="en-US" smtClean="0"/>
-              <a:t>3/11/19</a:t>
+              <a:t>4/18/19</a:t>
             </a:fld>
             <a:endParaRPr lang="en-US"/>
           </a:p>
@@ -476,7 +482,7 @@
           <a:p>
             <a:fld id="{543EA0BC-44CB-0248-A89B-C226E29B5A5F}" type="datetimeFigureOut">
               <a:rPr lang="en-US" smtClean="0"/>
-              <a:t>3/11/19</a:t>
+              <a:t>4/18/19</a:t>
             </a:fld>
             <a:endParaRPr lang="en-US"/>
           </a:p>
@@ -684,7 +690,7 @@
           <a:p>
             <a:fld id="{543EA0BC-44CB-0248-A89B-C226E29B5A5F}" type="datetimeFigureOut">
               <a:rPr lang="en-US" smtClean="0"/>
-              <a:t>3/11/19</a:t>
+              <a:t>4/18/19</a:t>
             </a:fld>
             <a:endParaRPr lang="en-US"/>
           </a:p>
@@ -882,7 +888,7 @@
           <a:p>
             <a:fld id="{543EA0BC-44CB-0248-A89B-C226E29B5A5F}" type="datetimeFigureOut">
               <a:rPr lang="en-US" smtClean="0"/>
-              <a:t>3/11/19</a:t>
+              <a:t>4/18/19</a:t>
             </a:fld>
             <a:endParaRPr lang="en-US"/>
           </a:p>
@@ -1157,7 +1163,7 @@
           <a:p>
             <a:fld id="{543EA0BC-44CB-0248-A89B-C226E29B5A5F}" type="datetimeFigureOut">
               <a:rPr lang="en-US" smtClean="0"/>
-              <a:t>3/11/19</a:t>
+              <a:t>4/18/19</a:t>
             </a:fld>
             <a:endParaRPr lang="en-US"/>
           </a:p>
@@ -1422,7 +1428,7 @@
           <a:p>
             <a:fld id="{543EA0BC-44CB-0248-A89B-C226E29B5A5F}" type="datetimeFigureOut">
               <a:rPr lang="en-US" smtClean="0"/>
-              <a:t>3/11/19</a:t>
+              <a:t>4/18/19</a:t>
             </a:fld>
             <a:endParaRPr lang="en-US"/>
           </a:p>
@@ -1834,7 +1840,7 @@
           <a:p>
             <a:fld id="{543EA0BC-44CB-0248-A89B-C226E29B5A5F}" type="datetimeFigureOut">
               <a:rPr lang="en-US" smtClean="0"/>
-              <a:t>3/11/19</a:t>
+              <a:t>4/18/19</a:t>
             </a:fld>
             <a:endParaRPr lang="en-US"/>
           </a:p>
@@ -1975,7 +1981,7 @@
           <a:p>
             <a:fld id="{543EA0BC-44CB-0248-A89B-C226E29B5A5F}" type="datetimeFigureOut">
               <a:rPr lang="en-US" smtClean="0"/>
-              <a:t>3/11/19</a:t>
+              <a:t>4/18/19</a:t>
             </a:fld>
             <a:endParaRPr lang="en-US"/>
           </a:p>
@@ -2088,7 +2094,7 @@
           <a:p>
             <a:fld id="{543EA0BC-44CB-0248-A89B-C226E29B5A5F}" type="datetimeFigureOut">
               <a:rPr lang="en-US" smtClean="0"/>
-              <a:t>3/11/19</a:t>
+              <a:t>4/18/19</a:t>
             </a:fld>
             <a:endParaRPr lang="en-US"/>
           </a:p>
@@ -2399,7 +2405,7 @@
           <a:p>
             <a:fld id="{543EA0BC-44CB-0248-A89B-C226E29B5A5F}" type="datetimeFigureOut">
               <a:rPr lang="en-US" smtClean="0"/>
-              <a:t>3/11/19</a:t>
+              <a:t>4/18/19</a:t>
             </a:fld>
             <a:endParaRPr lang="en-US"/>
           </a:p>
@@ -2687,7 +2693,7 @@
           <a:p>
             <a:fld id="{543EA0BC-44CB-0248-A89B-C226E29B5A5F}" type="datetimeFigureOut">
               <a:rPr lang="en-US" smtClean="0"/>
-              <a:t>3/11/19</a:t>
+              <a:t>4/18/19</a:t>
             </a:fld>
             <a:endParaRPr lang="en-US"/>
           </a:p>
@@ -2928,7 +2934,7 @@
           <a:p>
             <a:fld id="{543EA0BC-44CB-0248-A89B-C226E29B5A5F}" type="datetimeFigureOut">
               <a:rPr lang="en-US" smtClean="0"/>
-              <a:t>3/11/19</a:t>
+              <a:t>4/18/19</a:t>
             </a:fld>
             <a:endParaRPr lang="en-US"/>
           </a:p>
@@ -3362,7 +3368,7 @@
           <a:p>
             <a:r>
               <a:rPr lang="en-US" dirty="0"/>
-              <a:t>Lab 7: Board Layout</a:t>
+              <a:t>Laying Out the Board</a:t>
             </a:r>
           </a:p>
         </p:txBody>
@@ -3418,13 +3424,7 @@
       </p:grpSpPr>
       <p:sp>
         <p:nvSpPr>
-          <p:cNvPr id="2" name="Title 1">
-            <a:extLst>
-              <a:ext uri="{FF2B5EF4-FFF2-40B4-BE49-F238E27FC236}">
-                <a16:creationId xmlns:a16="http://schemas.microsoft.com/office/drawing/2014/main" id="{B7B344BA-110C-2248-981F-78B0BE3ADB88}"/>
-              </a:ext>
-            </a:extLst>
-          </p:cNvPr>
+          <p:cNvPr id="2" name="Title 1"/>
           <p:cNvSpPr>
             <a:spLocks noGrp="1"/>
           </p:cNvSpPr>
@@ -3439,20 +3439,14 @@
           <a:p>
             <a:r>
               <a:rPr lang="en-US" dirty="0"/>
-              <a:t>Semi-Automatic Routing</a:t>
-            </a:r>
-          </a:p>
-        </p:txBody>
-      </p:sp>
-      <p:sp>
-        <p:nvSpPr>
-          <p:cNvPr id="3" name="Content Placeholder 2">
-            <a:extLst>
-              <a:ext uri="{FF2B5EF4-FFF2-40B4-BE49-F238E27FC236}">
-                <a16:creationId xmlns:a16="http://schemas.microsoft.com/office/drawing/2014/main" id="{394213D6-D2E1-5D4A-8D67-BE9AC27AF49A}"/>
-              </a:ext>
-            </a:extLst>
-          </p:cNvPr>
+              <a:t>Auto Router</a:t>
+            </a:r>
+          </a:p>
+        </p:txBody>
+      </p:sp>
+      <p:sp>
+        <p:nvSpPr>
+          <p:cNvPr id="3" name="Content Placeholder 2"/>
           <p:cNvSpPr>
             <a:spLocks noGrp="1"/>
           </p:cNvSpPr>
@@ -3462,45 +3456,55 @@
         </p:nvSpPr>
         <p:spPr/>
         <p:txBody>
-          <a:bodyPr/>
-          <a:lstStyle/>
-          <a:p>
-            <a:r>
-              <a:rPr lang="en-US" dirty="0"/>
-              <a:t>Route critical nets with follow me router</a:t>
+          <a:bodyPr>
+            <a:normAutofit/>
+          </a:bodyPr>
+          <a:lstStyle/>
+          <a:p>
+            <a:r>
+              <a:rPr lang="en-US" dirty="0"/>
+              <a:t>Mixed reputation</a:t>
             </a:r>
           </a:p>
           <a:p>
             <a:pPr lvl="1"/>
             <a:r>
               <a:rPr lang="en-US" dirty="0"/>
-              <a:t>Wires to antenna</a:t>
+              <a:t>It can’t do everything</a:t>
             </a:r>
           </a:p>
           <a:p>
             <a:pPr lvl="1"/>
             <a:r>
               <a:rPr lang="en-US" dirty="0"/>
-              <a:t>Wires to crystal</a:t>
+              <a:t>Sometimes it does a bad job</a:t>
             </a:r>
           </a:p>
           <a:p>
             <a:pPr lvl="1"/>
             <a:r>
               <a:rPr lang="en-US" dirty="0"/>
-              <a:t>Ground isolation for antenna and crystal</a:t>
-            </a:r>
-          </a:p>
-          <a:p>
-            <a:r>
-              <a:rPr lang="en-US" dirty="0"/>
-              <a:t>Fan out power and ground.</a:t>
-            </a:r>
-          </a:p>
-          <a:p>
-            <a:r>
-              <a:rPr lang="en-US" dirty="0"/>
-              <a:t>Autoroute everything else.</a:t>
+              <a:t>When it works, it’s great.</a:t>
+            </a:r>
+          </a:p>
+          <a:p>
+            <a:pPr lvl="1"/>
+            <a:r>
+              <a:rPr lang="en-US" dirty="0"/>
+              <a:t>Usually it needs some touch up.</a:t>
+            </a:r>
+          </a:p>
+          <a:p>
+            <a:r>
+              <a:rPr lang="en-US" dirty="0"/>
+              <a:t>Net classes (“Edit-&gt;Net Classes…”)</a:t>
+            </a:r>
+          </a:p>
+          <a:p>
+            <a:pPr lvl="1"/>
+            <a:r>
+              <a:rPr lang="en-US" dirty="0"/>
+              <a:t>Lets you set widths and clearances for different kinds of nets</a:t>
             </a:r>
           </a:p>
         </p:txBody>
@@ -3508,7 +3512,7 @@
     </p:spTree>
     <p:extLst>
       <p:ext uri="{BB962C8B-B14F-4D97-AF65-F5344CB8AC3E}">
-        <p14:creationId xmlns:p14="http://schemas.microsoft.com/office/powerpoint/2010/main" val="672917857"/>
+        <p14:creationId xmlns:p14="http://schemas.microsoft.com/office/powerpoint/2010/main" val="1928658376"/>
       </p:ext>
     </p:extLst>
   </p:cSld>
@@ -3537,7 +3541,13 @@
       </p:grpSpPr>
       <p:sp>
         <p:nvSpPr>
-          <p:cNvPr id="2" name="Title 1"/>
+          <p:cNvPr id="2" name="Title 1">
+            <a:extLst>
+              <a:ext uri="{FF2B5EF4-FFF2-40B4-BE49-F238E27FC236}">
+                <a16:creationId xmlns:a16="http://schemas.microsoft.com/office/drawing/2014/main" id="{B7B344BA-110C-2248-981F-78B0BE3ADB88}"/>
+              </a:ext>
+            </a:extLst>
+          </p:cNvPr>
           <p:cNvSpPr>
             <a:spLocks noGrp="1"/>
           </p:cNvSpPr>
@@ -3552,14 +3562,20 @@
           <a:p>
             <a:r>
               <a:rPr lang="en-US" dirty="0"/>
-              <a:t>Commands for Routing</a:t>
-            </a:r>
-          </a:p>
-        </p:txBody>
-      </p:sp>
-      <p:sp>
-        <p:nvSpPr>
-          <p:cNvPr id="3" name="Content Placeholder 2"/>
+              <a:t>Semi-Automatic Routing</a:t>
+            </a:r>
+          </a:p>
+        </p:txBody>
+      </p:sp>
+      <p:sp>
+        <p:nvSpPr>
+          <p:cNvPr id="3" name="Content Placeholder 2">
+            <a:extLst>
+              <a:ext uri="{FF2B5EF4-FFF2-40B4-BE49-F238E27FC236}">
+                <a16:creationId xmlns:a16="http://schemas.microsoft.com/office/drawing/2014/main" id="{394213D6-D2E1-5D4A-8D67-BE9AC27AF49A}"/>
+              </a:ext>
+            </a:extLst>
+          </p:cNvPr>
           <p:cNvSpPr>
             <a:spLocks noGrp="1"/>
           </p:cNvSpPr>
@@ -3569,54 +3585,53 @@
         </p:nvSpPr>
         <p:spPr/>
         <p:txBody>
-          <a:bodyPr>
-            <a:normAutofit/>
-          </a:bodyPr>
-          <a:lstStyle/>
-          <a:p>
-            <a:r>
-              <a:rPr lang="en-US" dirty="0"/>
-              <a:t>“Auto;” – run the auto router (leave off the “;” to configure the router.</a:t>
-            </a:r>
-          </a:p>
-          <a:p>
-            <a:r>
-              <a:rPr lang="en-US" dirty="0"/>
-              <a:t>“</a:t>
-            </a:r>
-            <a:r>
-              <a:rPr lang="en-US" dirty="0" err="1"/>
-              <a:t>Ripup</a:t>
-            </a:r>
-            <a:r>
-              <a:rPr lang="en-US" dirty="0"/>
-              <a:t>;” – </a:t>
-            </a:r>
-            <a:r>
-              <a:rPr lang="en-US" dirty="0" err="1"/>
-              <a:t>unroute</a:t>
-            </a:r>
-            <a:r>
-              <a:rPr lang="en-US" dirty="0"/>
-              <a:t> signals</a:t>
-            </a:r>
-          </a:p>
-          <a:p>
-            <a:r>
-              <a:rPr lang="en-US" dirty="0"/>
-              <a:t>“Show &lt;thing&gt;” – Highlight a net or part</a:t>
+          <a:bodyPr/>
+          <a:lstStyle/>
+          <a:p>
+            <a:r>
+              <a:rPr lang="en-US" dirty="0"/>
+              <a:t>Route critical nets with follow me router</a:t>
             </a:r>
           </a:p>
           <a:p>
             <a:pPr lvl="1"/>
-            <a:endParaRPr lang="en-US" dirty="0"/>
+            <a:r>
+              <a:rPr lang="en-US" dirty="0"/>
+              <a:t>Wires to antenna</a:t>
+            </a:r>
+          </a:p>
+          <a:p>
+            <a:pPr lvl="1"/>
+            <a:r>
+              <a:rPr lang="en-US" dirty="0"/>
+              <a:t>Wires to crystal</a:t>
+            </a:r>
+          </a:p>
+          <a:p>
+            <a:pPr lvl="1"/>
+            <a:r>
+              <a:rPr lang="en-US" dirty="0"/>
+              <a:t>Ground isolation for antenna and crystal</a:t>
+            </a:r>
+          </a:p>
+          <a:p>
+            <a:r>
+              <a:rPr lang="en-US" dirty="0"/>
+              <a:t>Fan out power and ground.</a:t>
+            </a:r>
+          </a:p>
+          <a:p>
+            <a:r>
+              <a:rPr lang="en-US" dirty="0"/>
+              <a:t>Autoroute everything else.</a:t>
+            </a:r>
           </a:p>
         </p:txBody>
       </p:sp>
     </p:spTree>
     <p:extLst>
       <p:ext uri="{BB962C8B-B14F-4D97-AF65-F5344CB8AC3E}">
-        <p14:creationId xmlns:p14="http://schemas.microsoft.com/office/powerpoint/2010/main" val="2599116900"/>
+        <p14:creationId xmlns:p14="http://schemas.microsoft.com/office/powerpoint/2010/main" val="672917857"/>
       </p:ext>
     </p:extLst>
   </p:cSld>
@@ -3660,7 +3675,7 @@
           <a:p>
             <a:r>
               <a:rPr lang="en-US" dirty="0"/>
-              <a:t>Design Rules Check</a:t>
+              <a:t>Commands for Routing</a:t>
             </a:r>
           </a:p>
         </p:txBody>
@@ -3677,41 +3692,42 @@
         </p:nvSpPr>
         <p:spPr/>
         <p:txBody>
-          <a:bodyPr/>
-          <a:lstStyle/>
-          <a:p>
-            <a:r>
-              <a:rPr lang="en-US" dirty="0"/>
-              <a:t>Checks that your board layout meets design requirements for manufacturing.</a:t>
-            </a:r>
-          </a:p>
-          <a:p>
-            <a:pPr lvl="1"/>
-            <a:r>
-              <a:rPr lang="en-US" dirty="0"/>
-              <a:t>Distance between traces and traces, traces and </a:t>
+          <a:bodyPr>
+            <a:normAutofit/>
+          </a:bodyPr>
+          <a:lstStyle/>
+          <a:p>
+            <a:r>
+              <a:rPr lang="en-US" dirty="0"/>
+              <a:t>“Auto;” – run the auto router (leave off the “;” to configure the router.</a:t>
+            </a:r>
+          </a:p>
+          <a:p>
+            <a:r>
+              <a:rPr lang="en-US" dirty="0"/>
+              <a:t>“</a:t>
             </a:r>
             <a:r>
               <a:rPr lang="en-US" dirty="0" err="1"/>
-              <a:t>vias</a:t>
-            </a:r>
-            <a:r>
-              <a:rPr lang="en-US" dirty="0"/>
-              <a:t>, etc.</a:t>
-            </a:r>
-          </a:p>
-          <a:p>
-            <a:pPr lvl="1"/>
-            <a:r>
-              <a:rPr lang="en-US" dirty="0"/>
-              <a:t>Trace width</a:t>
-            </a:r>
-          </a:p>
-          <a:p>
-            <a:pPr lvl="1"/>
-            <a:r>
-              <a:rPr lang="en-US" dirty="0"/>
-              <a:t>Etc.</a:t>
+              <a:t>Ripup</a:t>
+            </a:r>
+            <a:r>
+              <a:rPr lang="en-US" dirty="0"/>
+              <a:t>;” – </a:t>
+            </a:r>
+            <a:r>
+              <a:rPr lang="en-US" dirty="0" err="1"/>
+              <a:t>unroute</a:t>
+            </a:r>
+            <a:r>
+              <a:rPr lang="en-US" dirty="0"/>
+              <a:t> signals</a:t>
+            </a:r>
+          </a:p>
+          <a:p>
+            <a:r>
+              <a:rPr lang="en-US" dirty="0"/>
+              <a:t>“Show &lt;thing&gt;” – Highlight a net or part</a:t>
             </a:r>
           </a:p>
           <a:p>
@@ -3723,7 +3739,7 @@
     </p:spTree>
     <p:extLst>
       <p:ext uri="{BB962C8B-B14F-4D97-AF65-F5344CB8AC3E}">
-        <p14:creationId xmlns:p14="http://schemas.microsoft.com/office/powerpoint/2010/main" val="1419728546"/>
+        <p14:creationId xmlns:p14="http://schemas.microsoft.com/office/powerpoint/2010/main" val="2599116900"/>
       </p:ext>
     </p:extLst>
   </p:cSld>
@@ -3767,7 +3783,7 @@
           <a:p>
             <a:r>
               <a:rPr lang="en-US" dirty="0"/>
-              <a:t>Electrical Rules Check</a:t>
+              <a:t>Design Rules Check</a:t>
             </a:r>
           </a:p>
         </p:txBody>
@@ -3789,33 +3805,48 @@
           <a:p>
             <a:r>
               <a:rPr lang="en-US" dirty="0"/>
-              <a:t>This checks for common problems in schematics.</a:t>
-            </a:r>
-          </a:p>
-          <a:p>
-            <a:r>
-              <a:rPr lang="en-US" dirty="0"/>
-              <a:t>Make sure you understand the reason for the errors.</a:t>
-            </a:r>
-          </a:p>
-          <a:p>
-            <a:r>
-              <a:rPr lang="en-US" dirty="0"/>
-              <a:t>Fix them if you can.</a:t>
-            </a:r>
-          </a:p>
-          <a:p>
-            <a:r>
-              <a:rPr lang="en-US" dirty="0"/>
-              <a:t>Run it! </a:t>
-            </a:r>
+              <a:t>Checks that your board layout meets design requirements for manufacturing.</a:t>
+            </a:r>
+          </a:p>
+          <a:p>
+            <a:pPr lvl="1"/>
+            <a:r>
+              <a:rPr lang="en-US" dirty="0"/>
+              <a:t>Distance between traces and traces, traces and </a:t>
+            </a:r>
+            <a:r>
+              <a:rPr lang="en-US" dirty="0" err="1"/>
+              <a:t>vias</a:t>
+            </a:r>
+            <a:r>
+              <a:rPr lang="en-US" dirty="0"/>
+              <a:t>, etc.</a:t>
+            </a:r>
+          </a:p>
+          <a:p>
+            <a:pPr lvl="1"/>
+            <a:r>
+              <a:rPr lang="en-US" dirty="0"/>
+              <a:t>Trace width</a:t>
+            </a:r>
+          </a:p>
+          <a:p>
+            <a:pPr lvl="1"/>
+            <a:r>
+              <a:rPr lang="en-US" dirty="0"/>
+              <a:t>Etc.</a:t>
+            </a:r>
+          </a:p>
+          <a:p>
+            <a:pPr lvl="1"/>
+            <a:endParaRPr lang="en-US" dirty="0"/>
           </a:p>
         </p:txBody>
       </p:sp>
     </p:spTree>
     <p:extLst>
       <p:ext uri="{BB962C8B-B14F-4D97-AF65-F5344CB8AC3E}">
-        <p14:creationId xmlns:p14="http://schemas.microsoft.com/office/powerpoint/2010/main" val="505691184"/>
+        <p14:creationId xmlns:p14="http://schemas.microsoft.com/office/powerpoint/2010/main" val="1419728546"/>
       </p:ext>
     </p:extLst>
   </p:cSld>
@@ -3859,7 +3890,7 @@
           <a:p>
             <a:r>
               <a:rPr lang="en-US" dirty="0"/>
-              <a:t>Semi-Auto Routing Demo</a:t>
+              <a:t>Electrical Rules Check</a:t>
             </a:r>
           </a:p>
         </p:txBody>
@@ -3879,14 +3910,35 @@
           <a:bodyPr/>
           <a:lstStyle/>
           <a:p>
-            <a:endParaRPr lang="en-US" dirty="0"/>
+            <a:r>
+              <a:rPr lang="en-US" dirty="0"/>
+              <a:t>This checks for common problems in schematics.</a:t>
+            </a:r>
+          </a:p>
+          <a:p>
+            <a:r>
+              <a:rPr lang="en-US" dirty="0"/>
+              <a:t>Make sure you understand the reason for the errors.</a:t>
+            </a:r>
+          </a:p>
+          <a:p>
+            <a:r>
+              <a:rPr lang="en-US" dirty="0"/>
+              <a:t>Fix them if you can.</a:t>
+            </a:r>
+          </a:p>
+          <a:p>
+            <a:r>
+              <a:rPr lang="en-US" dirty="0"/>
+              <a:t>Run it! </a:t>
+            </a:r>
           </a:p>
         </p:txBody>
       </p:sp>
     </p:spTree>
     <p:extLst>
       <p:ext uri="{BB962C8B-B14F-4D97-AF65-F5344CB8AC3E}">
-        <p14:creationId xmlns:p14="http://schemas.microsoft.com/office/powerpoint/2010/main" val="3286188797"/>
+        <p14:creationId xmlns:p14="http://schemas.microsoft.com/office/powerpoint/2010/main" val="505691184"/>
       </p:ext>
     </p:extLst>
   </p:cSld>
@@ -3915,13 +3967,7 @@
       </p:grpSpPr>
       <p:sp>
         <p:nvSpPr>
-          <p:cNvPr id="2" name="Title 1">
-            <a:extLst>
-              <a:ext uri="{FF2B5EF4-FFF2-40B4-BE49-F238E27FC236}">
-                <a16:creationId xmlns:a16="http://schemas.microsoft.com/office/drawing/2014/main" id="{55A17526-2B88-AE4A-9C59-7889AE66DC10}"/>
-              </a:ext>
-            </a:extLst>
-          </p:cNvPr>
+          <p:cNvPr id="2" name="Title 1"/>
           <p:cNvSpPr>
             <a:spLocks noGrp="1"/>
           </p:cNvSpPr>
@@ -3936,40 +3982,34 @@
           <a:p>
             <a:r>
               <a:rPr lang="en-US" dirty="0"/>
-              <a:t>CAM Files</a:t>
-            </a:r>
-          </a:p>
-        </p:txBody>
-      </p:sp>
-      <p:sp>
-        <p:nvSpPr>
-          <p:cNvPr id="3" name="Text Placeholder 2">
-            <a:extLst>
-              <a:ext uri="{FF2B5EF4-FFF2-40B4-BE49-F238E27FC236}">
-                <a16:creationId xmlns:a16="http://schemas.microsoft.com/office/drawing/2014/main" id="{859EE15E-C860-FA40-B8BE-14B198888DF6}"/>
-              </a:ext>
-            </a:extLst>
-          </p:cNvPr>
-          <p:cNvSpPr>
-            <a:spLocks noGrp="1"/>
-          </p:cNvSpPr>
-          <p:nvPr>
-            <p:ph type="body" idx="1"/>
-          </p:nvPr>
-        </p:nvSpPr>
-        <p:spPr/>
-        <p:txBody>
-          <a:bodyPr/>
-          <a:lstStyle/>
-          <a:p>
-            <a:endParaRPr lang="en-US"/>
+              <a:t>Semi-Auto Routing Demo</a:t>
+            </a:r>
+          </a:p>
+        </p:txBody>
+      </p:sp>
+      <p:sp>
+        <p:nvSpPr>
+          <p:cNvPr id="3" name="Content Placeholder 2"/>
+          <p:cNvSpPr>
+            <a:spLocks noGrp="1"/>
+          </p:cNvSpPr>
+          <p:nvPr>
+            <p:ph idx="1"/>
+          </p:nvPr>
+        </p:nvSpPr>
+        <p:spPr/>
+        <p:txBody>
+          <a:bodyPr/>
+          <a:lstStyle/>
+          <a:p>
+            <a:endParaRPr lang="en-US" dirty="0"/>
           </a:p>
         </p:txBody>
       </p:sp>
     </p:spTree>
     <p:extLst>
       <p:ext uri="{BB962C8B-B14F-4D97-AF65-F5344CB8AC3E}">
-        <p14:creationId xmlns:p14="http://schemas.microsoft.com/office/powerpoint/2010/main" val="3744426911"/>
+        <p14:creationId xmlns:p14="http://schemas.microsoft.com/office/powerpoint/2010/main" val="3286188797"/>
       </p:ext>
     </p:extLst>
   </p:cSld>
@@ -3998,7 +4038,13 @@
       </p:grpSpPr>
       <p:sp>
         <p:nvSpPr>
-          <p:cNvPr id="2" name="Title 1"/>
+          <p:cNvPr id="2" name="Title 1">
+            <a:extLst>
+              <a:ext uri="{FF2B5EF4-FFF2-40B4-BE49-F238E27FC236}">
+                <a16:creationId xmlns:a16="http://schemas.microsoft.com/office/drawing/2014/main" id="{55A17526-2B88-AE4A-9C59-7889AE66DC10}"/>
+              </a:ext>
+            </a:extLst>
+          </p:cNvPr>
           <p:cNvSpPr>
             <a:spLocks noGrp="1"/>
           </p:cNvSpPr>
@@ -4013,155 +4059,40 @@
           <a:p>
             <a:r>
               <a:rPr lang="en-US" dirty="0"/>
-              <a:t>CAM Layers (Gerber files)</a:t>
-            </a:r>
-          </a:p>
-        </p:txBody>
-      </p:sp>
-      <p:sp>
-        <p:nvSpPr>
-          <p:cNvPr id="3" name="Content Placeholder 2"/>
-          <p:cNvSpPr>
-            <a:spLocks noGrp="1"/>
-          </p:cNvSpPr>
-          <p:nvPr>
-            <p:ph idx="1"/>
-          </p:nvPr>
-        </p:nvSpPr>
-        <p:spPr/>
-        <p:txBody>
-          <a:bodyPr>
-            <a:normAutofit fontScale="62500" lnSpcReduction="20000"/>
-          </a:bodyPr>
-          <a:lstStyle/>
-          <a:p>
-            <a:r>
-              <a:rPr lang="en-US" dirty="0"/>
-              <a:t>Eagle layers are for design.</a:t>
-            </a:r>
-          </a:p>
-          <a:p>
-            <a:r>
-              <a:rPr lang="en-US" dirty="0"/>
-              <a:t>CAM layers are for manufacturing</a:t>
-            </a:r>
-          </a:p>
-          <a:p>
-            <a:pPr lvl="1"/>
-            <a:r>
-              <a:rPr lang="en-US" dirty="0"/>
-              <a:t>“Gerber” files are for lithographic steps</a:t>
-            </a:r>
-          </a:p>
-          <a:p>
-            <a:pPr lvl="1"/>
-            <a:r>
-              <a:rPr lang="en-US" dirty="0"/>
-              <a:t>Drill files are for drilling holes.</a:t>
-            </a:r>
-          </a:p>
-          <a:p>
-            <a:r>
-              <a:rPr lang="en-US" dirty="0"/>
-              <a:t>Each CAM layers corresponds to one layer of the resulting board</a:t>
-            </a:r>
-          </a:p>
-          <a:p>
-            <a:pPr lvl="1"/>
-            <a:r>
-              <a:rPr lang="en-US" dirty="0"/>
-              <a:t>Top silk screen (.PLC)</a:t>
-            </a:r>
-          </a:p>
-          <a:p>
-            <a:pPr lvl="1"/>
-            <a:r>
-              <a:rPr lang="en-US" dirty="0"/>
-              <a:t>Top solder mask (.STC)</a:t>
-            </a:r>
-          </a:p>
-          <a:p>
-            <a:pPr lvl="1"/>
-            <a:r>
-              <a:rPr lang="en-US" dirty="0"/>
-              <a:t>Top metal (.TOP)</a:t>
-            </a:r>
-          </a:p>
-          <a:p>
-            <a:pPr lvl="1"/>
-            <a:r>
-              <a:rPr lang="en-US" dirty="0"/>
-              <a:t>Inner metal layers</a:t>
-            </a:r>
-          </a:p>
-          <a:p>
-            <a:pPr lvl="1"/>
-            <a:r>
-              <a:rPr lang="en-US" dirty="0"/>
-              <a:t>Bottom metal (.BOT)</a:t>
-            </a:r>
-          </a:p>
-          <a:p>
-            <a:pPr lvl="1"/>
-            <a:r>
-              <a:rPr lang="en-US" dirty="0"/>
-              <a:t>Bottom solder mask (.STS)</a:t>
-            </a:r>
-          </a:p>
-          <a:p>
-            <a:pPr lvl="1"/>
-            <a:r>
-              <a:rPr lang="en-US" dirty="0"/>
-              <a:t>Bottom silk screen (.PLS)</a:t>
-            </a:r>
-          </a:p>
-          <a:p>
-            <a:pPr lvl="1"/>
-            <a:r>
-              <a:rPr lang="en-US" dirty="0"/>
-              <a:t>Different board houses have different suffixes.</a:t>
-            </a:r>
-          </a:p>
-          <a:p>
-            <a:r>
-              <a:rPr lang="en-US" dirty="0"/>
-              <a:t>One drill file specifying where all the pads, </a:t>
-            </a:r>
-            <a:r>
-              <a:rPr lang="en-US" dirty="0" err="1"/>
-              <a:t>vias</a:t>
-            </a:r>
-            <a:r>
-              <a:rPr lang="en-US" dirty="0"/>
-              <a:t>, and mounting holes are located and their diameters (.DRD)</a:t>
-            </a:r>
-          </a:p>
-          <a:p>
-            <a:r>
-              <a:rPr lang="en-US" dirty="0"/>
-              <a:t>Other files too, depending on the manufacturing process</a:t>
-            </a:r>
-          </a:p>
-          <a:p>
-            <a:pPr lvl="1"/>
-            <a:r>
-              <a:rPr lang="en-US" dirty="0"/>
-              <a:t>Solder paste stencil</a:t>
-            </a:r>
-          </a:p>
-          <a:p>
-            <a:pPr lvl="1"/>
-            <a:r>
-              <a:rPr lang="en-US" dirty="0"/>
-              <a:t>Assembly drawings</a:t>
-            </a:r>
+              <a:t>CAM Files</a:t>
+            </a:r>
+          </a:p>
+        </p:txBody>
+      </p:sp>
+      <p:sp>
+        <p:nvSpPr>
+          <p:cNvPr id="3" name="Text Placeholder 2">
+            <a:extLst>
+              <a:ext uri="{FF2B5EF4-FFF2-40B4-BE49-F238E27FC236}">
+                <a16:creationId xmlns:a16="http://schemas.microsoft.com/office/drawing/2014/main" id="{859EE15E-C860-FA40-B8BE-14B198888DF6}"/>
+              </a:ext>
+            </a:extLst>
+          </p:cNvPr>
+          <p:cNvSpPr>
+            <a:spLocks noGrp="1"/>
+          </p:cNvSpPr>
+          <p:nvPr>
+            <p:ph type="body" idx="1"/>
+          </p:nvPr>
+        </p:nvSpPr>
+        <p:spPr/>
+        <p:txBody>
+          <a:bodyPr/>
+          <a:lstStyle/>
+          <a:p>
+            <a:endParaRPr lang="en-US"/>
           </a:p>
         </p:txBody>
       </p:sp>
     </p:spTree>
     <p:extLst>
       <p:ext uri="{BB962C8B-B14F-4D97-AF65-F5344CB8AC3E}">
-        <p14:creationId xmlns:p14="http://schemas.microsoft.com/office/powerpoint/2010/main" val="566385594"/>
+        <p14:creationId xmlns:p14="http://schemas.microsoft.com/office/powerpoint/2010/main" val="3744426911"/>
       </p:ext>
     </p:extLst>
   </p:cSld>
@@ -4205,7 +4136,7 @@
           <a:p>
             <a:r>
               <a:rPr lang="en-US" dirty="0"/>
-              <a:t>The CAM Processor</a:t>
+              <a:t>CAM Layers (Gerber files)</a:t>
             </a:r>
           </a:p>
         </p:txBody>
@@ -4222,59 +4153,138 @@
         </p:nvSpPr>
         <p:spPr/>
         <p:txBody>
-          <a:bodyPr/>
-          <a:lstStyle/>
-          <a:p>
-            <a:r>
-              <a:rPr lang="en-US" dirty="0"/>
-              <a:t>The CAM Processor generates CAM files</a:t>
-            </a:r>
-          </a:p>
-          <a:p>
-            <a:r>
-              <a:rPr lang="en-US" dirty="0"/>
-              <a:t>The exact configuration for the </a:t>
+          <a:bodyPr>
+            <a:normAutofit fontScale="62500" lnSpcReduction="20000"/>
+          </a:bodyPr>
+          <a:lstStyle/>
+          <a:p>
+            <a:r>
+              <a:rPr lang="en-US" dirty="0"/>
+              <a:t>Eagle layers are for design.</a:t>
+            </a:r>
+          </a:p>
+          <a:p>
+            <a:r>
+              <a:rPr lang="en-US" dirty="0"/>
+              <a:t>CAM layers are for manufacturing</a:t>
+            </a:r>
+          </a:p>
+          <a:p>
+            <a:pPr lvl="1"/>
+            <a:r>
+              <a:rPr lang="en-US" dirty="0"/>
+              <a:t>“Gerber” files are for lithographic steps</a:t>
+            </a:r>
+          </a:p>
+          <a:p>
+            <a:pPr lvl="1"/>
+            <a:r>
+              <a:rPr lang="en-US" dirty="0"/>
+              <a:t>Drill files are for drilling holes.</a:t>
+            </a:r>
+          </a:p>
+          <a:p>
+            <a:r>
+              <a:rPr lang="en-US" dirty="0"/>
+              <a:t>Each CAM layers corresponds to one layer of the resulting board</a:t>
+            </a:r>
+          </a:p>
+          <a:p>
+            <a:pPr lvl="1"/>
+            <a:r>
+              <a:rPr lang="en-US" dirty="0"/>
+              <a:t>Top silk screen (.PLC)</a:t>
+            </a:r>
+          </a:p>
+          <a:p>
+            <a:pPr lvl="1"/>
+            <a:r>
+              <a:rPr lang="en-US" dirty="0"/>
+              <a:t>Top solder mask (.STC)</a:t>
+            </a:r>
+          </a:p>
+          <a:p>
+            <a:pPr lvl="1"/>
+            <a:r>
+              <a:rPr lang="en-US" dirty="0"/>
+              <a:t>Top metal (.TOP)</a:t>
+            </a:r>
+          </a:p>
+          <a:p>
+            <a:pPr lvl="1"/>
+            <a:r>
+              <a:rPr lang="en-US" dirty="0"/>
+              <a:t>Inner metal layers</a:t>
+            </a:r>
+          </a:p>
+          <a:p>
+            <a:pPr lvl="1"/>
+            <a:r>
+              <a:rPr lang="en-US" dirty="0"/>
+              <a:t>Bottom metal (.BOT)</a:t>
+            </a:r>
+          </a:p>
+          <a:p>
+            <a:pPr lvl="1"/>
+            <a:r>
+              <a:rPr lang="en-US" dirty="0"/>
+              <a:t>Bottom solder mask (.STS)</a:t>
+            </a:r>
+          </a:p>
+          <a:p>
+            <a:pPr lvl="1"/>
+            <a:r>
+              <a:rPr lang="en-US" dirty="0"/>
+              <a:t>Bottom silk screen (.PLS)</a:t>
+            </a:r>
+          </a:p>
+          <a:p>
+            <a:pPr lvl="1"/>
+            <a:r>
+              <a:rPr lang="en-US" dirty="0"/>
+              <a:t>Different board houses have different suffixes.</a:t>
+            </a:r>
+          </a:p>
+          <a:p>
+            <a:r>
+              <a:rPr lang="en-US" dirty="0"/>
+              <a:t>One drill file specifying where all the pads, </a:t>
             </a:r>
             <a:r>
               <a:rPr lang="en-US" dirty="0" err="1"/>
-              <a:t>gerber</a:t>
-            </a:r>
-            <a:r>
-              <a:rPr lang="en-US" dirty="0"/>
-              <a:t> files varies by board house</a:t>
+              <a:t>vias</a:t>
+            </a:r>
+            <a:r>
+              <a:rPr lang="en-US" dirty="0"/>
+              <a:t>, and mounting holes are located and their diameters (.DRD)</a:t>
+            </a:r>
+          </a:p>
+          <a:p>
+            <a:r>
+              <a:rPr lang="en-US" dirty="0"/>
+              <a:t>Other files too, depending on the manufacturing process</a:t>
             </a:r>
           </a:p>
           <a:p>
             <a:pPr lvl="1"/>
             <a:r>
               <a:rPr lang="en-US" dirty="0"/>
-              <a:t>Should the board outline be in every layer?</a:t>
+              <a:t>Solder paste stencil</a:t>
             </a:r>
           </a:p>
           <a:p>
             <a:pPr lvl="1"/>
             <a:r>
               <a:rPr lang="en-US" dirty="0"/>
-              <a:t>Which format should the files be in (there are many)</a:t>
-            </a:r>
-          </a:p>
-          <a:p>
-            <a:pPr lvl="1"/>
-            <a:r>
-              <a:rPr lang="en-US" dirty="0"/>
-              <a:t>Should the back side layers be mirrored?</a:t>
-            </a:r>
-          </a:p>
-          <a:p>
-            <a:pPr lvl="1"/>
-            <a:endParaRPr lang="en-US" dirty="0"/>
+              <a:t>Assembly drawings</a:t>
+            </a:r>
           </a:p>
         </p:txBody>
       </p:sp>
     </p:spTree>
     <p:extLst>
       <p:ext uri="{BB962C8B-B14F-4D97-AF65-F5344CB8AC3E}">
-        <p14:creationId xmlns:p14="http://schemas.microsoft.com/office/powerpoint/2010/main" val="3816271031"/>
+        <p14:creationId xmlns:p14="http://schemas.microsoft.com/office/powerpoint/2010/main" val="566385594"/>
       </p:ext>
     </p:extLst>
   </p:cSld>
@@ -4318,7 +4328,7 @@
           <a:p>
             <a:r>
               <a:rPr lang="en-US" dirty="0"/>
-              <a:t>CAM Setup</a:t>
+              <a:t>The CAM Processor</a:t>
             </a:r>
           </a:p>
         </p:txBody>
@@ -4340,39 +4350,54 @@
           <a:p>
             <a:r>
               <a:rPr lang="en-US" dirty="0"/>
-              <a:t>To prepare </a:t>
+              <a:t>The CAM Processor generates CAM files</a:t>
+            </a:r>
+          </a:p>
+          <a:p>
+            <a:r>
+              <a:rPr lang="en-US" dirty="0"/>
+              <a:t>The exact configuration for the </a:t>
             </a:r>
             <a:r>
               <a:rPr lang="en-US" dirty="0" err="1"/>
-              <a:t>Gerbers</a:t>
-            </a:r>
-            <a:r>
-              <a:rPr lang="en-US" dirty="0"/>
-              <a:t> for a particular board house, you need CAM setup files (*.cam for Eagle)</a:t>
-            </a:r>
-          </a:p>
-          <a:p>
-            <a:r>
-              <a:rPr lang="en-US" dirty="0"/>
-              <a:t>This specifies how to generate each layer the board house needs.</a:t>
-            </a:r>
-          </a:p>
-          <a:p>
-            <a:r>
-              <a:rPr lang="en-US" dirty="0"/>
-              <a:t>See example in Button and </a:t>
-            </a:r>
-            <a:r>
-              <a:rPr lang="en-US"/>
-              <a:t>Light Tutorial.</a:t>
-            </a:r>
+              <a:t>gerber</a:t>
+            </a:r>
+            <a:r>
+              <a:rPr lang="en-US" dirty="0"/>
+              <a:t> files varies by board house</a:t>
+            </a:r>
+          </a:p>
+          <a:p>
+            <a:pPr lvl="1"/>
+            <a:r>
+              <a:rPr lang="en-US" dirty="0"/>
+              <a:t>Should the board outline be in every layer?</a:t>
+            </a:r>
+          </a:p>
+          <a:p>
+            <a:pPr lvl="1"/>
+            <a:r>
+              <a:rPr lang="en-US" dirty="0"/>
+              <a:t>Which format should the files be in (there are many)</a:t>
+            </a:r>
+          </a:p>
+          <a:p>
+            <a:pPr lvl="1"/>
+            <a:r>
+              <a:rPr lang="en-US" dirty="0"/>
+              <a:t>Should the back side layers be mirrored?</a:t>
+            </a:r>
+          </a:p>
+          <a:p>
+            <a:pPr lvl="1"/>
+            <a:endParaRPr lang="en-US" dirty="0"/>
           </a:p>
         </p:txBody>
       </p:sp>
     </p:spTree>
     <p:extLst>
       <p:ext uri="{BB962C8B-B14F-4D97-AF65-F5344CB8AC3E}">
-        <p14:creationId xmlns:p14="http://schemas.microsoft.com/office/powerpoint/2010/main" val="2430319984"/>
+        <p14:creationId xmlns:p14="http://schemas.microsoft.com/office/powerpoint/2010/main" val="3816271031"/>
       </p:ext>
     </p:extLst>
   </p:cSld>
@@ -4416,7 +4441,7 @@
           <a:p>
             <a:r>
               <a:rPr lang="en-US" dirty="0"/>
-              <a:t>CAM Demo</a:t>
+              <a:t>CAM Setup</a:t>
             </a:r>
           </a:p>
         </p:txBody>
@@ -4436,14 +4461,41 @@
           <a:bodyPr/>
           <a:lstStyle/>
           <a:p>
-            <a:endParaRPr lang="en-US"/>
+            <a:r>
+              <a:rPr lang="en-US" dirty="0"/>
+              <a:t>To prepare </a:t>
+            </a:r>
+            <a:r>
+              <a:rPr lang="en-US" dirty="0" err="1"/>
+              <a:t>Gerbers</a:t>
+            </a:r>
+            <a:r>
+              <a:rPr lang="en-US" dirty="0"/>
+              <a:t> for a particular board house, you need CAM setup files (*.cam for Eagle)</a:t>
+            </a:r>
+          </a:p>
+          <a:p>
+            <a:r>
+              <a:rPr lang="en-US" dirty="0"/>
+              <a:t>This specifies how to generate each layer the board house needs.</a:t>
+            </a:r>
+          </a:p>
+          <a:p>
+            <a:r>
+              <a:rPr lang="en-US" dirty="0"/>
+              <a:t>See example in Button and </a:t>
+            </a:r>
+            <a:r>
+              <a:rPr lang="en-US"/>
+              <a:t>Light Tutorial.</a:t>
+            </a:r>
           </a:p>
         </p:txBody>
       </p:sp>
     </p:spTree>
     <p:extLst>
       <p:ext uri="{BB962C8B-B14F-4D97-AF65-F5344CB8AC3E}">
-        <p14:creationId xmlns:p14="http://schemas.microsoft.com/office/powerpoint/2010/main" val="2136779027"/>
+        <p14:creationId xmlns:p14="http://schemas.microsoft.com/office/powerpoint/2010/main" val="2430319984"/>
       </p:ext>
     </p:extLst>
   </p:cSld>
@@ -4625,15 +4677,7 @@
           <a:p>
             <a:r>
               <a:rPr lang="en-US" dirty="0"/>
-              <a:t>Checking Your </a:t>
-            </a:r>
-            <a:r>
-              <a:rPr lang="en-US" dirty="0" err="1"/>
-              <a:t>Gerbers</a:t>
-            </a:r>
-            <a:r>
-              <a:rPr lang="en-US" dirty="0"/>
-              <a:t>!</a:t>
+              <a:t>CAM Demo</a:t>
             </a:r>
           </a:p>
         </p:txBody>
@@ -4653,80 +4697,14 @@
           <a:bodyPr/>
           <a:lstStyle/>
           <a:p>
-            <a:r>
-              <a:rPr lang="en-US" dirty="0"/>
-              <a:t>Eagle can’t display Gerber files itself</a:t>
-            </a:r>
-          </a:p>
-          <a:p>
-            <a:r>
-              <a:rPr lang="en-US" dirty="0"/>
-              <a:t>You need a 3</a:t>
-            </a:r>
-            <a:r>
-              <a:rPr lang="en-US" baseline="30000" dirty="0"/>
-              <a:t>rd</a:t>
-            </a:r>
-            <a:r>
-              <a:rPr lang="en-US" dirty="0"/>
-              <a:t> party tool</a:t>
-            </a:r>
-          </a:p>
-          <a:p>
-            <a:pPr lvl="1"/>
-            <a:r>
-              <a:rPr lang="en-US" dirty="0"/>
-              <a:t>See the Button and Light tutorial for recommendations</a:t>
-            </a:r>
-          </a:p>
-          <a:p>
-            <a:r>
-              <a:rPr lang="en-US" dirty="0"/>
-              <a:t>You should always check your </a:t>
-            </a:r>
-            <a:r>
-              <a:rPr lang="en-US" dirty="0" err="1"/>
-              <a:t>Gerbers</a:t>
-            </a:r>
-            <a:r>
-              <a:rPr lang="en-US" dirty="0"/>
-              <a:t>!</a:t>
-            </a:r>
-          </a:p>
-          <a:p>
-            <a:pPr lvl="1"/>
-            <a:r>
-              <a:rPr lang="en-US" dirty="0"/>
-              <a:t>Eagle has bugs (you should assume)</a:t>
-            </a:r>
-          </a:p>
-          <a:p>
-            <a:pPr lvl="1"/>
-            <a:r>
-              <a:rPr lang="en-US" dirty="0"/>
-              <a:t>You may have misconfigured something</a:t>
-            </a:r>
-          </a:p>
-          <a:p>
-            <a:pPr lvl="1"/>
-            <a:r>
-              <a:rPr lang="en-US" dirty="0"/>
-              <a:t>You may have put something in the wrong layer.</a:t>
-            </a:r>
-          </a:p>
-          <a:p>
-            <a:pPr lvl="1"/>
-            <a:endParaRPr lang="en-US" dirty="0"/>
-          </a:p>
-          <a:p>
-            <a:endParaRPr lang="en-US" dirty="0"/>
+            <a:endParaRPr lang="en-US"/>
           </a:p>
         </p:txBody>
       </p:sp>
     </p:spTree>
     <p:extLst>
       <p:ext uri="{BB962C8B-B14F-4D97-AF65-F5344CB8AC3E}">
-        <p14:creationId xmlns:p14="http://schemas.microsoft.com/office/powerpoint/2010/main" val="4286829495"/>
+        <p14:creationId xmlns:p14="http://schemas.microsoft.com/office/powerpoint/2010/main" val="2136779027"/>
       </p:ext>
     </p:extLst>
   </p:cSld>
@@ -4770,7 +4748,15 @@
           <a:p>
             <a:r>
               <a:rPr lang="en-US" dirty="0"/>
-              <a:t>Gerber Viewer Demo</a:t>
+              <a:t>Checking Your </a:t>
+            </a:r>
+            <a:r>
+              <a:rPr lang="en-US" dirty="0" err="1"/>
+              <a:t>Gerbers</a:t>
+            </a:r>
+            <a:r>
+              <a:rPr lang="en-US" dirty="0"/>
+              <a:t>!</a:t>
             </a:r>
           </a:p>
         </p:txBody>
@@ -4789,6 +4775,72 @@
         <p:txBody>
           <a:bodyPr/>
           <a:lstStyle/>
+          <a:p>
+            <a:r>
+              <a:rPr lang="en-US" dirty="0"/>
+              <a:t>Eagle can’t display Gerber files itself</a:t>
+            </a:r>
+          </a:p>
+          <a:p>
+            <a:r>
+              <a:rPr lang="en-US" dirty="0"/>
+              <a:t>You need a 3</a:t>
+            </a:r>
+            <a:r>
+              <a:rPr lang="en-US" baseline="30000" dirty="0"/>
+              <a:t>rd</a:t>
+            </a:r>
+            <a:r>
+              <a:rPr lang="en-US" dirty="0"/>
+              <a:t> party tool</a:t>
+            </a:r>
+          </a:p>
+          <a:p>
+            <a:pPr lvl="1"/>
+            <a:r>
+              <a:rPr lang="en-US" dirty="0"/>
+              <a:t>See the Button and Light tutorial for recommendations</a:t>
+            </a:r>
+          </a:p>
+          <a:p>
+            <a:r>
+              <a:rPr lang="en-US" dirty="0"/>
+              <a:t>You should always check your </a:t>
+            </a:r>
+            <a:r>
+              <a:rPr lang="en-US" dirty="0" err="1"/>
+              <a:t>Gerbers</a:t>
+            </a:r>
+            <a:r>
+              <a:rPr lang="en-US" dirty="0"/>
+              <a:t>!</a:t>
+            </a:r>
+          </a:p>
+          <a:p>
+            <a:pPr lvl="1"/>
+            <a:r>
+              <a:rPr lang="en-US" dirty="0"/>
+              <a:t>Eagle has bugs (you should assume)</a:t>
+            </a:r>
+          </a:p>
+          <a:p>
+            <a:pPr lvl="1"/>
+            <a:r>
+              <a:rPr lang="en-US" dirty="0"/>
+              <a:t>You may have misconfigured something</a:t>
+            </a:r>
+          </a:p>
+          <a:p>
+            <a:pPr lvl="1"/>
+            <a:r>
+              <a:rPr lang="en-US" dirty="0"/>
+              <a:t>You may have put something in the wrong layer.</a:t>
+            </a:r>
+          </a:p>
+          <a:p>
+            <a:pPr lvl="1"/>
+            <a:endParaRPr lang="en-US" dirty="0"/>
+          </a:p>
           <a:p>
             <a:endParaRPr lang="en-US" dirty="0"/>
           </a:p>
@@ -4797,7 +4849,7 @@
     </p:spTree>
     <p:extLst>
       <p:ext uri="{BB962C8B-B14F-4D97-AF65-F5344CB8AC3E}">
-        <p14:creationId xmlns:p14="http://schemas.microsoft.com/office/powerpoint/2010/main" val="530783078"/>
+        <p14:creationId xmlns:p14="http://schemas.microsoft.com/office/powerpoint/2010/main" val="4286829495"/>
       </p:ext>
     </p:extLst>
   </p:cSld>
@@ -4826,6 +4878,77 @@
       </p:grpSpPr>
       <p:sp>
         <p:nvSpPr>
+          <p:cNvPr id="2" name="Title 1"/>
+          <p:cNvSpPr>
+            <a:spLocks noGrp="1"/>
+          </p:cNvSpPr>
+          <p:nvPr>
+            <p:ph type="title"/>
+          </p:nvPr>
+        </p:nvSpPr>
+        <p:spPr/>
+        <p:txBody>
+          <a:bodyPr/>
+          <a:lstStyle/>
+          <a:p>
+            <a:r>
+              <a:rPr lang="en-US" dirty="0"/>
+              <a:t>Gerber Viewer Demo</a:t>
+            </a:r>
+          </a:p>
+        </p:txBody>
+      </p:sp>
+      <p:sp>
+        <p:nvSpPr>
+          <p:cNvPr id="3" name="Content Placeholder 2"/>
+          <p:cNvSpPr>
+            <a:spLocks noGrp="1"/>
+          </p:cNvSpPr>
+          <p:nvPr>
+            <p:ph idx="1"/>
+          </p:nvPr>
+        </p:nvSpPr>
+        <p:spPr/>
+        <p:txBody>
+          <a:bodyPr/>
+          <a:lstStyle/>
+          <a:p>
+            <a:endParaRPr lang="en-US" dirty="0"/>
+          </a:p>
+        </p:txBody>
+      </p:sp>
+    </p:spTree>
+    <p:extLst>
+      <p:ext uri="{BB962C8B-B14F-4D97-AF65-F5344CB8AC3E}">
+        <p14:creationId xmlns:p14="http://schemas.microsoft.com/office/powerpoint/2010/main" val="530783078"/>
+      </p:ext>
+    </p:extLst>
+  </p:cSld>
+  <p:clrMapOvr>
+    <a:masterClrMapping/>
+  </p:clrMapOvr>
+</p:sld>
+</file>
+
+<file path=ppt/slides/slide23.xml><?xml version="1.0" encoding="utf-8"?>
+<p:sld xmlns:a="http://schemas.openxmlformats.org/drawingml/2006/main" xmlns:r="http://schemas.openxmlformats.org/officeDocument/2006/relationships" xmlns:p="http://schemas.openxmlformats.org/presentationml/2006/main">
+  <p:cSld>
+    <p:spTree>
+      <p:nvGrpSpPr>
+        <p:cNvPr id="1" name=""/>
+        <p:cNvGrpSpPr/>
+        <p:nvPr/>
+      </p:nvGrpSpPr>
+      <p:grpSpPr>
+        <a:xfrm>
+          <a:off x="0" y="0"/>
+          <a:ext cx="0" cy="0"/>
+          <a:chOff x="0" y="0"/>
+          <a:chExt cx="0" cy="0"/>
+        </a:xfrm>
+      </p:grpSpPr>
+      <p:sp>
+        <p:nvSpPr>
           <p:cNvPr id="2" name="Title 1">
             <a:extLst>
               <a:ext uri="{FF2B5EF4-FFF2-40B4-BE49-F238E27FC236}">
@@ -4895,7 +5018,7 @@
 </p:sld>
 </file>
 
-<file path=ppt/slides/slide23.xml><?xml version="1.0" encoding="utf-8"?>
+<file path=ppt/slides/slide24.xml><?xml version="1.0" encoding="utf-8"?>
 <p:sld xmlns:a="http://schemas.openxmlformats.org/drawingml/2006/main" xmlns:r="http://schemas.openxmlformats.org/officeDocument/2006/relationships" xmlns:p="http://schemas.openxmlformats.org/presentationml/2006/main">
   <p:cSld>
     <p:spTree>
@@ -5210,8 +5333,8 @@
 </p:sld>
 </file>
 
-<file path=ppt/slides/slide24.xml><?xml version="1.0" encoding="utf-8"?>
-<p:sld xmlns:a="http://schemas.openxmlformats.org/drawingml/2006/main" xmlns:r="http://schemas.openxmlformats.org/officeDocument/2006/relationships" xmlns:p="http://schemas.openxmlformats.org/presentationml/2006/main">
+<file path=ppt/slides/slide25.xml><?xml version="1.0" encoding="utf-8"?>
+<p:sld xmlns:a="http://schemas.openxmlformats.org/drawingml/2006/main" xmlns:r="http://schemas.openxmlformats.org/officeDocument/2006/relationships" xmlns:p="http://schemas.openxmlformats.org/presentationml/2006/main" show="0">
   <p:cSld>
     <p:spTree>
       <p:nvGrpSpPr>
@@ -5328,7 +5451,7 @@
 </p:sld>
 </file>
 
-<file path=ppt/slides/slide25.xml><?xml version="1.0" encoding="utf-8"?>
+<file path=ppt/slides/slide26.xml><?xml version="1.0" encoding="utf-8"?>
 <p:sld xmlns:a="http://schemas.openxmlformats.org/drawingml/2006/main" xmlns:r="http://schemas.openxmlformats.org/officeDocument/2006/relationships" xmlns:p="http://schemas.openxmlformats.org/presentationml/2006/main">
   <p:cSld>
     <p:spTree>
@@ -5579,13 +5702,7 @@
       </p:grpSpPr>
       <p:sp>
         <p:nvSpPr>
-          <p:cNvPr id="2" name="Title 1">
-            <a:extLst>
-              <a:ext uri="{FF2B5EF4-FFF2-40B4-BE49-F238E27FC236}">
-                <a16:creationId xmlns:a16="http://schemas.microsoft.com/office/drawing/2014/main" id="{37459FB6-D9B1-8240-9298-C621F241676D}"/>
-              </a:ext>
-            </a:extLst>
-          </p:cNvPr>
+          <p:cNvPr id="2" name="Title 1"/>
           <p:cNvSpPr>
             <a:spLocks noGrp="1"/>
           </p:cNvSpPr>
@@ -5600,67 +5717,463 @@
           <a:p>
             <a:r>
               <a:rPr lang="en-US" dirty="0"/>
-              <a:t>Device Placement: Style</a:t>
-            </a:r>
-          </a:p>
-        </p:txBody>
-      </p:sp>
-      <p:sp>
-        <p:nvSpPr>
-          <p:cNvPr id="3" name="Content Placeholder 2">
-            <a:extLst>
-              <a:ext uri="{FF2B5EF4-FFF2-40B4-BE49-F238E27FC236}">
-                <a16:creationId xmlns:a16="http://schemas.microsoft.com/office/drawing/2014/main" id="{743DE371-60CA-6E49-8986-CD6E03C62642}"/>
-              </a:ext>
-            </a:extLst>
-          </p:cNvPr>
-          <p:cNvSpPr>
-            <a:spLocks noGrp="1"/>
-          </p:cNvSpPr>
-          <p:nvPr>
-            <p:ph idx="1"/>
-          </p:nvPr>
-        </p:nvSpPr>
-        <p:spPr/>
-        <p:txBody>
-          <a:bodyPr/>
-          <a:lstStyle/>
-          <a:p>
-            <a:r>
-              <a:rPr lang="en-US" dirty="0"/>
-              <a:t>Put all your components on a 1mm grid</a:t>
-            </a:r>
-          </a:p>
-          <a:p>
-            <a:r>
-              <a:rPr lang="en-US" dirty="0"/>
-              <a:t>Reference designators can go on 0.5 or 0.1mm grid.</a:t>
-            </a:r>
-          </a:p>
-          <a:p>
-            <a:r>
-              <a:rPr lang="en-US" dirty="0"/>
-              <a:t>Orient all your parts the same way for easy assembly.</a:t>
-            </a:r>
-          </a:p>
-          <a:p>
-            <a:r>
-              <a:rPr lang="en-US" dirty="0"/>
-              <a:t>Leave space between components for easy assembly.</a:t>
-            </a:r>
-          </a:p>
-          <a:p>
-            <a:endParaRPr lang="en-US" dirty="0"/>
-          </a:p>
-          <a:p>
-            <a:endParaRPr lang="en-US" dirty="0"/>
+              <a:t>Some Possible Configurations</a:t>
+            </a:r>
+          </a:p>
+        </p:txBody>
+      </p:sp>
+      <p:pic>
+        <p:nvPicPr>
+          <p:cNvPr id="5" name="Picture 4"/>
+          <p:cNvPicPr>
+            <a:picLocks noChangeAspect="1"/>
+          </p:cNvPicPr>
+          <p:nvPr/>
+        </p:nvPicPr>
+        <p:blipFill>
+          <a:blip r:embed="rId2"/>
+          <a:stretch>
+            <a:fillRect/>
+          </a:stretch>
+        </p:blipFill>
+        <p:spPr>
+          <a:xfrm>
+            <a:off x="1981200" y="1417638"/>
+            <a:ext cx="1642328" cy="1642328"/>
+          </a:xfrm>
+          <a:prstGeom prst="rect">
+            <a:avLst/>
+          </a:prstGeom>
+        </p:spPr>
+      </p:pic>
+      <p:pic>
+        <p:nvPicPr>
+          <p:cNvPr id="6" name="Picture 5"/>
+          <p:cNvPicPr>
+            <a:picLocks noChangeAspect="1"/>
+          </p:cNvPicPr>
+          <p:nvPr/>
+        </p:nvPicPr>
+        <p:blipFill>
+          <a:blip r:embed="rId3"/>
+          <a:stretch>
+            <a:fillRect/>
+          </a:stretch>
+        </p:blipFill>
+        <p:spPr>
+          <a:xfrm>
+            <a:off x="4081725" y="1417638"/>
+            <a:ext cx="1642328" cy="1642328"/>
+          </a:xfrm>
+          <a:prstGeom prst="rect">
+            <a:avLst/>
+          </a:prstGeom>
+        </p:spPr>
+      </p:pic>
+      <p:pic>
+        <p:nvPicPr>
+          <p:cNvPr id="7" name="Picture 6"/>
+          <p:cNvPicPr>
+            <a:picLocks noChangeAspect="1"/>
+          </p:cNvPicPr>
+          <p:nvPr/>
+        </p:nvPicPr>
+        <p:blipFill>
+          <a:blip r:embed="rId4"/>
+          <a:stretch>
+            <a:fillRect/>
+          </a:stretch>
+        </p:blipFill>
+        <p:spPr>
+          <a:xfrm>
+            <a:off x="6511516" y="4170341"/>
+            <a:ext cx="1642328" cy="1642328"/>
+          </a:xfrm>
+          <a:prstGeom prst="rect">
+            <a:avLst/>
+          </a:prstGeom>
+        </p:spPr>
+      </p:pic>
+      <p:pic>
+        <p:nvPicPr>
+          <p:cNvPr id="8" name="Picture 7"/>
+          <p:cNvPicPr>
+            <a:picLocks noChangeAspect="1"/>
+          </p:cNvPicPr>
+          <p:nvPr/>
+        </p:nvPicPr>
+        <p:blipFill>
+          <a:blip r:embed="rId5"/>
+          <a:stretch>
+            <a:fillRect/>
+          </a:stretch>
+        </p:blipFill>
+        <p:spPr>
+          <a:xfrm>
+            <a:off x="2205255" y="4332446"/>
+            <a:ext cx="1642329" cy="1642329"/>
+          </a:xfrm>
+          <a:prstGeom prst="rect">
+            <a:avLst/>
+          </a:prstGeom>
+        </p:spPr>
+      </p:pic>
+      <p:sp>
+        <p:nvSpPr>
+          <p:cNvPr id="9" name="TextBox 8"/>
+          <p:cNvSpPr txBox="1"/>
+          <p:nvPr/>
+        </p:nvSpPr>
+        <p:spPr>
+          <a:xfrm>
+            <a:off x="2415503" y="3417577"/>
+            <a:ext cx="757577" cy="369332"/>
+          </a:xfrm>
+          <a:prstGeom prst="rect">
+            <a:avLst/>
+          </a:prstGeom>
+          <a:noFill/>
+        </p:spPr>
+        <p:txBody>
+          <a:bodyPr wrap="none" rtlCol="0">
+            <a:spAutoFit/>
+          </a:bodyPr>
+          <a:lstStyle/>
+          <a:p>
+            <a:r>
+              <a:rPr lang="en-US" dirty="0"/>
+              <a:t>“Plus”</a:t>
+            </a:r>
+          </a:p>
+        </p:txBody>
+      </p:sp>
+      <p:sp>
+        <p:nvSpPr>
+          <p:cNvPr id="10" name="TextBox 9"/>
+          <p:cNvSpPr txBox="1"/>
+          <p:nvPr/>
+        </p:nvSpPr>
+        <p:spPr>
+          <a:xfrm>
+            <a:off x="4521880" y="3437157"/>
+            <a:ext cx="497665" cy="369332"/>
+          </a:xfrm>
+          <a:prstGeom prst="rect">
+            <a:avLst/>
+          </a:prstGeom>
+          <a:noFill/>
+        </p:spPr>
+        <p:txBody>
+          <a:bodyPr wrap="none" rtlCol="0">
+            <a:spAutoFit/>
+          </a:bodyPr>
+          <a:lstStyle/>
+          <a:p>
+            <a:r>
+              <a:rPr lang="en-US" dirty="0"/>
+              <a:t>“X”</a:t>
+            </a:r>
+          </a:p>
+        </p:txBody>
+      </p:sp>
+      <p:sp>
+        <p:nvSpPr>
+          <p:cNvPr id="11" name="TextBox 10"/>
+          <p:cNvSpPr txBox="1"/>
+          <p:nvPr/>
+        </p:nvSpPr>
+        <p:spPr>
+          <a:xfrm>
+            <a:off x="6612100" y="6189859"/>
+            <a:ext cx="1464276" cy="369332"/>
+          </a:xfrm>
+          <a:prstGeom prst="rect">
+            <a:avLst/>
+          </a:prstGeom>
+          <a:noFill/>
+        </p:spPr>
+        <p:txBody>
+          <a:bodyPr wrap="none" rtlCol="0">
+            <a:spAutoFit/>
+          </a:bodyPr>
+          <a:lstStyle/>
+          <a:p>
+            <a:r>
+              <a:rPr lang="en-US" dirty="0"/>
+              <a:t>“</a:t>
+            </a:r>
+            <a:r>
+              <a:rPr lang="en-US" dirty="0" err="1"/>
+              <a:t>Octothorpe</a:t>
+            </a:r>
+            <a:r>
+              <a:rPr lang="en-US" dirty="0"/>
+              <a:t>”</a:t>
+            </a:r>
+          </a:p>
+        </p:txBody>
+      </p:sp>
+      <p:pic>
+        <p:nvPicPr>
+          <p:cNvPr id="12" name="Picture 11"/>
+          <p:cNvPicPr>
+            <a:picLocks noChangeAspect="1"/>
+          </p:cNvPicPr>
+          <p:nvPr/>
+        </p:nvPicPr>
+        <p:blipFill>
+          <a:blip r:embed="rId6"/>
+          <a:stretch>
+            <a:fillRect/>
+          </a:stretch>
+        </p:blipFill>
+        <p:spPr>
+          <a:xfrm>
+            <a:off x="4081725" y="4332446"/>
+            <a:ext cx="1642329" cy="1642329"/>
+          </a:xfrm>
+          <a:prstGeom prst="rect">
+            <a:avLst/>
+          </a:prstGeom>
+        </p:spPr>
+      </p:pic>
+      <p:pic>
+        <p:nvPicPr>
+          <p:cNvPr id="13" name="Picture 12"/>
+          <p:cNvPicPr>
+            <a:picLocks noChangeAspect="1"/>
+          </p:cNvPicPr>
+          <p:nvPr/>
+        </p:nvPicPr>
+        <p:blipFill>
+          <a:blip r:embed="rId7"/>
+          <a:stretch>
+            <a:fillRect/>
+          </a:stretch>
+        </p:blipFill>
+        <p:spPr>
+          <a:xfrm>
+            <a:off x="6612995" y="1261174"/>
+            <a:ext cx="1642329" cy="1700984"/>
+          </a:xfrm>
+          <a:prstGeom prst="rect">
+            <a:avLst/>
+          </a:prstGeom>
+        </p:spPr>
+      </p:pic>
+      <p:pic>
+        <p:nvPicPr>
+          <p:cNvPr id="14" name="Picture 13"/>
+          <p:cNvPicPr>
+            <a:picLocks noChangeAspect="1"/>
+          </p:cNvPicPr>
+          <p:nvPr/>
+        </p:nvPicPr>
+        <p:blipFill>
+          <a:blip r:embed="rId8"/>
+          <a:stretch>
+            <a:fillRect/>
+          </a:stretch>
+        </p:blipFill>
+        <p:spPr>
+          <a:xfrm>
+            <a:off x="8534324" y="1319830"/>
+            <a:ext cx="1700984" cy="1642329"/>
+          </a:xfrm>
+          <a:prstGeom prst="rect">
+            <a:avLst/>
+          </a:prstGeom>
+        </p:spPr>
+      </p:pic>
+      <p:sp>
+        <p:nvSpPr>
+          <p:cNvPr id="17" name="TextBox 16"/>
+          <p:cNvSpPr txBox="1"/>
+          <p:nvPr/>
+        </p:nvSpPr>
+        <p:spPr>
+          <a:xfrm>
+            <a:off x="7047297" y="3177243"/>
+            <a:ext cx="825867" cy="369332"/>
+          </a:xfrm>
+          <a:prstGeom prst="rect">
+            <a:avLst/>
+          </a:prstGeom>
+          <a:noFill/>
+        </p:spPr>
+        <p:txBody>
+          <a:bodyPr wrap="none" rtlCol="0">
+            <a:spAutoFit/>
+          </a:bodyPr>
+          <a:lstStyle/>
+          <a:p>
+            <a:r>
+              <a:rPr lang="en-US" dirty="0" err="1"/>
+              <a:t>Hexa</a:t>
+            </a:r>
+            <a:r>
+              <a:rPr lang="en-US" dirty="0"/>
+              <a:t> +</a:t>
+            </a:r>
+          </a:p>
+        </p:txBody>
+      </p:sp>
+      <p:sp>
+        <p:nvSpPr>
+          <p:cNvPr id="18" name="TextBox 17"/>
+          <p:cNvSpPr txBox="1"/>
+          <p:nvPr/>
+        </p:nvSpPr>
+        <p:spPr>
+          <a:xfrm>
+            <a:off x="8959972" y="3185135"/>
+            <a:ext cx="813043" cy="369332"/>
+          </a:xfrm>
+          <a:prstGeom prst="rect">
+            <a:avLst/>
+          </a:prstGeom>
+          <a:noFill/>
+        </p:spPr>
+        <p:txBody>
+          <a:bodyPr wrap="none" rtlCol="0">
+            <a:spAutoFit/>
+          </a:bodyPr>
+          <a:lstStyle/>
+          <a:p>
+            <a:r>
+              <a:rPr lang="en-US" dirty="0" err="1"/>
+              <a:t>Hexa</a:t>
+            </a:r>
+            <a:r>
+              <a:rPr lang="en-US" dirty="0"/>
+              <a:t> x</a:t>
+            </a:r>
+          </a:p>
+        </p:txBody>
+      </p:sp>
+      <p:sp>
+        <p:nvSpPr>
+          <p:cNvPr id="19" name="TextBox 18"/>
+          <p:cNvSpPr txBox="1"/>
+          <p:nvPr/>
+        </p:nvSpPr>
+        <p:spPr>
+          <a:xfrm>
+            <a:off x="2631537" y="6189859"/>
+            <a:ext cx="790150" cy="369332"/>
+          </a:xfrm>
+          <a:prstGeom prst="rect">
+            <a:avLst/>
+          </a:prstGeom>
+          <a:noFill/>
+        </p:spPr>
+        <p:txBody>
+          <a:bodyPr wrap="none" rtlCol="0">
+            <a:spAutoFit/>
+          </a:bodyPr>
+          <a:lstStyle/>
+          <a:p>
+            <a:r>
+              <a:rPr lang="en-US" dirty="0" err="1"/>
+              <a:t>Octa</a:t>
+            </a:r>
+            <a:r>
+              <a:rPr lang="en-US" dirty="0"/>
+              <a:t> +</a:t>
+            </a:r>
+          </a:p>
+        </p:txBody>
+      </p:sp>
+      <p:sp>
+        <p:nvSpPr>
+          <p:cNvPr id="20" name="TextBox 19"/>
+          <p:cNvSpPr txBox="1"/>
+          <p:nvPr/>
+        </p:nvSpPr>
+        <p:spPr>
+          <a:xfrm>
+            <a:off x="4544212" y="6197751"/>
+            <a:ext cx="775160" cy="369332"/>
+          </a:xfrm>
+          <a:prstGeom prst="rect">
+            <a:avLst/>
+          </a:prstGeom>
+          <a:noFill/>
+        </p:spPr>
+        <p:txBody>
+          <a:bodyPr wrap="none" rtlCol="0">
+            <a:spAutoFit/>
+          </a:bodyPr>
+          <a:lstStyle/>
+          <a:p>
+            <a:r>
+              <a:rPr lang="en-US" dirty="0" err="1"/>
+              <a:t>Octa</a:t>
+            </a:r>
+            <a:r>
+              <a:rPr lang="en-US" dirty="0"/>
+              <a:t> x</a:t>
+            </a:r>
+          </a:p>
+        </p:txBody>
+      </p:sp>
+      <p:pic>
+        <p:nvPicPr>
+          <p:cNvPr id="21" name="Picture 20"/>
+          <p:cNvPicPr>
+            <a:picLocks noChangeAspect="1"/>
+          </p:cNvPicPr>
+          <p:nvPr/>
+        </p:nvPicPr>
+        <p:blipFill>
+          <a:blip r:embed="rId9"/>
+          <a:stretch>
+            <a:fillRect/>
+          </a:stretch>
+        </p:blipFill>
+        <p:spPr>
+          <a:xfrm>
+            <a:off x="8534325" y="4170341"/>
+            <a:ext cx="1882117" cy="1642328"/>
+          </a:xfrm>
+          <a:prstGeom prst="rect">
+            <a:avLst/>
+          </a:prstGeom>
+        </p:spPr>
+      </p:pic>
+      <p:sp>
+        <p:nvSpPr>
+          <p:cNvPr id="22" name="TextBox 21"/>
+          <p:cNvSpPr txBox="1"/>
+          <p:nvPr/>
+        </p:nvSpPr>
+        <p:spPr>
+          <a:xfrm>
+            <a:off x="9238102" y="6197751"/>
+            <a:ext cx="466331" cy="369332"/>
+          </a:xfrm>
+          <a:prstGeom prst="rect">
+            <a:avLst/>
+          </a:prstGeom>
+          <a:noFill/>
+        </p:spPr>
+        <p:txBody>
+          <a:bodyPr wrap="none" rtlCol="0">
+            <a:spAutoFit/>
+          </a:bodyPr>
+          <a:lstStyle/>
+          <a:p>
+            <a:r>
+              <a:rPr lang="en-US" dirty="0"/>
+              <a:t>Y 6</a:t>
+            </a:r>
           </a:p>
         </p:txBody>
       </p:sp>
     </p:spTree>
     <p:extLst>
       <p:ext uri="{BB962C8B-B14F-4D97-AF65-F5344CB8AC3E}">
-        <p14:creationId xmlns:p14="http://schemas.microsoft.com/office/powerpoint/2010/main" val="3567722507"/>
+        <p14:creationId xmlns:p14="http://schemas.microsoft.com/office/powerpoint/2010/main" val="638727758"/>
       </p:ext>
     </p:extLst>
   </p:cSld>
@@ -5689,7 +6202,13 @@
       </p:grpSpPr>
       <p:sp>
         <p:nvSpPr>
-          <p:cNvPr id="2" name="Title 1"/>
+          <p:cNvPr id="2" name="Title 1">
+            <a:extLst>
+              <a:ext uri="{FF2B5EF4-FFF2-40B4-BE49-F238E27FC236}">
+                <a16:creationId xmlns:a16="http://schemas.microsoft.com/office/drawing/2014/main" id="{37459FB6-D9B1-8240-9298-C621F241676D}"/>
+              </a:ext>
+            </a:extLst>
+          </p:cNvPr>
           <p:cNvSpPr>
             <a:spLocks noGrp="1"/>
           </p:cNvSpPr>
@@ -5704,14 +6223,20 @@
           <a:p>
             <a:r>
               <a:rPr lang="en-US" dirty="0"/>
-              <a:t>Layout Demo</a:t>
-            </a:r>
-          </a:p>
-        </p:txBody>
-      </p:sp>
-      <p:sp>
-        <p:nvSpPr>
-          <p:cNvPr id="3" name="Content Placeholder 2"/>
+              <a:t>Device Placement: Style</a:t>
+            </a:r>
+          </a:p>
+        </p:txBody>
+      </p:sp>
+      <p:sp>
+        <p:nvSpPr>
+          <p:cNvPr id="3" name="Content Placeholder 2">
+            <a:extLst>
+              <a:ext uri="{FF2B5EF4-FFF2-40B4-BE49-F238E27FC236}">
+                <a16:creationId xmlns:a16="http://schemas.microsoft.com/office/drawing/2014/main" id="{743DE371-60CA-6E49-8986-CD6E03C62642}"/>
+              </a:ext>
+            </a:extLst>
+          </p:cNvPr>
           <p:cNvSpPr>
             <a:spLocks noGrp="1"/>
           </p:cNvSpPr>
@@ -5726,15 +6251,39 @@
           <a:p>
             <a:r>
               <a:rPr lang="en-US" dirty="0"/>
-              <a:t>Use the remote</a:t>
-            </a:r>
+              <a:t>Put all your components on a 1mm grid</a:t>
+            </a:r>
+          </a:p>
+          <a:p>
+            <a:r>
+              <a:rPr lang="en-US" dirty="0"/>
+              <a:t>Reference designators can go on 0.5 or 0.1mm grid.</a:t>
+            </a:r>
+          </a:p>
+          <a:p>
+            <a:r>
+              <a:rPr lang="en-US" dirty="0"/>
+              <a:t>Orient all your parts the same way for easy assembly.</a:t>
+            </a:r>
+          </a:p>
+          <a:p>
+            <a:r>
+              <a:rPr lang="en-US" dirty="0"/>
+              <a:t>Leave space between components for easy assembly.</a:t>
+            </a:r>
+          </a:p>
+          <a:p>
+            <a:endParaRPr lang="en-US" dirty="0"/>
+          </a:p>
+          <a:p>
+            <a:endParaRPr lang="en-US" dirty="0"/>
           </a:p>
         </p:txBody>
       </p:sp>
     </p:spTree>
     <p:extLst>
       <p:ext uri="{BB962C8B-B14F-4D97-AF65-F5344CB8AC3E}">
-        <p14:creationId xmlns:p14="http://schemas.microsoft.com/office/powerpoint/2010/main" val="4182616968"/>
+        <p14:creationId xmlns:p14="http://schemas.microsoft.com/office/powerpoint/2010/main" val="3567722507"/>
       </p:ext>
     </p:extLst>
   </p:cSld>
@@ -5778,7 +6327,7 @@
           <a:p>
             <a:r>
               <a:rPr lang="en-US" dirty="0"/>
-              <a:t>Eagle Layout Tools</a:t>
+              <a:t>Layout Demo</a:t>
             </a:r>
           </a:p>
         </p:txBody>
@@ -5795,34 +6344,20 @@
         </p:nvSpPr>
         <p:spPr/>
         <p:txBody>
-          <a:bodyPr>
-            <a:normAutofit/>
-          </a:bodyPr>
-          <a:lstStyle/>
-          <a:p>
-            <a:r>
-              <a:rPr lang="en-US" dirty="0"/>
-              <a:t>You can rotate components with the rotate tool.</a:t>
-            </a:r>
-          </a:p>
-          <a:p>
-            <a:r>
-              <a:rPr lang="en-US" dirty="0"/>
-              <a:t>Control-click snaps parts to grid.</a:t>
-            </a:r>
-          </a:p>
-          <a:p>
-            <a:pPr marL="0" indent="0">
-              <a:buNone/>
-            </a:pPr>
-            <a:endParaRPr lang="en-US" dirty="0"/>
+          <a:bodyPr/>
+          <a:lstStyle/>
+          <a:p>
+            <a:r>
+              <a:rPr lang="en-US" dirty="0"/>
+              <a:t>Use the remote</a:t>
+            </a:r>
           </a:p>
         </p:txBody>
       </p:sp>
     </p:spTree>
     <p:extLst>
       <p:ext uri="{BB962C8B-B14F-4D97-AF65-F5344CB8AC3E}">
-        <p14:creationId xmlns:p14="http://schemas.microsoft.com/office/powerpoint/2010/main" val="3899300758"/>
+        <p14:creationId xmlns:p14="http://schemas.microsoft.com/office/powerpoint/2010/main" val="4182616968"/>
       </p:ext>
     </p:extLst>
   </p:cSld>
@@ -5851,13 +6386,7 @@
       </p:grpSpPr>
       <p:sp>
         <p:nvSpPr>
-          <p:cNvPr id="2" name="Title 1">
-            <a:extLst>
-              <a:ext uri="{FF2B5EF4-FFF2-40B4-BE49-F238E27FC236}">
-                <a16:creationId xmlns:a16="http://schemas.microsoft.com/office/drawing/2014/main" id="{55A17526-2B88-AE4A-9C59-7889AE66DC10}"/>
-              </a:ext>
-            </a:extLst>
-          </p:cNvPr>
+          <p:cNvPr id="2" name="Title 1"/>
           <p:cNvSpPr>
             <a:spLocks noGrp="1"/>
           </p:cNvSpPr>
@@ -5872,40 +6401,51 @@
           <a:p>
             <a:r>
               <a:rPr lang="en-US" dirty="0"/>
-              <a:t>Routing</a:t>
-            </a:r>
-          </a:p>
-        </p:txBody>
-      </p:sp>
-      <p:sp>
-        <p:nvSpPr>
-          <p:cNvPr id="3" name="Text Placeholder 2">
-            <a:extLst>
-              <a:ext uri="{FF2B5EF4-FFF2-40B4-BE49-F238E27FC236}">
-                <a16:creationId xmlns:a16="http://schemas.microsoft.com/office/drawing/2014/main" id="{859EE15E-C860-FA40-B8BE-14B198888DF6}"/>
-              </a:ext>
-            </a:extLst>
-          </p:cNvPr>
-          <p:cNvSpPr>
-            <a:spLocks noGrp="1"/>
-          </p:cNvSpPr>
-          <p:nvPr>
-            <p:ph type="body" idx="1"/>
-          </p:nvPr>
-        </p:nvSpPr>
-        <p:spPr/>
-        <p:txBody>
-          <a:bodyPr/>
-          <a:lstStyle/>
-          <a:p>
-            <a:endParaRPr lang="en-US"/>
+              <a:t>Eagle Layout Tools</a:t>
+            </a:r>
+          </a:p>
+        </p:txBody>
+      </p:sp>
+      <p:sp>
+        <p:nvSpPr>
+          <p:cNvPr id="3" name="Content Placeholder 2"/>
+          <p:cNvSpPr>
+            <a:spLocks noGrp="1"/>
+          </p:cNvSpPr>
+          <p:nvPr>
+            <p:ph idx="1"/>
+          </p:nvPr>
+        </p:nvSpPr>
+        <p:spPr/>
+        <p:txBody>
+          <a:bodyPr>
+            <a:normAutofit/>
+          </a:bodyPr>
+          <a:lstStyle/>
+          <a:p>
+            <a:r>
+              <a:rPr lang="en-US" dirty="0"/>
+              <a:t>You can rotate components with the rotate tool.</a:t>
+            </a:r>
+          </a:p>
+          <a:p>
+            <a:r>
+              <a:rPr lang="en-US" dirty="0"/>
+              <a:t>Control-click snaps parts to grid.</a:t>
+            </a:r>
+          </a:p>
+          <a:p>
+            <a:pPr marL="0" indent="0">
+              <a:buNone/>
+            </a:pPr>
+            <a:endParaRPr lang="en-US" dirty="0"/>
           </a:p>
         </p:txBody>
       </p:sp>
     </p:spTree>
     <p:extLst>
       <p:ext uri="{BB962C8B-B14F-4D97-AF65-F5344CB8AC3E}">
-        <p14:creationId xmlns:p14="http://schemas.microsoft.com/office/powerpoint/2010/main" val="1295809181"/>
+        <p14:creationId xmlns:p14="http://schemas.microsoft.com/office/powerpoint/2010/main" val="3899300758"/>
       </p:ext>
     </p:extLst>
   </p:cSld>
@@ -5934,7 +6474,13 @@
       </p:grpSpPr>
       <p:sp>
         <p:nvSpPr>
-          <p:cNvPr id="2" name="Title 1"/>
+          <p:cNvPr id="2" name="Title 1">
+            <a:extLst>
+              <a:ext uri="{FF2B5EF4-FFF2-40B4-BE49-F238E27FC236}">
+                <a16:creationId xmlns:a16="http://schemas.microsoft.com/office/drawing/2014/main" id="{55A17526-2B88-AE4A-9C59-7889AE66DC10}"/>
+              </a:ext>
+            </a:extLst>
+          </p:cNvPr>
           <p:cNvSpPr>
             <a:spLocks noGrp="1"/>
           </p:cNvSpPr>
@@ -5949,96 +6495,40 @@
           <a:p>
             <a:r>
               <a:rPr lang="en-US" dirty="0"/>
-              <a:t>The Three Ways to Route</a:t>
-            </a:r>
-          </a:p>
-        </p:txBody>
-      </p:sp>
-      <p:sp>
-        <p:nvSpPr>
-          <p:cNvPr id="3" name="Content Placeholder 2"/>
-          <p:cNvSpPr>
-            <a:spLocks noGrp="1"/>
-          </p:cNvSpPr>
-          <p:nvPr>
-            <p:ph idx="1"/>
-          </p:nvPr>
-        </p:nvSpPr>
-        <p:spPr/>
-        <p:txBody>
-          <a:bodyPr>
-            <a:normAutofit/>
-          </a:bodyPr>
-          <a:lstStyle/>
-          <a:p>
-            <a:r>
-              <a:rPr lang="en-US" dirty="0"/>
-              <a:t>Manual</a:t>
-            </a:r>
-          </a:p>
-          <a:p>
-            <a:pPr lvl="1"/>
-            <a:r>
-              <a:rPr lang="en-US" dirty="0"/>
-              <a:t>You can do anything you want (including things you shouldn’t)</a:t>
-            </a:r>
-          </a:p>
-          <a:p>
-            <a:r>
-              <a:rPr lang="en-US" dirty="0"/>
-              <a:t>Auto router</a:t>
-            </a:r>
-          </a:p>
-          <a:p>
-            <a:pPr lvl="1"/>
-            <a:r>
-              <a:rPr lang="en-US" dirty="0"/>
-              <a:t>Fully-automatic routing, subject to constraints that you can set.</a:t>
-            </a:r>
-          </a:p>
-          <a:p>
-            <a:pPr lvl="1"/>
-            <a:r>
-              <a:rPr lang="en-US" dirty="0"/>
-              <a:t>The Eagle auto router is not good enough to do it all for you.</a:t>
-            </a:r>
-          </a:p>
-          <a:p>
-            <a:r>
-              <a:rPr lang="en-US" dirty="0"/>
-              <a:t>“Follow me”</a:t>
-            </a:r>
-          </a:p>
-          <a:p>
-            <a:pPr lvl="1"/>
-            <a:r>
-              <a:rPr lang="en-US" dirty="0"/>
-              <a:t>Assisted manual routing.  The router will enforce the constraints you set.</a:t>
-            </a:r>
-          </a:p>
-          <a:p>
-            <a:r>
-              <a:rPr lang="en-US" dirty="0"/>
-              <a:t>Fan out</a:t>
-            </a:r>
-          </a:p>
-          <a:p>
-            <a:pPr lvl="1"/>
-            <a:r>
-              <a:rPr lang="en-US" dirty="0"/>
-              <a:t>Create circuit stubs to connect devices to power/ground</a:t>
-            </a:r>
-          </a:p>
-          <a:p>
-            <a:pPr lvl="1"/>
-            <a:endParaRPr lang="en-US" dirty="0"/>
+              <a:t>Routing</a:t>
+            </a:r>
+          </a:p>
+        </p:txBody>
+      </p:sp>
+      <p:sp>
+        <p:nvSpPr>
+          <p:cNvPr id="3" name="Text Placeholder 2">
+            <a:extLst>
+              <a:ext uri="{FF2B5EF4-FFF2-40B4-BE49-F238E27FC236}">
+                <a16:creationId xmlns:a16="http://schemas.microsoft.com/office/drawing/2014/main" id="{859EE15E-C860-FA40-B8BE-14B198888DF6}"/>
+              </a:ext>
+            </a:extLst>
+          </p:cNvPr>
+          <p:cNvSpPr>
+            <a:spLocks noGrp="1"/>
+          </p:cNvSpPr>
+          <p:nvPr>
+            <p:ph type="body" idx="1"/>
+          </p:nvPr>
+        </p:nvSpPr>
+        <p:spPr/>
+        <p:txBody>
+          <a:bodyPr/>
+          <a:lstStyle/>
+          <a:p>
+            <a:endParaRPr lang="en-US"/>
           </a:p>
         </p:txBody>
       </p:sp>
     </p:spTree>
     <p:extLst>
       <p:ext uri="{BB962C8B-B14F-4D97-AF65-F5344CB8AC3E}">
-        <p14:creationId xmlns:p14="http://schemas.microsoft.com/office/powerpoint/2010/main" val="1927398484"/>
+        <p14:creationId xmlns:p14="http://schemas.microsoft.com/office/powerpoint/2010/main" val="1295809181"/>
       </p:ext>
     </p:extLst>
   </p:cSld>
@@ -6082,7 +6572,7 @@
           <a:p>
             <a:r>
               <a:rPr lang="en-US" dirty="0"/>
-              <a:t>Auto Router</a:t>
+              <a:t>The Three Ways to Route</a:t>
             </a:r>
           </a:p>
         </p:txBody>
@@ -6106,56 +6596,72 @@
           <a:p>
             <a:r>
               <a:rPr lang="en-US" dirty="0"/>
-              <a:t>Mixed reputation</a:t>
+              <a:t>Manual</a:t>
             </a:r>
           </a:p>
           <a:p>
             <a:pPr lvl="1"/>
             <a:r>
               <a:rPr lang="en-US" dirty="0"/>
-              <a:t>It can’t do everything</a:t>
+              <a:t>You can do anything you want (including things you shouldn’t)</a:t>
+            </a:r>
+          </a:p>
+          <a:p>
+            <a:r>
+              <a:rPr lang="en-US" dirty="0"/>
+              <a:t>Auto router</a:t>
             </a:r>
           </a:p>
           <a:p>
             <a:pPr lvl="1"/>
             <a:r>
               <a:rPr lang="en-US" dirty="0"/>
-              <a:t>Sometimes it does a bad job</a:t>
+              <a:t>Fully-automatic routing, subject to constraints that you can set.</a:t>
             </a:r>
           </a:p>
           <a:p>
             <a:pPr lvl="1"/>
             <a:r>
               <a:rPr lang="en-US" dirty="0"/>
-              <a:t>When it works, it’s great.</a:t>
+              <a:t>The Eagle auto router is not good enough to do it all for you.</a:t>
+            </a:r>
+          </a:p>
+          <a:p>
+            <a:r>
+              <a:rPr lang="en-US" dirty="0"/>
+              <a:t>“Follow me”</a:t>
             </a:r>
           </a:p>
           <a:p>
             <a:pPr lvl="1"/>
             <a:r>
               <a:rPr lang="en-US" dirty="0"/>
-              <a:t>Usually it needs some touch up.</a:t>
-            </a:r>
-          </a:p>
-          <a:p>
-            <a:r>
-              <a:rPr lang="en-US" dirty="0"/>
-              <a:t>Net classes (“Edit-&gt;Net Classes…”)</a:t>
+              <a:t>Assisted manual routing.  The router will enforce the constraints you set.</a:t>
+            </a:r>
+          </a:p>
+          <a:p>
+            <a:r>
+              <a:rPr lang="en-US" dirty="0"/>
+              <a:t>Fan out</a:t>
             </a:r>
           </a:p>
           <a:p>
             <a:pPr lvl="1"/>
             <a:r>
               <a:rPr lang="en-US" dirty="0"/>
-              <a:t>Lets you set widths and clearances for different kinds of nets</a:t>
-            </a:r>
+              <a:t>Create circuit stubs to connect devices to power/ground</a:t>
+            </a:r>
+          </a:p>
+          <a:p>
+            <a:pPr lvl="1"/>
+            <a:endParaRPr lang="en-US" dirty="0"/>
           </a:p>
         </p:txBody>
       </p:sp>
     </p:spTree>
     <p:extLst>
       <p:ext uri="{BB962C8B-B14F-4D97-AF65-F5344CB8AC3E}">
-        <p14:creationId xmlns:p14="http://schemas.microsoft.com/office/powerpoint/2010/main" val="1928658376"/>
+        <p14:creationId xmlns:p14="http://schemas.microsoft.com/office/powerpoint/2010/main" val="1927398484"/>
       </p:ext>
     </p:extLst>
   </p:cSld>

</xml_diff>

<commit_message>
Get rid of VIN and the associated diode.  Connect 3v3 to FTDI. Don't connect ISP to 3v3.
</commit_message>
<xml_diff>
--- a/labs/Laying-Out-The-Board/Laying-Out-The-Board.pptx
+++ b/labs/Laying-Out-The-Board/Laying-Out-The-Board.pptx
@@ -20,17 +20,21 @@
     <p:sldId id="290" r:id="rId14"/>
     <p:sldId id="289" r:id="rId15"/>
     <p:sldId id="276" r:id="rId16"/>
-    <p:sldId id="318" r:id="rId17"/>
-    <p:sldId id="261" r:id="rId18"/>
-    <p:sldId id="262" r:id="rId19"/>
-    <p:sldId id="268" r:id="rId20"/>
-    <p:sldId id="263" r:id="rId21"/>
-    <p:sldId id="264" r:id="rId22"/>
-    <p:sldId id="265" r:id="rId23"/>
-    <p:sldId id="319" r:id="rId24"/>
-    <p:sldId id="320" r:id="rId25"/>
-    <p:sldId id="321" r:id="rId26"/>
-    <p:sldId id="322" r:id="rId27"/>
+    <p:sldId id="323" r:id="rId17"/>
+    <p:sldId id="324" r:id="rId18"/>
+    <p:sldId id="325" r:id="rId19"/>
+    <p:sldId id="318" r:id="rId20"/>
+    <p:sldId id="261" r:id="rId21"/>
+    <p:sldId id="262" r:id="rId22"/>
+    <p:sldId id="268" r:id="rId23"/>
+    <p:sldId id="263" r:id="rId24"/>
+    <p:sldId id="264" r:id="rId25"/>
+    <p:sldId id="265" r:id="rId26"/>
+    <p:sldId id="319" r:id="rId27"/>
+    <p:sldId id="320" r:id="rId28"/>
+    <p:sldId id="326" r:id="rId29"/>
+    <p:sldId id="321" r:id="rId30"/>
+    <p:sldId id="322" r:id="rId31"/>
   </p:sldIdLst>
   <p:sldSz cx="12192000" cy="6858000"/>
   <p:notesSz cx="6858000" cy="9144000"/>
@@ -4041,7 +4045,7 @@
           <p:cNvPr id="2" name="Title 1">
             <a:extLst>
               <a:ext uri="{FF2B5EF4-FFF2-40B4-BE49-F238E27FC236}">
-                <a16:creationId xmlns:a16="http://schemas.microsoft.com/office/drawing/2014/main" id="{55A17526-2B88-AE4A-9C59-7889AE66DC10}"/>
+                <a16:creationId xmlns:a16="http://schemas.microsoft.com/office/drawing/2014/main" id="{E2F053ED-DB7F-E240-A040-9140E582E7D7}"/>
               </a:ext>
             </a:extLst>
           </p:cNvPr>
@@ -4059,7 +4063,7 @@
           <a:p>
             <a:r>
               <a:rPr lang="en-US" dirty="0"/>
-              <a:t>CAM Files</a:t>
+              <a:t>Routing and Layout Examples</a:t>
             </a:r>
           </a:p>
         </p:txBody>
@@ -4069,7 +4073,7 @@
           <p:cNvPr id="3" name="Text Placeholder 2">
             <a:extLst>
               <a:ext uri="{FF2B5EF4-FFF2-40B4-BE49-F238E27FC236}">
-                <a16:creationId xmlns:a16="http://schemas.microsoft.com/office/drawing/2014/main" id="{859EE15E-C860-FA40-B8BE-14B198888DF6}"/>
+                <a16:creationId xmlns:a16="http://schemas.microsoft.com/office/drawing/2014/main" id="{A4C0FBE1-C1C8-1345-B02F-348233ACF299}"/>
               </a:ext>
             </a:extLst>
           </p:cNvPr>
@@ -4092,7 +4096,7 @@
     </p:spTree>
     <p:extLst>
       <p:ext uri="{BB962C8B-B14F-4D97-AF65-F5344CB8AC3E}">
-        <p14:creationId xmlns:p14="http://schemas.microsoft.com/office/powerpoint/2010/main" val="3744426911"/>
+        <p14:creationId xmlns:p14="http://schemas.microsoft.com/office/powerpoint/2010/main" val="1857121233"/>
       </p:ext>
     </p:extLst>
   </p:cSld>
@@ -4121,7 +4125,13 @@
       </p:grpSpPr>
       <p:sp>
         <p:nvSpPr>
-          <p:cNvPr id="2" name="Title 1"/>
+          <p:cNvPr id="6" name="Title 5">
+            <a:extLst>
+              <a:ext uri="{FF2B5EF4-FFF2-40B4-BE49-F238E27FC236}">
+                <a16:creationId xmlns:a16="http://schemas.microsoft.com/office/drawing/2014/main" id="{15617D5B-F9B4-F04D-80B5-0305224591FD}"/>
+              </a:ext>
+            </a:extLst>
+          </p:cNvPr>
           <p:cNvSpPr>
             <a:spLocks noGrp="1"/>
           </p:cNvSpPr>
@@ -4136,155 +4146,75 @@
           <a:p>
             <a:r>
               <a:rPr lang="en-US" dirty="0"/>
-              <a:t>CAM Layers (Gerber files)</a:t>
-            </a:r>
-          </a:p>
-        </p:txBody>
-      </p:sp>
-      <p:sp>
-        <p:nvSpPr>
-          <p:cNvPr id="3" name="Content Placeholder 2"/>
-          <p:cNvSpPr>
-            <a:spLocks noGrp="1"/>
-          </p:cNvSpPr>
-          <p:nvPr>
-            <p:ph idx="1"/>
-          </p:nvPr>
-        </p:nvSpPr>
-        <p:spPr/>
-        <p:txBody>
-          <a:bodyPr>
-            <a:normAutofit fontScale="62500" lnSpcReduction="20000"/>
-          </a:bodyPr>
-          <a:lstStyle/>
-          <a:p>
-            <a:r>
-              <a:rPr lang="en-US" dirty="0"/>
-              <a:t>Eagle layers are for design.</a:t>
-            </a:r>
-          </a:p>
-          <a:p>
-            <a:r>
-              <a:rPr lang="en-US" dirty="0"/>
-              <a:t>CAM layers are for manufacturing</a:t>
-            </a:r>
-          </a:p>
-          <a:p>
-            <a:pPr lvl="1"/>
-            <a:r>
-              <a:rPr lang="en-US" dirty="0"/>
-              <a:t>“Gerber” files are for lithographic steps</a:t>
-            </a:r>
-          </a:p>
-          <a:p>
-            <a:pPr lvl="1"/>
-            <a:r>
-              <a:rPr lang="en-US" dirty="0"/>
-              <a:t>Drill files are for drilling holes.</a:t>
-            </a:r>
-          </a:p>
-          <a:p>
-            <a:r>
-              <a:rPr lang="en-US" dirty="0"/>
-              <a:t>Each CAM layers corresponds to one layer of the resulting board</a:t>
-            </a:r>
-          </a:p>
-          <a:p>
-            <a:pPr lvl="1"/>
-            <a:r>
-              <a:rPr lang="en-US" dirty="0"/>
-              <a:t>Top silk screen (.PLC)</a:t>
-            </a:r>
-          </a:p>
-          <a:p>
-            <a:pPr lvl="1"/>
-            <a:r>
-              <a:rPr lang="en-US" dirty="0"/>
-              <a:t>Top solder mask (.STC)</a:t>
-            </a:r>
-          </a:p>
-          <a:p>
-            <a:pPr lvl="1"/>
-            <a:r>
-              <a:rPr lang="en-US" dirty="0"/>
-              <a:t>Top metal (.TOP)</a:t>
-            </a:r>
-          </a:p>
-          <a:p>
-            <a:pPr lvl="1"/>
-            <a:r>
-              <a:rPr lang="en-US" dirty="0"/>
-              <a:t>Inner metal layers</a:t>
-            </a:r>
-          </a:p>
-          <a:p>
-            <a:pPr lvl="1"/>
-            <a:r>
-              <a:rPr lang="en-US" dirty="0"/>
-              <a:t>Bottom metal (.BOT)</a:t>
-            </a:r>
-          </a:p>
-          <a:p>
-            <a:pPr lvl="1"/>
-            <a:r>
-              <a:rPr lang="en-US" dirty="0"/>
-              <a:t>Bottom solder mask (.STS)</a:t>
-            </a:r>
-          </a:p>
-          <a:p>
-            <a:pPr lvl="1"/>
-            <a:r>
-              <a:rPr lang="en-US" dirty="0"/>
-              <a:t>Bottom silk screen (.PLS)</a:t>
-            </a:r>
-          </a:p>
-          <a:p>
-            <a:pPr lvl="1"/>
-            <a:r>
-              <a:rPr lang="en-US" dirty="0"/>
-              <a:t>Different board houses have different suffixes.</a:t>
-            </a:r>
-          </a:p>
-          <a:p>
-            <a:r>
-              <a:rPr lang="en-US" dirty="0"/>
-              <a:t>One drill file specifying where all the pads, </a:t>
-            </a:r>
-            <a:r>
-              <a:rPr lang="en-US" dirty="0" err="1"/>
-              <a:t>vias</a:t>
-            </a:r>
-            <a:r>
-              <a:rPr lang="en-US" dirty="0"/>
-              <a:t>, and mounting holes are located and their diameters (.DRD)</a:t>
-            </a:r>
-          </a:p>
-          <a:p>
-            <a:r>
-              <a:rPr lang="en-US" dirty="0"/>
-              <a:t>Other files too, depending on the manufacturing process</a:t>
-            </a:r>
-          </a:p>
-          <a:p>
-            <a:pPr lvl="1"/>
-            <a:r>
-              <a:rPr lang="en-US" dirty="0"/>
-              <a:t>Solder paste stencil</a:t>
-            </a:r>
-          </a:p>
-          <a:p>
-            <a:pPr lvl="1"/>
-            <a:r>
-              <a:rPr lang="en-US" dirty="0"/>
-              <a:t>Assembly drawings</a:t>
-            </a:r>
-          </a:p>
-        </p:txBody>
-      </p:sp>
+              <a:t>High-current Via</a:t>
+            </a:r>
+          </a:p>
+        </p:txBody>
+      </p:sp>
+      <p:sp>
+        <p:nvSpPr>
+          <p:cNvPr id="7" name="Content Placeholder 6">
+            <a:extLst>
+              <a:ext uri="{FF2B5EF4-FFF2-40B4-BE49-F238E27FC236}">
+                <a16:creationId xmlns:a16="http://schemas.microsoft.com/office/drawing/2014/main" id="{578280BE-0135-EE47-B68A-C96537CDC22D}"/>
+              </a:ext>
+            </a:extLst>
+          </p:cNvPr>
+          <p:cNvSpPr>
+            <a:spLocks noGrp="1"/>
+          </p:cNvSpPr>
+          <p:nvPr>
+            <p:ph sz="half" idx="1"/>
+          </p:nvPr>
+        </p:nvSpPr>
+        <p:spPr/>
+        <p:txBody>
+          <a:bodyPr/>
+          <a:lstStyle/>
+          <a:p>
+            <a:r>
+              <a:rPr lang="en-US" dirty="0"/>
+              <a:t>Via diameter matches trace width</a:t>
+            </a:r>
+          </a:p>
+        </p:txBody>
+      </p:sp>
+      <p:pic>
+        <p:nvPicPr>
+          <p:cNvPr id="9" name="Content Placeholder 8">
+            <a:extLst>
+              <a:ext uri="{FF2B5EF4-FFF2-40B4-BE49-F238E27FC236}">
+                <a16:creationId xmlns:a16="http://schemas.microsoft.com/office/drawing/2014/main" id="{15307456-78FA-2D47-AB3D-FB2384A8209F}"/>
+              </a:ext>
+            </a:extLst>
+          </p:cNvPr>
+          <p:cNvPicPr>
+            <a:picLocks noGrp="1" noChangeAspect="1"/>
+          </p:cNvPicPr>
+          <p:nvPr>
+            <p:ph sz="half" idx="2"/>
+          </p:nvPr>
+        </p:nvPicPr>
+        <p:blipFill>
+          <a:blip r:embed="rId2"/>
+          <a:stretch>
+            <a:fillRect/>
+          </a:stretch>
+        </p:blipFill>
+        <p:spPr>
+          <a:xfrm>
+            <a:off x="6791300" y="1825625"/>
+            <a:ext cx="3943400" cy="4351338"/>
+          </a:xfrm>
+          <a:prstGeom prst="rect">
+            <a:avLst/>
+          </a:prstGeom>
+        </p:spPr>
+      </p:pic>
     </p:spTree>
     <p:extLst>
       <p:ext uri="{BB962C8B-B14F-4D97-AF65-F5344CB8AC3E}">
-        <p14:creationId xmlns:p14="http://schemas.microsoft.com/office/powerpoint/2010/main" val="566385594"/>
+        <p14:creationId xmlns:p14="http://schemas.microsoft.com/office/powerpoint/2010/main" val="586256129"/>
       </p:ext>
     </p:extLst>
   </p:cSld>
@@ -4313,7 +4243,13 @@
       </p:grpSpPr>
       <p:sp>
         <p:nvSpPr>
-          <p:cNvPr id="2" name="Title 1"/>
+          <p:cNvPr id="2" name="Title 1">
+            <a:extLst>
+              <a:ext uri="{FF2B5EF4-FFF2-40B4-BE49-F238E27FC236}">
+                <a16:creationId xmlns:a16="http://schemas.microsoft.com/office/drawing/2014/main" id="{D8AEF629-16E3-6B4A-BAA7-694439DFE61C}"/>
+              </a:ext>
+            </a:extLst>
+          </p:cNvPr>
           <p:cNvSpPr>
             <a:spLocks noGrp="1"/>
           </p:cNvSpPr>
@@ -4328,76 +4264,72 @@
           <a:p>
             <a:r>
               <a:rPr lang="en-US" dirty="0"/>
-              <a:t>The CAM Processor</a:t>
-            </a:r>
-          </a:p>
-        </p:txBody>
-      </p:sp>
-      <p:sp>
-        <p:nvSpPr>
-          <p:cNvPr id="3" name="Content Placeholder 2"/>
-          <p:cNvSpPr>
-            <a:spLocks noGrp="1"/>
-          </p:cNvSpPr>
-          <p:nvPr>
-            <p:ph idx="1"/>
-          </p:nvPr>
-        </p:nvSpPr>
-        <p:spPr/>
-        <p:txBody>
-          <a:bodyPr/>
-          <a:lstStyle/>
-          <a:p>
-            <a:r>
-              <a:rPr lang="en-US" dirty="0"/>
-              <a:t>The CAM Processor generates CAM files</a:t>
-            </a:r>
-          </a:p>
-          <a:p>
-            <a:r>
-              <a:rPr lang="en-US" dirty="0"/>
-              <a:t>The exact configuration for the </a:t>
-            </a:r>
-            <a:r>
-              <a:rPr lang="en-US" dirty="0" err="1"/>
-              <a:t>gerber</a:t>
-            </a:r>
-            <a:r>
-              <a:rPr lang="en-US" dirty="0"/>
-              <a:t> files varies by board house</a:t>
-            </a:r>
-          </a:p>
-          <a:p>
-            <a:pPr lvl="1"/>
-            <a:r>
-              <a:rPr lang="en-US" dirty="0"/>
-              <a:t>Should the board outline be in every layer?</a:t>
-            </a:r>
-          </a:p>
-          <a:p>
-            <a:pPr lvl="1"/>
-            <a:r>
-              <a:rPr lang="en-US" dirty="0"/>
-              <a:t>Which format should the files be in (there are many)</a:t>
-            </a:r>
-          </a:p>
-          <a:p>
-            <a:pPr lvl="1"/>
-            <a:r>
-              <a:rPr lang="en-US" dirty="0"/>
-              <a:t>Should the back side layers be mirrored?</a:t>
-            </a:r>
-          </a:p>
-          <a:p>
-            <a:pPr lvl="1"/>
-            <a:endParaRPr lang="en-US" dirty="0"/>
-          </a:p>
-        </p:txBody>
-      </p:sp>
+              <a:t>Battery to Jumper</a:t>
+            </a:r>
+          </a:p>
+        </p:txBody>
+      </p:sp>
+      <p:sp>
+        <p:nvSpPr>
+          <p:cNvPr id="3" name="Content Placeholder 2">
+            <a:extLst>
+              <a:ext uri="{FF2B5EF4-FFF2-40B4-BE49-F238E27FC236}">
+                <a16:creationId xmlns:a16="http://schemas.microsoft.com/office/drawing/2014/main" id="{63DA90DD-F95D-B14A-858C-F5FA93C4AD04}"/>
+              </a:ext>
+            </a:extLst>
+          </p:cNvPr>
+          <p:cNvSpPr>
+            <a:spLocks noGrp="1"/>
+          </p:cNvSpPr>
+          <p:nvPr>
+            <p:ph sz="half" idx="1"/>
+          </p:nvPr>
+        </p:nvSpPr>
+        <p:spPr/>
+        <p:txBody>
+          <a:bodyPr/>
+          <a:lstStyle/>
+          <a:p>
+            <a:endParaRPr lang="en-US"/>
+          </a:p>
+        </p:txBody>
+      </p:sp>
+      <p:pic>
+        <p:nvPicPr>
+          <p:cNvPr id="5" name="Content Placeholder 4">
+            <a:extLst>
+              <a:ext uri="{FF2B5EF4-FFF2-40B4-BE49-F238E27FC236}">
+                <a16:creationId xmlns:a16="http://schemas.microsoft.com/office/drawing/2014/main" id="{74515715-1B2A-314B-B153-855D8850526D}"/>
+              </a:ext>
+            </a:extLst>
+          </p:cNvPr>
+          <p:cNvPicPr>
+            <a:picLocks noGrp="1" noChangeAspect="1"/>
+          </p:cNvPicPr>
+          <p:nvPr>
+            <p:ph sz="half" idx="2"/>
+          </p:nvPr>
+        </p:nvPicPr>
+        <p:blipFill>
+          <a:blip r:embed="rId2"/>
+          <a:stretch>
+            <a:fillRect/>
+          </a:stretch>
+        </p:blipFill>
+        <p:spPr>
+          <a:xfrm>
+            <a:off x="6733009" y="1825625"/>
+            <a:ext cx="4059982" cy="4351338"/>
+          </a:xfrm>
+          <a:prstGeom prst="rect">
+            <a:avLst/>
+          </a:prstGeom>
+        </p:spPr>
+      </p:pic>
     </p:spTree>
     <p:extLst>
       <p:ext uri="{BB962C8B-B14F-4D97-AF65-F5344CB8AC3E}">
-        <p14:creationId xmlns:p14="http://schemas.microsoft.com/office/powerpoint/2010/main" val="3816271031"/>
+        <p14:creationId xmlns:p14="http://schemas.microsoft.com/office/powerpoint/2010/main" val="1780003021"/>
       </p:ext>
     </p:extLst>
   </p:cSld>
@@ -4426,7 +4358,13 @@
       </p:grpSpPr>
       <p:sp>
         <p:nvSpPr>
-          <p:cNvPr id="2" name="Title 1"/>
+          <p:cNvPr id="2" name="Title 1">
+            <a:extLst>
+              <a:ext uri="{FF2B5EF4-FFF2-40B4-BE49-F238E27FC236}">
+                <a16:creationId xmlns:a16="http://schemas.microsoft.com/office/drawing/2014/main" id="{55A17526-2B88-AE4A-9C59-7889AE66DC10}"/>
+              </a:ext>
+            </a:extLst>
+          </p:cNvPr>
           <p:cNvSpPr>
             <a:spLocks noGrp="1"/>
           </p:cNvSpPr>
@@ -4441,61 +4379,40 @@
           <a:p>
             <a:r>
               <a:rPr lang="en-US" dirty="0"/>
-              <a:t>CAM Setup</a:t>
-            </a:r>
-          </a:p>
-        </p:txBody>
-      </p:sp>
-      <p:sp>
-        <p:nvSpPr>
-          <p:cNvPr id="3" name="Content Placeholder 2"/>
-          <p:cNvSpPr>
-            <a:spLocks noGrp="1"/>
-          </p:cNvSpPr>
-          <p:nvPr>
-            <p:ph idx="1"/>
-          </p:nvPr>
-        </p:nvSpPr>
-        <p:spPr/>
-        <p:txBody>
-          <a:bodyPr/>
-          <a:lstStyle/>
-          <a:p>
-            <a:r>
-              <a:rPr lang="en-US" dirty="0"/>
-              <a:t>To prepare </a:t>
-            </a:r>
-            <a:r>
-              <a:rPr lang="en-US" dirty="0" err="1"/>
-              <a:t>Gerbers</a:t>
-            </a:r>
-            <a:r>
-              <a:rPr lang="en-US" dirty="0"/>
-              <a:t> for a particular board house, you need CAM setup files (*.cam for Eagle)</a:t>
-            </a:r>
-          </a:p>
-          <a:p>
-            <a:r>
-              <a:rPr lang="en-US" dirty="0"/>
-              <a:t>This specifies how to generate each layer the board house needs.</a:t>
-            </a:r>
-          </a:p>
-          <a:p>
-            <a:r>
-              <a:rPr lang="en-US" dirty="0"/>
-              <a:t>See example in Button and </a:t>
-            </a:r>
-            <a:r>
-              <a:rPr lang="en-US"/>
-              <a:t>Light Tutorial.</a:t>
-            </a:r>
+              <a:t>CAM Files</a:t>
+            </a:r>
+          </a:p>
+        </p:txBody>
+      </p:sp>
+      <p:sp>
+        <p:nvSpPr>
+          <p:cNvPr id="3" name="Text Placeholder 2">
+            <a:extLst>
+              <a:ext uri="{FF2B5EF4-FFF2-40B4-BE49-F238E27FC236}">
+                <a16:creationId xmlns:a16="http://schemas.microsoft.com/office/drawing/2014/main" id="{859EE15E-C860-FA40-B8BE-14B198888DF6}"/>
+              </a:ext>
+            </a:extLst>
+          </p:cNvPr>
+          <p:cNvSpPr>
+            <a:spLocks noGrp="1"/>
+          </p:cNvSpPr>
+          <p:nvPr>
+            <p:ph type="body" idx="1"/>
+          </p:nvPr>
+        </p:nvSpPr>
+        <p:spPr/>
+        <p:txBody>
+          <a:bodyPr/>
+          <a:lstStyle/>
+          <a:p>
+            <a:endParaRPr lang="en-US"/>
           </a:p>
         </p:txBody>
       </p:sp>
     </p:spTree>
     <p:extLst>
       <p:ext uri="{BB962C8B-B14F-4D97-AF65-F5344CB8AC3E}">
-        <p14:creationId xmlns:p14="http://schemas.microsoft.com/office/powerpoint/2010/main" val="2430319984"/>
+        <p14:creationId xmlns:p14="http://schemas.microsoft.com/office/powerpoint/2010/main" val="3744426911"/>
       </p:ext>
     </p:extLst>
   </p:cSld>
@@ -4677,7 +4594,7 @@
           <a:p>
             <a:r>
               <a:rPr lang="en-US" dirty="0"/>
-              <a:t>CAM Demo</a:t>
+              <a:t>CAM Layers (Gerber files)</a:t>
             </a:r>
           </a:p>
         </p:txBody>
@@ -4694,17 +4611,138 @@
         </p:nvSpPr>
         <p:spPr/>
         <p:txBody>
-          <a:bodyPr/>
-          <a:lstStyle/>
-          <a:p>
-            <a:endParaRPr lang="en-US"/>
+          <a:bodyPr>
+            <a:normAutofit fontScale="62500" lnSpcReduction="20000"/>
+          </a:bodyPr>
+          <a:lstStyle/>
+          <a:p>
+            <a:r>
+              <a:rPr lang="en-US" dirty="0"/>
+              <a:t>Eagle layers are for design.</a:t>
+            </a:r>
+          </a:p>
+          <a:p>
+            <a:r>
+              <a:rPr lang="en-US" dirty="0"/>
+              <a:t>CAM layers are for manufacturing</a:t>
+            </a:r>
+          </a:p>
+          <a:p>
+            <a:pPr lvl="1"/>
+            <a:r>
+              <a:rPr lang="en-US" dirty="0"/>
+              <a:t>“Gerber” files are for lithographic steps</a:t>
+            </a:r>
+          </a:p>
+          <a:p>
+            <a:pPr lvl="1"/>
+            <a:r>
+              <a:rPr lang="en-US" dirty="0"/>
+              <a:t>Drill files are for drilling holes.</a:t>
+            </a:r>
+          </a:p>
+          <a:p>
+            <a:r>
+              <a:rPr lang="en-US" dirty="0"/>
+              <a:t>Each CAM layers corresponds to one layer of the resulting board</a:t>
+            </a:r>
+          </a:p>
+          <a:p>
+            <a:pPr lvl="1"/>
+            <a:r>
+              <a:rPr lang="en-US" dirty="0"/>
+              <a:t>Top silk screen (.PLC)</a:t>
+            </a:r>
+          </a:p>
+          <a:p>
+            <a:pPr lvl="1"/>
+            <a:r>
+              <a:rPr lang="en-US" dirty="0"/>
+              <a:t>Top solder mask (.STC)</a:t>
+            </a:r>
+          </a:p>
+          <a:p>
+            <a:pPr lvl="1"/>
+            <a:r>
+              <a:rPr lang="en-US" dirty="0"/>
+              <a:t>Top metal (.TOP)</a:t>
+            </a:r>
+          </a:p>
+          <a:p>
+            <a:pPr lvl="1"/>
+            <a:r>
+              <a:rPr lang="en-US" dirty="0"/>
+              <a:t>Inner metal layers</a:t>
+            </a:r>
+          </a:p>
+          <a:p>
+            <a:pPr lvl="1"/>
+            <a:r>
+              <a:rPr lang="en-US" dirty="0"/>
+              <a:t>Bottom metal (.BOT)</a:t>
+            </a:r>
+          </a:p>
+          <a:p>
+            <a:pPr lvl="1"/>
+            <a:r>
+              <a:rPr lang="en-US" dirty="0"/>
+              <a:t>Bottom solder mask (.STS)</a:t>
+            </a:r>
+          </a:p>
+          <a:p>
+            <a:pPr lvl="1"/>
+            <a:r>
+              <a:rPr lang="en-US" dirty="0"/>
+              <a:t>Bottom silk screen (.PLS)</a:t>
+            </a:r>
+          </a:p>
+          <a:p>
+            <a:pPr lvl="1"/>
+            <a:r>
+              <a:rPr lang="en-US" dirty="0"/>
+              <a:t>Different board houses have different suffixes.</a:t>
+            </a:r>
+          </a:p>
+          <a:p>
+            <a:r>
+              <a:rPr lang="en-US" dirty="0"/>
+              <a:t>One drill file specifying where all the pads, </a:t>
+            </a:r>
+            <a:r>
+              <a:rPr lang="en-US" dirty="0" err="1"/>
+              <a:t>vias</a:t>
+            </a:r>
+            <a:r>
+              <a:rPr lang="en-US" dirty="0"/>
+              <a:t>, and mounting holes are located and their diameters (.DRD)</a:t>
+            </a:r>
+          </a:p>
+          <a:p>
+            <a:r>
+              <a:rPr lang="en-US" dirty="0"/>
+              <a:t>Other files too, depending on the manufacturing process</a:t>
+            </a:r>
+          </a:p>
+          <a:p>
+            <a:pPr lvl="1"/>
+            <a:r>
+              <a:rPr lang="en-US" dirty="0"/>
+              <a:t>Solder paste stencil</a:t>
+            </a:r>
+          </a:p>
+          <a:p>
+            <a:pPr lvl="1"/>
+            <a:r>
+              <a:rPr lang="en-US" dirty="0"/>
+              <a:t>Assembly drawings</a:t>
+            </a:r>
           </a:p>
         </p:txBody>
       </p:sp>
     </p:spTree>
     <p:extLst>
       <p:ext uri="{BB962C8B-B14F-4D97-AF65-F5344CB8AC3E}">
-        <p14:creationId xmlns:p14="http://schemas.microsoft.com/office/powerpoint/2010/main" val="2136779027"/>
+        <p14:creationId xmlns:p14="http://schemas.microsoft.com/office/powerpoint/2010/main" val="566385594"/>
       </p:ext>
     </p:extLst>
   </p:cSld>
@@ -4748,100 +4786,68 @@
           <a:p>
             <a:r>
               <a:rPr lang="en-US" dirty="0"/>
-              <a:t>Checking Your </a:t>
+              <a:t>The CAM Processor</a:t>
+            </a:r>
+          </a:p>
+        </p:txBody>
+      </p:sp>
+      <p:sp>
+        <p:nvSpPr>
+          <p:cNvPr id="3" name="Content Placeholder 2"/>
+          <p:cNvSpPr>
+            <a:spLocks noGrp="1"/>
+          </p:cNvSpPr>
+          <p:nvPr>
+            <p:ph idx="1"/>
+          </p:nvPr>
+        </p:nvSpPr>
+        <p:spPr/>
+        <p:txBody>
+          <a:bodyPr/>
+          <a:lstStyle/>
+          <a:p>
+            <a:r>
+              <a:rPr lang="en-US" dirty="0"/>
+              <a:t>The CAM Processor generates CAM files</a:t>
+            </a:r>
+          </a:p>
+          <a:p>
+            <a:r>
+              <a:rPr lang="en-US" dirty="0"/>
+              <a:t>The exact configuration for the </a:t>
             </a:r>
             <a:r>
               <a:rPr lang="en-US" dirty="0" err="1"/>
-              <a:t>Gerbers</a:t>
-            </a:r>
-            <a:r>
-              <a:rPr lang="en-US" dirty="0"/>
-              <a:t>!</a:t>
-            </a:r>
-          </a:p>
-        </p:txBody>
-      </p:sp>
-      <p:sp>
-        <p:nvSpPr>
-          <p:cNvPr id="3" name="Content Placeholder 2"/>
-          <p:cNvSpPr>
-            <a:spLocks noGrp="1"/>
-          </p:cNvSpPr>
-          <p:nvPr>
-            <p:ph idx="1"/>
-          </p:nvPr>
-        </p:nvSpPr>
-        <p:spPr/>
-        <p:txBody>
-          <a:bodyPr/>
-          <a:lstStyle/>
-          <a:p>
-            <a:r>
-              <a:rPr lang="en-US" dirty="0"/>
-              <a:t>Eagle can’t display Gerber files itself</a:t>
-            </a:r>
-          </a:p>
-          <a:p>
-            <a:r>
-              <a:rPr lang="en-US" dirty="0"/>
-              <a:t>You need a 3</a:t>
-            </a:r>
-            <a:r>
-              <a:rPr lang="en-US" baseline="30000" dirty="0"/>
-              <a:t>rd</a:t>
-            </a:r>
-            <a:r>
-              <a:rPr lang="en-US" dirty="0"/>
-              <a:t> party tool</a:t>
+              <a:t>gerber</a:t>
+            </a:r>
+            <a:r>
+              <a:rPr lang="en-US" dirty="0"/>
+              <a:t> files varies by board house</a:t>
             </a:r>
           </a:p>
           <a:p>
             <a:pPr lvl="1"/>
             <a:r>
               <a:rPr lang="en-US" dirty="0"/>
-              <a:t>See the Button and Light tutorial for recommendations</a:t>
-            </a:r>
-          </a:p>
-          <a:p>
-            <a:r>
-              <a:rPr lang="en-US" dirty="0"/>
-              <a:t>You should always check your </a:t>
-            </a:r>
-            <a:r>
-              <a:rPr lang="en-US" dirty="0" err="1"/>
-              <a:t>Gerbers</a:t>
-            </a:r>
-            <a:r>
-              <a:rPr lang="en-US" dirty="0"/>
-              <a:t>!</a:t>
+              <a:t>Should the board outline be in every layer?</a:t>
             </a:r>
           </a:p>
           <a:p>
             <a:pPr lvl="1"/>
             <a:r>
               <a:rPr lang="en-US" dirty="0"/>
-              <a:t>Eagle has bugs (you should assume)</a:t>
+              <a:t>Which format should the files be in (there are many)</a:t>
             </a:r>
           </a:p>
           <a:p>
             <a:pPr lvl="1"/>
             <a:r>
               <a:rPr lang="en-US" dirty="0"/>
-              <a:t>You may have misconfigured something</a:t>
+              <a:t>Should the back side layers be mirrored?</a:t>
             </a:r>
           </a:p>
           <a:p>
             <a:pPr lvl="1"/>
-            <a:r>
-              <a:rPr lang="en-US" dirty="0"/>
-              <a:t>You may have put something in the wrong layer.</a:t>
-            </a:r>
-          </a:p>
-          <a:p>
-            <a:pPr lvl="1"/>
-            <a:endParaRPr lang="en-US" dirty="0"/>
-          </a:p>
-          <a:p>
             <a:endParaRPr lang="en-US" dirty="0"/>
           </a:p>
         </p:txBody>
@@ -4849,7 +4855,7 @@
     </p:spTree>
     <p:extLst>
       <p:ext uri="{BB962C8B-B14F-4D97-AF65-F5344CB8AC3E}">
-        <p14:creationId xmlns:p14="http://schemas.microsoft.com/office/powerpoint/2010/main" val="4286829495"/>
+        <p14:creationId xmlns:p14="http://schemas.microsoft.com/office/powerpoint/2010/main" val="3816271031"/>
       </p:ext>
     </p:extLst>
   </p:cSld>
@@ -4893,7 +4899,7 @@
           <a:p>
             <a:r>
               <a:rPr lang="en-US" dirty="0"/>
-              <a:t>Gerber Viewer Demo</a:t>
+              <a:t>CAM Setup</a:t>
             </a:r>
           </a:p>
         </p:txBody>
@@ -4913,14 +4919,41 @@
           <a:bodyPr/>
           <a:lstStyle/>
           <a:p>
-            <a:endParaRPr lang="en-US" dirty="0"/>
+            <a:r>
+              <a:rPr lang="en-US" dirty="0"/>
+              <a:t>To prepare </a:t>
+            </a:r>
+            <a:r>
+              <a:rPr lang="en-US" dirty="0" err="1"/>
+              <a:t>Gerbers</a:t>
+            </a:r>
+            <a:r>
+              <a:rPr lang="en-US" dirty="0"/>
+              <a:t> for a particular board house, you need CAM setup files (*.cam for Eagle)</a:t>
+            </a:r>
+          </a:p>
+          <a:p>
+            <a:r>
+              <a:rPr lang="en-US" dirty="0"/>
+              <a:t>This specifies how to generate each layer the board house needs.</a:t>
+            </a:r>
+          </a:p>
+          <a:p>
+            <a:r>
+              <a:rPr lang="en-US" dirty="0"/>
+              <a:t>See example in Button and </a:t>
+            </a:r>
+            <a:r>
+              <a:rPr lang="en-US"/>
+              <a:t>Light Tutorial.</a:t>
+            </a:r>
           </a:p>
         </p:txBody>
       </p:sp>
     </p:spTree>
     <p:extLst>
       <p:ext uri="{BB962C8B-B14F-4D97-AF65-F5344CB8AC3E}">
-        <p14:creationId xmlns:p14="http://schemas.microsoft.com/office/powerpoint/2010/main" val="530783078"/>
+        <p14:creationId xmlns:p14="http://schemas.microsoft.com/office/powerpoint/2010/main" val="2430319984"/>
       </p:ext>
     </p:extLst>
   </p:cSld>
@@ -4949,6 +4982,293 @@
       </p:grpSpPr>
       <p:sp>
         <p:nvSpPr>
+          <p:cNvPr id="2" name="Title 1"/>
+          <p:cNvSpPr>
+            <a:spLocks noGrp="1"/>
+          </p:cNvSpPr>
+          <p:nvPr>
+            <p:ph type="title"/>
+          </p:nvPr>
+        </p:nvSpPr>
+        <p:spPr/>
+        <p:txBody>
+          <a:bodyPr/>
+          <a:lstStyle/>
+          <a:p>
+            <a:r>
+              <a:rPr lang="en-US" dirty="0"/>
+              <a:t>CAM Demo</a:t>
+            </a:r>
+          </a:p>
+        </p:txBody>
+      </p:sp>
+      <p:sp>
+        <p:nvSpPr>
+          <p:cNvPr id="3" name="Content Placeholder 2"/>
+          <p:cNvSpPr>
+            <a:spLocks noGrp="1"/>
+          </p:cNvSpPr>
+          <p:nvPr>
+            <p:ph idx="1"/>
+          </p:nvPr>
+        </p:nvSpPr>
+        <p:spPr/>
+        <p:txBody>
+          <a:bodyPr/>
+          <a:lstStyle/>
+          <a:p>
+            <a:endParaRPr lang="en-US"/>
+          </a:p>
+        </p:txBody>
+      </p:sp>
+    </p:spTree>
+    <p:extLst>
+      <p:ext uri="{BB962C8B-B14F-4D97-AF65-F5344CB8AC3E}">
+        <p14:creationId xmlns:p14="http://schemas.microsoft.com/office/powerpoint/2010/main" val="2136779027"/>
+      </p:ext>
+    </p:extLst>
+  </p:cSld>
+  <p:clrMapOvr>
+    <a:masterClrMapping/>
+  </p:clrMapOvr>
+</p:sld>
+</file>
+
+<file path=ppt/slides/slide24.xml><?xml version="1.0" encoding="utf-8"?>
+<p:sld xmlns:a="http://schemas.openxmlformats.org/drawingml/2006/main" xmlns:r="http://schemas.openxmlformats.org/officeDocument/2006/relationships" xmlns:p="http://schemas.openxmlformats.org/presentationml/2006/main">
+  <p:cSld>
+    <p:spTree>
+      <p:nvGrpSpPr>
+        <p:cNvPr id="1" name=""/>
+        <p:cNvGrpSpPr/>
+        <p:nvPr/>
+      </p:nvGrpSpPr>
+      <p:grpSpPr>
+        <a:xfrm>
+          <a:off x="0" y="0"/>
+          <a:ext cx="0" cy="0"/>
+          <a:chOff x="0" y="0"/>
+          <a:chExt cx="0" cy="0"/>
+        </a:xfrm>
+      </p:grpSpPr>
+      <p:sp>
+        <p:nvSpPr>
+          <p:cNvPr id="2" name="Title 1"/>
+          <p:cNvSpPr>
+            <a:spLocks noGrp="1"/>
+          </p:cNvSpPr>
+          <p:nvPr>
+            <p:ph type="title"/>
+          </p:nvPr>
+        </p:nvSpPr>
+        <p:spPr/>
+        <p:txBody>
+          <a:bodyPr/>
+          <a:lstStyle/>
+          <a:p>
+            <a:r>
+              <a:rPr lang="en-US" dirty="0"/>
+              <a:t>Checking Your </a:t>
+            </a:r>
+            <a:r>
+              <a:rPr lang="en-US" dirty="0" err="1"/>
+              <a:t>Gerbers</a:t>
+            </a:r>
+            <a:r>
+              <a:rPr lang="en-US" dirty="0"/>
+              <a:t>!</a:t>
+            </a:r>
+          </a:p>
+        </p:txBody>
+      </p:sp>
+      <p:sp>
+        <p:nvSpPr>
+          <p:cNvPr id="3" name="Content Placeholder 2"/>
+          <p:cNvSpPr>
+            <a:spLocks noGrp="1"/>
+          </p:cNvSpPr>
+          <p:nvPr>
+            <p:ph idx="1"/>
+          </p:nvPr>
+        </p:nvSpPr>
+        <p:spPr/>
+        <p:txBody>
+          <a:bodyPr/>
+          <a:lstStyle/>
+          <a:p>
+            <a:r>
+              <a:rPr lang="en-US" dirty="0"/>
+              <a:t>Eagle can’t display Gerber files itself</a:t>
+            </a:r>
+          </a:p>
+          <a:p>
+            <a:r>
+              <a:rPr lang="en-US" dirty="0"/>
+              <a:t>You need a 3</a:t>
+            </a:r>
+            <a:r>
+              <a:rPr lang="en-US" baseline="30000" dirty="0"/>
+              <a:t>rd</a:t>
+            </a:r>
+            <a:r>
+              <a:rPr lang="en-US" dirty="0"/>
+              <a:t> party tool</a:t>
+            </a:r>
+          </a:p>
+          <a:p>
+            <a:pPr lvl="1"/>
+            <a:r>
+              <a:rPr lang="en-US" dirty="0"/>
+              <a:t>See the Button and Light tutorial for recommendations</a:t>
+            </a:r>
+          </a:p>
+          <a:p>
+            <a:r>
+              <a:rPr lang="en-US" dirty="0"/>
+              <a:t>You should always check your </a:t>
+            </a:r>
+            <a:r>
+              <a:rPr lang="en-US" dirty="0" err="1"/>
+              <a:t>Gerbers</a:t>
+            </a:r>
+            <a:r>
+              <a:rPr lang="en-US" dirty="0"/>
+              <a:t>!</a:t>
+            </a:r>
+          </a:p>
+          <a:p>
+            <a:pPr lvl="1"/>
+            <a:r>
+              <a:rPr lang="en-US" dirty="0"/>
+              <a:t>Eagle has bugs (you should assume)</a:t>
+            </a:r>
+          </a:p>
+          <a:p>
+            <a:pPr lvl="1"/>
+            <a:r>
+              <a:rPr lang="en-US" dirty="0"/>
+              <a:t>You may have misconfigured something</a:t>
+            </a:r>
+          </a:p>
+          <a:p>
+            <a:pPr lvl="1"/>
+            <a:r>
+              <a:rPr lang="en-US" dirty="0"/>
+              <a:t>You may have put something in the wrong layer.</a:t>
+            </a:r>
+          </a:p>
+          <a:p>
+            <a:pPr lvl="1"/>
+            <a:endParaRPr lang="en-US" dirty="0"/>
+          </a:p>
+          <a:p>
+            <a:endParaRPr lang="en-US" dirty="0"/>
+          </a:p>
+        </p:txBody>
+      </p:sp>
+    </p:spTree>
+    <p:extLst>
+      <p:ext uri="{BB962C8B-B14F-4D97-AF65-F5344CB8AC3E}">
+        <p14:creationId xmlns:p14="http://schemas.microsoft.com/office/powerpoint/2010/main" val="4286829495"/>
+      </p:ext>
+    </p:extLst>
+  </p:cSld>
+  <p:clrMapOvr>
+    <a:masterClrMapping/>
+  </p:clrMapOvr>
+</p:sld>
+</file>
+
+<file path=ppt/slides/slide25.xml><?xml version="1.0" encoding="utf-8"?>
+<p:sld xmlns:a="http://schemas.openxmlformats.org/drawingml/2006/main" xmlns:r="http://schemas.openxmlformats.org/officeDocument/2006/relationships" xmlns:p="http://schemas.openxmlformats.org/presentationml/2006/main">
+  <p:cSld>
+    <p:spTree>
+      <p:nvGrpSpPr>
+        <p:cNvPr id="1" name=""/>
+        <p:cNvGrpSpPr/>
+        <p:nvPr/>
+      </p:nvGrpSpPr>
+      <p:grpSpPr>
+        <a:xfrm>
+          <a:off x="0" y="0"/>
+          <a:ext cx="0" cy="0"/>
+          <a:chOff x="0" y="0"/>
+          <a:chExt cx="0" cy="0"/>
+        </a:xfrm>
+      </p:grpSpPr>
+      <p:sp>
+        <p:nvSpPr>
+          <p:cNvPr id="2" name="Title 1"/>
+          <p:cNvSpPr>
+            <a:spLocks noGrp="1"/>
+          </p:cNvSpPr>
+          <p:nvPr>
+            <p:ph type="title"/>
+          </p:nvPr>
+        </p:nvSpPr>
+        <p:spPr/>
+        <p:txBody>
+          <a:bodyPr/>
+          <a:lstStyle/>
+          <a:p>
+            <a:r>
+              <a:rPr lang="en-US" dirty="0"/>
+              <a:t>Gerber Viewer Demo</a:t>
+            </a:r>
+          </a:p>
+        </p:txBody>
+      </p:sp>
+      <p:sp>
+        <p:nvSpPr>
+          <p:cNvPr id="3" name="Content Placeholder 2"/>
+          <p:cNvSpPr>
+            <a:spLocks noGrp="1"/>
+          </p:cNvSpPr>
+          <p:nvPr>
+            <p:ph idx="1"/>
+          </p:nvPr>
+        </p:nvSpPr>
+        <p:spPr/>
+        <p:txBody>
+          <a:bodyPr/>
+          <a:lstStyle/>
+          <a:p>
+            <a:endParaRPr lang="en-US" dirty="0"/>
+          </a:p>
+        </p:txBody>
+      </p:sp>
+    </p:spTree>
+    <p:extLst>
+      <p:ext uri="{BB962C8B-B14F-4D97-AF65-F5344CB8AC3E}">
+        <p14:creationId xmlns:p14="http://schemas.microsoft.com/office/powerpoint/2010/main" val="530783078"/>
+      </p:ext>
+    </p:extLst>
+  </p:cSld>
+  <p:clrMapOvr>
+    <a:masterClrMapping/>
+  </p:clrMapOvr>
+</p:sld>
+</file>
+
+<file path=ppt/slides/slide26.xml><?xml version="1.0" encoding="utf-8"?>
+<p:sld xmlns:a="http://schemas.openxmlformats.org/drawingml/2006/main" xmlns:r="http://schemas.openxmlformats.org/officeDocument/2006/relationships" xmlns:p="http://schemas.openxmlformats.org/presentationml/2006/main">
+  <p:cSld>
+    <p:spTree>
+      <p:nvGrpSpPr>
+        <p:cNvPr id="1" name=""/>
+        <p:cNvGrpSpPr/>
+        <p:nvPr/>
+      </p:nvGrpSpPr>
+      <p:grpSpPr>
+        <a:xfrm>
+          <a:off x="0" y="0"/>
+          <a:ext cx="0" cy="0"/>
+          <a:chOff x="0" y="0"/>
+          <a:chExt cx="0" cy="0"/>
+        </a:xfrm>
+      </p:grpSpPr>
+      <p:sp>
+        <p:nvSpPr>
           <p:cNvPr id="2" name="Title 1">
             <a:extLst>
               <a:ext uri="{FF2B5EF4-FFF2-40B4-BE49-F238E27FC236}">
@@ -5018,7 +5338,7 @@
 </p:sld>
 </file>
 
-<file path=ppt/slides/slide24.xml><?xml version="1.0" encoding="utf-8"?>
+<file path=ppt/slides/slide27.xml><?xml version="1.0" encoding="utf-8"?>
 <p:sld xmlns:a="http://schemas.openxmlformats.org/drawingml/2006/main" xmlns:r="http://schemas.openxmlformats.org/officeDocument/2006/relationships" xmlns:p="http://schemas.openxmlformats.org/presentationml/2006/main">
   <p:cSld>
     <p:spTree>
@@ -5333,7 +5653,164 @@
 </p:sld>
 </file>
 
-<file path=ppt/slides/slide25.xml><?xml version="1.0" encoding="utf-8"?>
+<file path=ppt/slides/slide28.xml><?xml version="1.0" encoding="utf-8"?>
+<p:sld xmlns:a="http://schemas.openxmlformats.org/drawingml/2006/main" xmlns:r="http://schemas.openxmlformats.org/officeDocument/2006/relationships" xmlns:p="http://schemas.openxmlformats.org/presentationml/2006/main">
+  <p:cSld>
+    <p:spTree>
+      <p:nvGrpSpPr>
+        <p:cNvPr id="1" name=""/>
+        <p:cNvGrpSpPr/>
+        <p:nvPr/>
+      </p:nvGrpSpPr>
+      <p:grpSpPr>
+        <a:xfrm>
+          <a:off x="0" y="0"/>
+          <a:ext cx="0" cy="0"/>
+          <a:chOff x="0" y="0"/>
+          <a:chExt cx="0" cy="0"/>
+        </a:xfrm>
+      </p:grpSpPr>
+      <p:sp>
+        <p:nvSpPr>
+          <p:cNvPr id="2" name="Title 1">
+            <a:extLst>
+              <a:ext uri="{FF2B5EF4-FFF2-40B4-BE49-F238E27FC236}">
+                <a16:creationId xmlns:a16="http://schemas.microsoft.com/office/drawing/2014/main" id="{06C18186-5A73-C948-AD79-C014BB5BAB8F}"/>
+              </a:ext>
+            </a:extLst>
+          </p:cNvPr>
+          <p:cNvSpPr>
+            <a:spLocks noGrp="1"/>
+          </p:cNvSpPr>
+          <p:nvPr>
+            <p:ph type="title"/>
+          </p:nvPr>
+        </p:nvSpPr>
+        <p:spPr/>
+        <p:txBody>
+          <a:bodyPr/>
+          <a:lstStyle/>
+          <a:p>
+            <a:r>
+              <a:rPr lang="en-US" dirty="0"/>
+              <a:t>Next Time</a:t>
+            </a:r>
+          </a:p>
+        </p:txBody>
+      </p:sp>
+      <p:sp>
+        <p:nvSpPr>
+          <p:cNvPr id="3" name="Content Placeholder 2">
+            <a:extLst>
+              <a:ext uri="{FF2B5EF4-FFF2-40B4-BE49-F238E27FC236}">
+                <a16:creationId xmlns:a16="http://schemas.microsoft.com/office/drawing/2014/main" id="{C931E1EB-CC65-2A4E-AF97-CFA20B024304}"/>
+              </a:ext>
+            </a:extLst>
+          </p:cNvPr>
+          <p:cNvSpPr>
+            <a:spLocks noGrp="1"/>
+          </p:cNvSpPr>
+          <p:nvPr>
+            <p:ph sz="half" idx="1"/>
+          </p:nvPr>
+        </p:nvSpPr>
+        <p:spPr/>
+        <p:txBody>
+          <a:bodyPr/>
+          <a:lstStyle/>
+          <a:p>
+            <a:r>
+              <a:rPr lang="en-US" dirty="0"/>
+              <a:t>These slides need significant improvement.</a:t>
+            </a:r>
+          </a:p>
+          <a:p>
+            <a:r>
+              <a:rPr lang="en-US" dirty="0" err="1"/>
+              <a:t>Talkabout</a:t>
+            </a:r>
+            <a:r>
+              <a:rPr lang="en-US" dirty="0"/>
+              <a:t> placement of decoupling caps.</a:t>
+            </a:r>
+          </a:p>
+          <a:p>
+            <a:r>
+              <a:rPr lang="en-US" dirty="0"/>
+              <a:t>Update tips and tricks</a:t>
+            </a:r>
+          </a:p>
+          <a:p>
+            <a:r>
+              <a:rPr lang="en-US" dirty="0"/>
+              <a:t>Put more screen shots in to show how things should be laid out.</a:t>
+            </a:r>
+          </a:p>
+          <a:p>
+            <a:r>
+              <a:rPr lang="en-US" dirty="0"/>
+              <a:t>Discuss differential pairs</a:t>
+            </a:r>
+          </a:p>
+          <a:p>
+            <a:endParaRPr lang="en-US" dirty="0"/>
+          </a:p>
+        </p:txBody>
+      </p:sp>
+      <p:sp>
+        <p:nvSpPr>
+          <p:cNvPr id="4" name="Content Placeholder 3">
+            <a:extLst>
+              <a:ext uri="{FF2B5EF4-FFF2-40B4-BE49-F238E27FC236}">
+                <a16:creationId xmlns:a16="http://schemas.microsoft.com/office/drawing/2014/main" id="{2376EF1C-1FE4-184B-A627-A7B2AF1BA936}"/>
+              </a:ext>
+            </a:extLst>
+          </p:cNvPr>
+          <p:cNvSpPr>
+            <a:spLocks noGrp="1"/>
+          </p:cNvSpPr>
+          <p:nvPr>
+            <p:ph sz="half" idx="2"/>
+          </p:nvPr>
+        </p:nvSpPr>
+        <p:spPr/>
+        <p:txBody>
+          <a:bodyPr/>
+          <a:lstStyle/>
+          <a:p>
+            <a:r>
+              <a:rPr lang="en-US" dirty="0"/>
+              <a:t>Had about 20 min of questions about previous labs</a:t>
+            </a:r>
+          </a:p>
+          <a:p>
+            <a:r>
+              <a:rPr lang="en-US" dirty="0"/>
+              <a:t>Then, demoed for about 1.5 hours.  </a:t>
+            </a:r>
+          </a:p>
+          <a:p>
+            <a:r>
+              <a:rPr lang="en-US" dirty="0"/>
+              <a:t>Didn’t get past slide the “layout demo” slide</a:t>
+            </a:r>
+          </a:p>
+        </p:txBody>
+      </p:sp>
+    </p:spTree>
+    <p:extLst>
+      <p:ext uri="{BB962C8B-B14F-4D97-AF65-F5344CB8AC3E}">
+        <p14:creationId xmlns:p14="http://schemas.microsoft.com/office/powerpoint/2010/main" val="1579452856"/>
+      </p:ext>
+    </p:extLst>
+  </p:cSld>
+  <p:clrMapOvr>
+    <a:masterClrMapping/>
+  </p:clrMapOvr>
+</p:sld>
+</file>
+
+<file path=ppt/slides/slide29.xml><?xml version="1.0" encoding="utf-8"?>
 <p:sld xmlns:a="http://schemas.openxmlformats.org/drawingml/2006/main" xmlns:r="http://schemas.openxmlformats.org/officeDocument/2006/relationships" xmlns:p="http://schemas.openxmlformats.org/presentationml/2006/main" show="0">
   <p:cSld>
     <p:spTree>
@@ -5442,122 +5919,6 @@
     <p:extLst>
       <p:ext uri="{BB962C8B-B14F-4D97-AF65-F5344CB8AC3E}">
         <p14:creationId xmlns:p14="http://schemas.microsoft.com/office/powerpoint/2010/main" val="1959214347"/>
-      </p:ext>
-    </p:extLst>
-  </p:cSld>
-  <p:clrMapOvr>
-    <a:masterClrMapping/>
-  </p:clrMapOvr>
-</p:sld>
-</file>
-
-<file path=ppt/slides/slide26.xml><?xml version="1.0" encoding="utf-8"?>
-<p:sld xmlns:a="http://schemas.openxmlformats.org/drawingml/2006/main" xmlns:r="http://schemas.openxmlformats.org/officeDocument/2006/relationships" xmlns:p="http://schemas.openxmlformats.org/presentationml/2006/main">
-  <p:cSld>
-    <p:spTree>
-      <p:nvGrpSpPr>
-        <p:cNvPr id="1" name=""/>
-        <p:cNvGrpSpPr/>
-        <p:nvPr/>
-      </p:nvGrpSpPr>
-      <p:grpSpPr>
-        <a:xfrm>
-          <a:off x="0" y="0"/>
-          <a:ext cx="0" cy="0"/>
-          <a:chOff x="0" y="0"/>
-          <a:chExt cx="0" cy="0"/>
-        </a:xfrm>
-      </p:grpSpPr>
-      <p:sp>
-        <p:nvSpPr>
-          <p:cNvPr id="4" name="Title 3">
-            <a:extLst>
-              <a:ext uri="{FF2B5EF4-FFF2-40B4-BE49-F238E27FC236}">
-                <a16:creationId xmlns:a16="http://schemas.microsoft.com/office/drawing/2014/main" id="{B44DCD34-5627-184E-AC47-69F691AB516B}"/>
-              </a:ext>
-            </a:extLst>
-          </p:cNvPr>
-          <p:cNvSpPr>
-            <a:spLocks noGrp="1"/>
-          </p:cNvSpPr>
-          <p:nvPr>
-            <p:ph type="title"/>
-          </p:nvPr>
-        </p:nvSpPr>
-        <p:spPr/>
-        <p:txBody>
-          <a:bodyPr/>
-          <a:lstStyle/>
-          <a:p>
-            <a:r>
-              <a:rPr lang="en-US" dirty="0"/>
-              <a:t>Microcontroller and IMU Controller: Noise</a:t>
-            </a:r>
-          </a:p>
-        </p:txBody>
-      </p:sp>
-      <p:sp>
-        <p:nvSpPr>
-          <p:cNvPr id="5" name="Content Placeholder 4">
-            <a:extLst>
-              <a:ext uri="{FF2B5EF4-FFF2-40B4-BE49-F238E27FC236}">
-                <a16:creationId xmlns:a16="http://schemas.microsoft.com/office/drawing/2014/main" id="{580D2C22-2004-FB46-B048-D95EDE4A5F63}"/>
-              </a:ext>
-            </a:extLst>
-          </p:cNvPr>
-          <p:cNvSpPr>
-            <a:spLocks noGrp="1"/>
-          </p:cNvSpPr>
-          <p:nvPr>
-            <p:ph sz="half" idx="1"/>
-          </p:nvPr>
-        </p:nvSpPr>
-        <p:spPr>
-          <a:xfrm>
-            <a:off x="838200" y="1825625"/>
-            <a:ext cx="4528127" cy="4351338"/>
-          </a:xfrm>
-        </p:spPr>
-        <p:txBody>
-          <a:bodyPr>
-            <a:normAutofit/>
-          </a:bodyPr>
-          <a:lstStyle/>
-          <a:p>
-            <a:pPr lvl="1"/>
-            <a:endParaRPr lang="en-US" dirty="0"/>
-          </a:p>
-        </p:txBody>
-      </p:sp>
-      <p:sp>
-        <p:nvSpPr>
-          <p:cNvPr id="3" name="Content Placeholder 2">
-            <a:extLst>
-              <a:ext uri="{FF2B5EF4-FFF2-40B4-BE49-F238E27FC236}">
-                <a16:creationId xmlns:a16="http://schemas.microsoft.com/office/drawing/2014/main" id="{D9DD746E-E481-614A-BC5B-C941B11D3A66}"/>
-              </a:ext>
-            </a:extLst>
-          </p:cNvPr>
-          <p:cNvSpPr>
-            <a:spLocks noGrp="1"/>
-          </p:cNvSpPr>
-          <p:nvPr>
-            <p:ph sz="half" idx="2"/>
-          </p:nvPr>
-        </p:nvSpPr>
-        <p:spPr/>
-        <p:txBody>
-          <a:bodyPr/>
-          <a:lstStyle/>
-          <a:p>
-            <a:endParaRPr lang="en-US"/>
-          </a:p>
-        </p:txBody>
-      </p:sp>
-    </p:spTree>
-    <p:extLst>
-      <p:ext uri="{BB962C8B-B14F-4D97-AF65-F5344CB8AC3E}">
-        <p14:creationId xmlns:p14="http://schemas.microsoft.com/office/powerpoint/2010/main" val="582483006"/>
       </p:ext>
     </p:extLst>
   </p:cSld>
@@ -5674,6 +6035,122 @@
     <p:extLst>
       <p:ext uri="{BB962C8B-B14F-4D97-AF65-F5344CB8AC3E}">
         <p14:creationId xmlns:p14="http://schemas.microsoft.com/office/powerpoint/2010/main" val="3749329050"/>
+      </p:ext>
+    </p:extLst>
+  </p:cSld>
+  <p:clrMapOvr>
+    <a:masterClrMapping/>
+  </p:clrMapOvr>
+</p:sld>
+</file>
+
+<file path=ppt/slides/slide30.xml><?xml version="1.0" encoding="utf-8"?>
+<p:sld xmlns:a="http://schemas.openxmlformats.org/drawingml/2006/main" xmlns:r="http://schemas.openxmlformats.org/officeDocument/2006/relationships" xmlns:p="http://schemas.openxmlformats.org/presentationml/2006/main">
+  <p:cSld>
+    <p:spTree>
+      <p:nvGrpSpPr>
+        <p:cNvPr id="1" name=""/>
+        <p:cNvGrpSpPr/>
+        <p:nvPr/>
+      </p:nvGrpSpPr>
+      <p:grpSpPr>
+        <a:xfrm>
+          <a:off x="0" y="0"/>
+          <a:ext cx="0" cy="0"/>
+          <a:chOff x="0" y="0"/>
+          <a:chExt cx="0" cy="0"/>
+        </a:xfrm>
+      </p:grpSpPr>
+      <p:sp>
+        <p:nvSpPr>
+          <p:cNvPr id="4" name="Title 3">
+            <a:extLst>
+              <a:ext uri="{FF2B5EF4-FFF2-40B4-BE49-F238E27FC236}">
+                <a16:creationId xmlns:a16="http://schemas.microsoft.com/office/drawing/2014/main" id="{B44DCD34-5627-184E-AC47-69F691AB516B}"/>
+              </a:ext>
+            </a:extLst>
+          </p:cNvPr>
+          <p:cNvSpPr>
+            <a:spLocks noGrp="1"/>
+          </p:cNvSpPr>
+          <p:nvPr>
+            <p:ph type="title"/>
+          </p:nvPr>
+        </p:nvSpPr>
+        <p:spPr/>
+        <p:txBody>
+          <a:bodyPr/>
+          <a:lstStyle/>
+          <a:p>
+            <a:r>
+              <a:rPr lang="en-US" dirty="0"/>
+              <a:t>Microcontroller and IMU Controller: Noise</a:t>
+            </a:r>
+          </a:p>
+        </p:txBody>
+      </p:sp>
+      <p:sp>
+        <p:nvSpPr>
+          <p:cNvPr id="5" name="Content Placeholder 4">
+            <a:extLst>
+              <a:ext uri="{FF2B5EF4-FFF2-40B4-BE49-F238E27FC236}">
+                <a16:creationId xmlns:a16="http://schemas.microsoft.com/office/drawing/2014/main" id="{580D2C22-2004-FB46-B048-D95EDE4A5F63}"/>
+              </a:ext>
+            </a:extLst>
+          </p:cNvPr>
+          <p:cNvSpPr>
+            <a:spLocks noGrp="1"/>
+          </p:cNvSpPr>
+          <p:nvPr>
+            <p:ph sz="half" idx="1"/>
+          </p:nvPr>
+        </p:nvSpPr>
+        <p:spPr>
+          <a:xfrm>
+            <a:off x="838200" y="1825625"/>
+            <a:ext cx="4528127" cy="4351338"/>
+          </a:xfrm>
+        </p:spPr>
+        <p:txBody>
+          <a:bodyPr>
+            <a:normAutofit/>
+          </a:bodyPr>
+          <a:lstStyle/>
+          <a:p>
+            <a:pPr lvl="1"/>
+            <a:endParaRPr lang="en-US" dirty="0"/>
+          </a:p>
+        </p:txBody>
+      </p:sp>
+      <p:sp>
+        <p:nvSpPr>
+          <p:cNvPr id="3" name="Content Placeholder 2">
+            <a:extLst>
+              <a:ext uri="{FF2B5EF4-FFF2-40B4-BE49-F238E27FC236}">
+                <a16:creationId xmlns:a16="http://schemas.microsoft.com/office/drawing/2014/main" id="{D9DD746E-E481-614A-BC5B-C941B11D3A66}"/>
+              </a:ext>
+            </a:extLst>
+          </p:cNvPr>
+          <p:cNvSpPr>
+            <a:spLocks noGrp="1"/>
+          </p:cNvSpPr>
+          <p:nvPr>
+            <p:ph sz="half" idx="2"/>
+          </p:nvPr>
+        </p:nvSpPr>
+        <p:spPr/>
+        <p:txBody>
+          <a:bodyPr/>
+          <a:lstStyle/>
+          <a:p>
+            <a:endParaRPr lang="en-US"/>
+          </a:p>
+        </p:txBody>
+      </p:sp>
+    </p:spTree>
+    <p:extLst>
+      <p:ext uri="{BB962C8B-B14F-4D97-AF65-F5344CB8AC3E}">
+        <p14:creationId xmlns:p14="http://schemas.microsoft.com/office/powerpoint/2010/main" val="582483006"/>
       </p:ext>
     </p:extLst>
   </p:cSld>

</xml_diff>